<commit_message>
Aula2 + Bônus (Template com Bootstrap)
</commit_message>
<xml_diff>
--- a/AulasAvancado/src/main/resources/br/com/Aula2/Servlets.pptx
+++ b/AulasAvancado/src/main/resources/br/com/Aula2/Servlets.pptx
@@ -5,10 +5,10 @@
     <p:sldMasterId id="2147483648" r:id="rId1"/>
   </p:sldMasterIdLst>
   <p:notesMasterIdLst>
-    <p:notesMasterId r:id="rId18"/>
+    <p:notesMasterId r:id="rId21"/>
   </p:notesMasterIdLst>
   <p:handoutMasterIdLst>
-    <p:handoutMasterId r:id="rId19"/>
+    <p:handoutMasterId r:id="rId22"/>
   </p:handoutMasterIdLst>
   <p:sldIdLst>
     <p:sldId id="257" r:id="rId2"/>
@@ -23,10 +23,13 @@
     <p:sldId id="284" r:id="rId11"/>
     <p:sldId id="291" r:id="rId12"/>
     <p:sldId id="280" r:id="rId13"/>
-    <p:sldId id="294" r:id="rId14"/>
-    <p:sldId id="295" r:id="rId15"/>
-    <p:sldId id="296" r:id="rId16"/>
-    <p:sldId id="297" r:id="rId17"/>
+    <p:sldId id="295" r:id="rId14"/>
+    <p:sldId id="296" r:id="rId15"/>
+    <p:sldId id="297" r:id="rId16"/>
+    <p:sldId id="298" r:id="rId17"/>
+    <p:sldId id="299" r:id="rId18"/>
+    <p:sldId id="300" r:id="rId19"/>
+    <p:sldId id="303" r:id="rId20"/>
   </p:sldIdLst>
   <p:sldSz cx="9144000" cy="6858000" type="screen4x3"/>
   <p:notesSz cx="6858000" cy="9144000"/>
@@ -227,7 +230,7 @@
             <a:fld id="{54D4857D-62A5-486B-9129-468003D7E020}" type="datetimeFigureOut">
               <a:rPr lang="pt-BR" smtClean="0"/>
               <a:pPr/>
-              <a:t>12/10/2018</a:t>
+              <a:t>14/10/2018</a:t>
             </a:fld>
             <a:endParaRPr lang="pt-BR"/>
           </a:p>
@@ -397,7 +400,7 @@
           <a:p>
             <a:fld id="{2D2EF2CE-B28C-4ED4-8FD0-48BB3F48846A}" type="datetimeFigureOut">
               <a:pPr/>
-              <a:t>12/10/2018</a:t>
+              <a:t>14/10/2018</a:t>
             </a:fld>
             <a:endParaRPr lang="pt-BR"/>
           </a:p>
@@ -2301,70 +2304,6 @@
               <a:cs typeface="+mn-cs"/>
             </a:endParaRPr>
           </a:p>
-          <a:p>
-            <a:endParaRPr lang="pt-BR" sz="1200" b="0" i="0" u="none" strike="noStrike" kern="1200" baseline="0" dirty="0" smtClean="0">
-              <a:solidFill>
-                <a:schemeClr val="tx1"/>
-              </a:solidFill>
-              <a:latin typeface="+mn-lt"/>
-              <a:ea typeface="+mn-ea"/>
-              <a:cs typeface="+mn-cs"/>
-            </a:endParaRPr>
-          </a:p>
-          <a:p>
-            <a:r>
-              <a:rPr lang="pt-BR" sz="1200" b="0" i="0" u="none" strike="noStrike" kern="1200" baseline="0" dirty="0" smtClean="0">
-                <a:solidFill>
-                  <a:schemeClr val="tx1"/>
-                </a:solidFill>
-                <a:latin typeface="+mn-lt"/>
-                <a:ea typeface="+mn-ea"/>
-                <a:cs typeface="+mn-cs"/>
-              </a:rPr>
-              <a:t>Mostrar algumas na prática e </a:t>
-            </a:r>
-            <a:r>
-              <a:rPr lang="pt-BR" sz="1200" b="0" i="0" u="none" strike="noStrike" kern="1200" baseline="0" dirty="0" err="1" smtClean="0">
-                <a:solidFill>
-                  <a:schemeClr val="tx1"/>
-                </a:solidFill>
-                <a:latin typeface="+mn-lt"/>
-                <a:ea typeface="+mn-ea"/>
-                <a:cs typeface="+mn-cs"/>
-              </a:rPr>
-              <a:t>mostar</a:t>
-            </a:r>
-            <a:r>
-              <a:rPr lang="pt-BR" sz="1200" b="0" i="0" u="none" strike="noStrike" kern="1200" baseline="0" dirty="0" smtClean="0">
-                <a:solidFill>
-                  <a:schemeClr val="tx1"/>
-                </a:solidFill>
-                <a:latin typeface="+mn-lt"/>
-                <a:ea typeface="+mn-ea"/>
-                <a:cs typeface="+mn-cs"/>
-              </a:rPr>
-              <a:t> como gravar dentro </a:t>
-            </a:r>
-            <a:r>
-              <a:rPr lang="pt-BR" sz="1200" b="0" i="0" u="none" strike="noStrike" kern="1200" baseline="0" smtClean="0">
-                <a:solidFill>
-                  <a:schemeClr val="tx1"/>
-                </a:solidFill>
-                <a:latin typeface="+mn-lt"/>
-                <a:ea typeface="+mn-ea"/>
-                <a:cs typeface="+mn-cs"/>
-              </a:rPr>
-              <a:t>do contexto !</a:t>
-            </a:r>
-            <a:endParaRPr lang="pt-BR" sz="1200" b="0" i="0" u="none" strike="noStrike" kern="1200" baseline="0" dirty="0" smtClean="0">
-              <a:solidFill>
-                <a:schemeClr val="tx1"/>
-              </a:solidFill>
-              <a:latin typeface="+mn-lt"/>
-              <a:ea typeface="+mn-ea"/>
-              <a:cs typeface="+mn-cs"/>
-            </a:endParaRPr>
-          </a:p>
         </p:txBody>
       </p:sp>
       <p:sp>
@@ -2448,270 +2387,6 @@
           <a:bodyPr/>
           <a:lstStyle/>
           <a:p>
-            <a:pPr marL="342900" lvl="0" indent="-342900">
-              <a:spcBef>
-                <a:spcPct val="20000"/>
-              </a:spcBef>
-              <a:buFont typeface="Arial"/>
-              <a:buChar char="•"/>
-              <a:defRPr lang="pt-BR"/>
-            </a:pPr>
-            <a:r>
-              <a:rPr lang="pt-BR" dirty="0" smtClean="0"/>
-              <a:t>Para retornar o contexto atual</a:t>
-            </a:r>
-            <a:r>
-              <a:rPr lang="pt-BR" baseline="0" dirty="0" smtClean="0"/>
-              <a:t> utilizamos o </a:t>
-            </a:r>
-            <a:r>
-              <a:rPr lang="pt-BR" baseline="0" dirty="0" err="1" smtClean="0"/>
-              <a:t>getServletContext</a:t>
-            </a:r>
-            <a:r>
-              <a:rPr lang="pt-BR" baseline="0" dirty="0" smtClean="0"/>
-              <a:t>().</a:t>
-            </a:r>
-          </a:p>
-          <a:p>
-            <a:pPr marL="342900" lvl="0" indent="-342900">
-              <a:spcBef>
-                <a:spcPct val="20000"/>
-              </a:spcBef>
-              <a:buFont typeface="Arial"/>
-              <a:buChar char="•"/>
-              <a:defRPr lang="pt-BR"/>
-            </a:pPr>
-            <a:r>
-              <a:rPr lang="pt-BR" dirty="0" err="1" smtClean="0"/>
-              <a:t>String</a:t>
-            </a:r>
-            <a:r>
-              <a:rPr lang="pt-BR" dirty="0" smtClean="0"/>
-              <a:t> </a:t>
-            </a:r>
-            <a:r>
-              <a:rPr lang="pt-BR" dirty="0" err="1" smtClean="0"/>
-              <a:t>getInitParameter</a:t>
-            </a:r>
-            <a:r>
-              <a:rPr lang="pt-BR" dirty="0" smtClean="0"/>
-              <a:t>(</a:t>
-            </a:r>
-            <a:r>
-              <a:rPr lang="pt-BR" dirty="0" err="1" smtClean="0"/>
-              <a:t>String</a:t>
-            </a:r>
-            <a:r>
-              <a:rPr lang="pt-BR" dirty="0" smtClean="0"/>
-              <a:t>): lê parâmetros de inicialização do contexto (não confunda com o método similar de </a:t>
-            </a:r>
-            <a:r>
-              <a:rPr lang="pt-BR" dirty="0" err="1" smtClean="0"/>
-              <a:t>ServletConfig</a:t>
-            </a:r>
-            <a:r>
-              <a:rPr lang="pt-BR" dirty="0" smtClean="0"/>
-              <a:t>)</a:t>
-            </a:r>
-          </a:p>
-          <a:p>
-            <a:pPr marL="342900" lvl="0" indent="-342900">
-              <a:spcBef>
-                <a:spcPct val="20000"/>
-              </a:spcBef>
-              <a:buFont typeface="Arial"/>
-              <a:buChar char="•"/>
-              <a:defRPr lang="pt-BR"/>
-            </a:pPr>
-            <a:r>
-              <a:rPr lang="pt-BR" dirty="0" err="1" smtClean="0"/>
-              <a:t>Enumeration</a:t>
-            </a:r>
-            <a:r>
-              <a:rPr lang="pt-BR" dirty="0" smtClean="0"/>
-              <a:t> </a:t>
-            </a:r>
-            <a:r>
-              <a:rPr lang="pt-BR" dirty="0" err="1" smtClean="0"/>
-              <a:t>getInitParameterNames</a:t>
-            </a:r>
-            <a:r>
-              <a:rPr lang="pt-BR" dirty="0" smtClean="0"/>
-              <a:t>(): lê lista de parâmetros</a:t>
-            </a:r>
-          </a:p>
-          <a:p>
-            <a:pPr marL="342900" lvl="0" indent="-342900">
-              <a:spcBef>
-                <a:spcPct val="20000"/>
-              </a:spcBef>
-              <a:buFont typeface="Arial"/>
-              <a:buChar char="•"/>
-              <a:defRPr lang="pt-BR"/>
-            </a:pPr>
-            <a:r>
-              <a:rPr lang="pt-BR" dirty="0" err="1" smtClean="0"/>
-              <a:t>InputStream</a:t>
-            </a:r>
-            <a:r>
-              <a:rPr lang="pt-BR" dirty="0" smtClean="0"/>
-              <a:t> </a:t>
-            </a:r>
-            <a:r>
-              <a:rPr lang="pt-BR" dirty="0" err="1" smtClean="0"/>
-              <a:t>getResourceAsStream</a:t>
-            </a:r>
-            <a:r>
-              <a:rPr lang="pt-BR" dirty="0" smtClean="0"/>
-              <a:t>(): lê recurso localizado dentro do contexto como</a:t>
-            </a:r>
-            <a:r>
-              <a:rPr lang="pt-BR" baseline="0" dirty="0" smtClean="0"/>
-              <a:t> </a:t>
-            </a:r>
-            <a:r>
-              <a:rPr lang="pt-BR" dirty="0" smtClean="0"/>
-              <a:t>um </a:t>
-            </a:r>
-            <a:r>
-              <a:rPr lang="pt-BR" dirty="0" err="1" smtClean="0"/>
-              <a:t>InputStream</a:t>
-            </a:r>
-            <a:endParaRPr lang="pt-BR" dirty="0" smtClean="0"/>
-          </a:p>
-          <a:p>
-            <a:pPr marL="342900" lvl="0" indent="-342900">
-              <a:spcBef>
-                <a:spcPct val="20000"/>
-              </a:spcBef>
-              <a:buFont typeface="Arial"/>
-              <a:buChar char="•"/>
-              <a:defRPr lang="pt-BR"/>
-            </a:pPr>
-            <a:r>
-              <a:rPr lang="pt-BR" dirty="0" err="1" smtClean="0"/>
-              <a:t>void</a:t>
-            </a:r>
-            <a:r>
-              <a:rPr lang="pt-BR" dirty="0" smtClean="0"/>
-              <a:t> </a:t>
-            </a:r>
-            <a:r>
-              <a:rPr lang="pt-BR" dirty="0" err="1" smtClean="0"/>
-              <a:t>setAttribute</a:t>
-            </a:r>
-            <a:r>
-              <a:rPr lang="pt-BR" dirty="0" smtClean="0"/>
-              <a:t>(</a:t>
-            </a:r>
-            <a:r>
-              <a:rPr lang="pt-BR" dirty="0" err="1" smtClean="0"/>
-              <a:t>String</a:t>
-            </a:r>
-            <a:r>
-              <a:rPr lang="pt-BR" dirty="0" smtClean="0"/>
-              <a:t> nome, </a:t>
-            </a:r>
-            <a:r>
-              <a:rPr lang="pt-BR" dirty="0" err="1" smtClean="0"/>
-              <a:t>Object</a:t>
-            </a:r>
-            <a:r>
-              <a:rPr lang="pt-BR" dirty="0" smtClean="0"/>
-              <a:t>): grava um atributo no contexto</a:t>
-            </a:r>
-          </a:p>
-          <a:p>
-            <a:pPr marL="342900" lvl="0" indent="-342900">
-              <a:spcBef>
-                <a:spcPct val="20000"/>
-              </a:spcBef>
-              <a:buFont typeface="Arial"/>
-              <a:buChar char="•"/>
-              <a:defRPr lang="pt-BR"/>
-            </a:pPr>
-            <a:r>
-              <a:rPr lang="pt-BR" dirty="0" err="1" smtClean="0"/>
-              <a:t>Object</a:t>
-            </a:r>
-            <a:r>
-              <a:rPr lang="pt-BR" dirty="0" smtClean="0"/>
-              <a:t> </a:t>
-            </a:r>
-            <a:r>
-              <a:rPr lang="pt-BR" dirty="0" err="1" smtClean="0"/>
-              <a:t>getAttribute</a:t>
-            </a:r>
-            <a:r>
-              <a:rPr lang="pt-BR" dirty="0" smtClean="0"/>
-              <a:t>(</a:t>
-            </a:r>
-            <a:r>
-              <a:rPr lang="pt-BR" dirty="0" err="1" smtClean="0"/>
-              <a:t>String</a:t>
-            </a:r>
-            <a:r>
-              <a:rPr lang="pt-BR" dirty="0" smtClean="0"/>
-              <a:t> nome): lê um atributo do contexto</a:t>
-            </a:r>
-          </a:p>
-          <a:p>
-            <a:pPr marL="342900" lvl="0" indent="-342900">
-              <a:spcBef>
-                <a:spcPct val="20000"/>
-              </a:spcBef>
-              <a:buFont typeface="Arial"/>
-              <a:buChar char="•"/>
-              <a:defRPr lang="pt-BR"/>
-            </a:pPr>
-            <a:r>
-              <a:rPr lang="pt-BR" dirty="0" err="1" smtClean="0"/>
-              <a:t>void</a:t>
-            </a:r>
-            <a:r>
-              <a:rPr lang="pt-BR" dirty="0" smtClean="0"/>
-              <a:t> log(</a:t>
-            </a:r>
-            <a:r>
-              <a:rPr lang="pt-BR" dirty="0" err="1" smtClean="0"/>
-              <a:t>String</a:t>
-            </a:r>
-            <a:r>
-              <a:rPr lang="pt-BR" dirty="0" smtClean="0"/>
-              <a:t> mensagem): escreve mensagem no log do contexto</a:t>
-            </a:r>
-          </a:p>
-          <a:p>
-            <a:pPr marL="0" lvl="0" indent="0">
-              <a:spcBef>
-                <a:spcPct val="20000"/>
-              </a:spcBef>
-              <a:buFont typeface="Arial"/>
-              <a:buNone/>
-              <a:defRPr lang="pt-BR"/>
-            </a:pPr>
-            <a:endParaRPr lang="pt-BR" dirty="0" smtClean="0"/>
-          </a:p>
-          <a:p>
-            <a:pPr marL="0" lvl="0" indent="0">
-              <a:spcBef>
-                <a:spcPct val="20000"/>
-              </a:spcBef>
-              <a:buFont typeface="Arial"/>
-              <a:buNone/>
-              <a:defRPr lang="pt-BR"/>
-            </a:pPr>
-            <a:r>
-              <a:rPr lang="pt-BR" dirty="0" smtClean="0"/>
-              <a:t>Podemos</a:t>
-            </a:r>
-            <a:r>
-              <a:rPr lang="pt-BR" baseline="0" dirty="0" smtClean="0"/>
-              <a:t> configurar parâmetros de inicialização de contexto através do web.xml.</a:t>
-            </a:r>
-          </a:p>
-          <a:p>
             <a:r>
               <a:rPr lang="pt-BR" sz="1200" b="0" i="0" u="none" strike="noStrike" kern="1200" baseline="0" dirty="0" smtClean="0">
                 <a:solidFill>
@@ -2721,6 +2396,19 @@
                 <a:ea typeface="+mn-ea"/>
                 <a:cs typeface="+mn-cs"/>
               </a:rPr>
+              <a:t>Caso a configuração seja feita no web.xml:</a:t>
+            </a:r>
+          </a:p>
+          <a:p>
+            <a:r>
+              <a:rPr lang="pt-BR" sz="1200" b="0" i="0" u="none" strike="noStrike" kern="1200" baseline="0" dirty="0" smtClean="0">
+                <a:solidFill>
+                  <a:schemeClr val="tx1"/>
+                </a:solidFill>
+                <a:latin typeface="+mn-lt"/>
+                <a:ea typeface="+mn-ea"/>
+                <a:cs typeface="+mn-cs"/>
+              </a:rPr>
               <a:t>&lt;</a:t>
             </a:r>
             <a:r>
@@ -2732,7 +2420,7 @@
                 <a:ea typeface="+mn-ea"/>
                 <a:cs typeface="+mn-cs"/>
               </a:rPr>
-              <a:t>context</a:t>
+              <a:t>listener</a:t>
             </a:r>
             <a:r>
               <a:rPr lang="pt-BR" sz="1200" b="0" i="0" u="none" strike="noStrike" kern="1200" baseline="0" dirty="0" smtClean="0">
@@ -2743,7 +2431,7 @@
                 <a:ea typeface="+mn-ea"/>
                 <a:cs typeface="+mn-cs"/>
               </a:rPr>
-              <a:t>-param&gt;</a:t>
+              <a:t>&gt;</a:t>
             </a:r>
           </a:p>
           <a:p>
@@ -2756,7 +2444,7 @@
                 <a:ea typeface="+mn-ea"/>
                 <a:cs typeface="+mn-cs"/>
               </a:rPr>
-              <a:t>	&lt;param-</a:t>
+              <a:t>	&lt;</a:t>
             </a:r>
             <a:r>
               <a:rPr lang="pt-BR" sz="1200" b="0" i="0" u="none" strike="noStrike" kern="1200" baseline="0" dirty="0" err="1" smtClean="0">
@@ -2767,7 +2455,7 @@
                 <a:ea typeface="+mn-ea"/>
                 <a:cs typeface="+mn-cs"/>
               </a:rPr>
-              <a:t>name</a:t>
+              <a:t>listener-class</a:t>
             </a:r>
             <a:r>
               <a:rPr lang="pt-BR" sz="1200" b="0" i="0" u="none" strike="noStrike" kern="1200" baseline="0" dirty="0" smtClean="0">
@@ -2778,8 +2466,43 @@
                 <a:ea typeface="+mn-ea"/>
                 <a:cs typeface="+mn-cs"/>
               </a:rPr>
+              <a:t>&gt;ex01.OuvinteDeContexto&lt;/</a:t>
+            </a:r>
+            <a:r>
+              <a:rPr lang="pt-BR" sz="1200" b="0" i="0" u="none" strike="noStrike" kern="1200" baseline="0" dirty="0" err="1" smtClean="0">
+                <a:solidFill>
+                  <a:schemeClr val="tx1"/>
+                </a:solidFill>
+                <a:latin typeface="+mn-lt"/>
+                <a:ea typeface="+mn-ea"/>
+                <a:cs typeface="+mn-cs"/>
+              </a:rPr>
+              <a:t>listener-class</a:t>
+            </a:r>
+            <a:r>
+              <a:rPr lang="pt-BR" sz="1200" b="0" i="0" u="none" strike="noStrike" kern="1200" baseline="0" dirty="0" smtClean="0">
+                <a:solidFill>
+                  <a:schemeClr val="tx1"/>
+                </a:solidFill>
+                <a:latin typeface="+mn-lt"/>
+                <a:ea typeface="+mn-ea"/>
+                <a:cs typeface="+mn-cs"/>
+              </a:rPr>
               <a:t>&gt;</a:t>
             </a:r>
+          </a:p>
+          <a:p>
+            <a:r>
+              <a:rPr lang="pt-BR" sz="1200" b="0" i="0" u="none" strike="noStrike" kern="1200" baseline="0" dirty="0" smtClean="0">
+                <a:solidFill>
+                  <a:schemeClr val="tx1"/>
+                </a:solidFill>
+                <a:latin typeface="+mn-lt"/>
+                <a:ea typeface="+mn-ea"/>
+                <a:cs typeface="+mn-cs"/>
+              </a:rPr>
+              <a:t>&lt;/</a:t>
+            </a:r>
             <a:r>
               <a:rPr lang="pt-BR" sz="1200" b="0" i="0" u="none" strike="noStrike" kern="1200" baseline="0" dirty="0" err="1" smtClean="0">
                 <a:solidFill>
@@ -2789,7 +2512,7 @@
                 <a:ea typeface="+mn-ea"/>
                 <a:cs typeface="+mn-cs"/>
               </a:rPr>
-              <a:t>tempdir</a:t>
+              <a:t>listener</a:t>
             </a:r>
             <a:r>
               <a:rPr lang="pt-BR" sz="1200" b="0" i="0" u="none" strike="noStrike" kern="1200" baseline="0" dirty="0" smtClean="0">
@@ -2800,143 +2523,7 @@
                 <a:ea typeface="+mn-ea"/>
                 <a:cs typeface="+mn-cs"/>
               </a:rPr>
-              <a:t>&lt;/param-</a:t>
-            </a:r>
-            <a:r>
-              <a:rPr lang="pt-BR" sz="1200" b="0" i="0" u="none" strike="noStrike" kern="1200" baseline="0" dirty="0" err="1" smtClean="0">
-                <a:solidFill>
-                  <a:schemeClr val="tx1"/>
-                </a:solidFill>
-                <a:latin typeface="+mn-lt"/>
-                <a:ea typeface="+mn-ea"/>
-                <a:cs typeface="+mn-cs"/>
-              </a:rPr>
-              <a:t>name</a:t>
-            </a:r>
-            <a:r>
-              <a:rPr lang="pt-BR" sz="1200" b="0" i="0" u="none" strike="noStrike" kern="1200" baseline="0" dirty="0" smtClean="0">
-                <a:solidFill>
-                  <a:schemeClr val="tx1"/>
-                </a:solidFill>
-                <a:latin typeface="+mn-lt"/>
-                <a:ea typeface="+mn-ea"/>
-                <a:cs typeface="+mn-cs"/>
-              </a:rPr>
               <a:t>&gt;</a:t>
-            </a:r>
-          </a:p>
-          <a:p>
-            <a:r>
-              <a:rPr lang="pt-BR" sz="1200" b="0" i="0" u="none" strike="noStrike" kern="1200" baseline="0" dirty="0" smtClean="0">
-                <a:solidFill>
-                  <a:schemeClr val="tx1"/>
-                </a:solidFill>
-                <a:latin typeface="+mn-lt"/>
-                <a:ea typeface="+mn-ea"/>
-                <a:cs typeface="+mn-cs"/>
-              </a:rPr>
-              <a:t>	&lt;param-</a:t>
-            </a:r>
-            <a:r>
-              <a:rPr lang="pt-BR" sz="1200" b="0" i="0" u="none" strike="noStrike" kern="1200" baseline="0" dirty="0" err="1" smtClean="0">
-                <a:solidFill>
-                  <a:schemeClr val="tx1"/>
-                </a:solidFill>
-                <a:latin typeface="+mn-lt"/>
-                <a:ea typeface="+mn-ea"/>
-                <a:cs typeface="+mn-cs"/>
-              </a:rPr>
-              <a:t>value</a:t>
-            </a:r>
-            <a:r>
-              <a:rPr lang="pt-BR" sz="1200" b="0" i="0" u="none" strike="noStrike" kern="1200" baseline="0" dirty="0" smtClean="0">
-                <a:solidFill>
-                  <a:schemeClr val="tx1"/>
-                </a:solidFill>
-                <a:latin typeface="+mn-lt"/>
-                <a:ea typeface="+mn-ea"/>
-                <a:cs typeface="+mn-cs"/>
-              </a:rPr>
-              <a:t>&gt;/</a:t>
-            </a:r>
-            <a:r>
-              <a:rPr lang="pt-BR" sz="1200" b="0" i="0" u="none" strike="noStrike" kern="1200" baseline="0" dirty="0" err="1" smtClean="0">
-                <a:solidFill>
-                  <a:schemeClr val="tx1"/>
-                </a:solidFill>
-                <a:latin typeface="+mn-lt"/>
-                <a:ea typeface="+mn-ea"/>
-                <a:cs typeface="+mn-cs"/>
-              </a:rPr>
-              <a:t>tmp</a:t>
-            </a:r>
-            <a:r>
-              <a:rPr lang="pt-BR" sz="1200" b="0" i="0" u="none" strike="noStrike" kern="1200" baseline="0" dirty="0" smtClean="0">
-                <a:solidFill>
-                  <a:schemeClr val="tx1"/>
-                </a:solidFill>
-                <a:latin typeface="+mn-lt"/>
-                <a:ea typeface="+mn-ea"/>
-                <a:cs typeface="+mn-cs"/>
-              </a:rPr>
-              <a:t>&lt;/param-</a:t>
-            </a:r>
-            <a:r>
-              <a:rPr lang="pt-BR" sz="1200" b="0" i="0" u="none" strike="noStrike" kern="1200" baseline="0" dirty="0" err="1" smtClean="0">
-                <a:solidFill>
-                  <a:schemeClr val="tx1"/>
-                </a:solidFill>
-                <a:latin typeface="+mn-lt"/>
-                <a:ea typeface="+mn-ea"/>
-                <a:cs typeface="+mn-cs"/>
-              </a:rPr>
-              <a:t>value</a:t>
-            </a:r>
-            <a:r>
-              <a:rPr lang="pt-BR" sz="1200" b="0" i="0" u="none" strike="noStrike" kern="1200" baseline="0" dirty="0" smtClean="0">
-                <a:solidFill>
-                  <a:schemeClr val="tx1"/>
-                </a:solidFill>
-                <a:latin typeface="+mn-lt"/>
-                <a:ea typeface="+mn-ea"/>
-                <a:cs typeface="+mn-cs"/>
-              </a:rPr>
-              <a:t>&gt;</a:t>
-            </a:r>
-          </a:p>
-          <a:p>
-            <a:r>
-              <a:rPr lang="pt-BR" sz="1200" b="0" i="0" u="none" strike="noStrike" kern="1200" baseline="0" dirty="0" smtClean="0">
-                <a:solidFill>
-                  <a:schemeClr val="tx1"/>
-                </a:solidFill>
-                <a:latin typeface="+mn-lt"/>
-                <a:ea typeface="+mn-ea"/>
-                <a:cs typeface="+mn-cs"/>
-              </a:rPr>
-              <a:t>&lt;/</a:t>
-            </a:r>
-            <a:r>
-              <a:rPr lang="pt-BR" sz="1200" b="0" i="0" u="none" strike="noStrike" kern="1200" baseline="0" dirty="0" err="1" smtClean="0">
-                <a:solidFill>
-                  <a:schemeClr val="tx1"/>
-                </a:solidFill>
-                <a:latin typeface="+mn-lt"/>
-                <a:ea typeface="+mn-ea"/>
-                <a:cs typeface="+mn-cs"/>
-              </a:rPr>
-              <a:t>context</a:t>
-            </a:r>
-            <a:r>
-              <a:rPr lang="pt-BR" sz="1200" b="0" i="0" u="none" strike="noStrike" kern="1200" baseline="0" dirty="0" smtClean="0">
-                <a:solidFill>
-                  <a:schemeClr val="tx1"/>
-                </a:solidFill>
-                <a:latin typeface="+mn-lt"/>
-                <a:ea typeface="+mn-ea"/>
-                <a:cs typeface="+mn-cs"/>
-              </a:rPr>
-              <a:t>-param&gt;</a:t>
             </a:r>
           </a:p>
           <a:p>
@@ -2959,20 +2546,18 @@
                 <a:ea typeface="+mn-ea"/>
                 <a:cs typeface="+mn-cs"/>
               </a:rPr>
-              <a:t>Para ler:</a:t>
-            </a:r>
-          </a:p>
-          <a:p>
-            <a:r>
-              <a:rPr lang="pt-BR" sz="1200" b="0" i="0" u="none" strike="noStrike" kern="1200" baseline="0" dirty="0" err="1" smtClean="0">
-                <a:solidFill>
-                  <a:schemeClr val="tx1"/>
-                </a:solidFill>
-                <a:latin typeface="+mn-lt"/>
-                <a:ea typeface="+mn-ea"/>
-                <a:cs typeface="+mn-cs"/>
-              </a:rPr>
-              <a:t>ServletContext</a:t>
+              <a:t>O objeto </a:t>
+            </a:r>
+            <a:r>
+              <a:rPr lang="pt-BR" sz="1200" b="0" i="1" u="none" strike="noStrike" kern="1200" baseline="0" dirty="0" err="1" smtClean="0">
+                <a:solidFill>
+                  <a:schemeClr val="tx1"/>
+                </a:solidFill>
+                <a:latin typeface="+mn-lt"/>
+                <a:ea typeface="+mn-ea"/>
+                <a:cs typeface="+mn-cs"/>
+              </a:rPr>
+              <a:t>ServletContextEvent</a:t>
             </a:r>
             <a:r>
               <a:rPr lang="pt-BR" sz="1200" b="0" i="0" u="none" strike="noStrike" kern="1200" baseline="0" dirty="0" smtClean="0">
@@ -2983,18 +2568,31 @@
                 <a:ea typeface="+mn-ea"/>
                 <a:cs typeface="+mn-cs"/>
               </a:rPr>
-              <a:t> </a:t>
-            </a:r>
-            <a:r>
-              <a:rPr lang="pt-BR" sz="1200" b="0" i="0" u="none" strike="noStrike" kern="1200" baseline="0" dirty="0" err="1" smtClean="0">
-                <a:solidFill>
-                  <a:schemeClr val="tx1"/>
-                </a:solidFill>
-                <a:latin typeface="+mn-lt"/>
-                <a:ea typeface="+mn-ea"/>
-                <a:cs typeface="+mn-cs"/>
-              </a:rPr>
-              <a:t>ctx</a:t>
+              <a:t>, recebido em ambos os métodos, possui um método</a:t>
+            </a:r>
+          </a:p>
+          <a:p>
+            <a:r>
+              <a:rPr lang="pt-BR" sz="1200" b="0" i="1" u="none" strike="noStrike" kern="1200" baseline="0" dirty="0" err="1" smtClean="0">
+                <a:solidFill>
+                  <a:schemeClr val="tx1"/>
+                </a:solidFill>
+                <a:latin typeface="+mn-lt"/>
+                <a:ea typeface="+mn-ea"/>
+                <a:cs typeface="+mn-cs"/>
+              </a:rPr>
+              <a:t>getServletContext</a:t>
+            </a:r>
+            <a:r>
+              <a:rPr lang="pt-BR" sz="1200" b="0" i="1" u="none" strike="noStrike" kern="1200" baseline="0" dirty="0" smtClean="0">
+                <a:solidFill>
+                  <a:schemeClr val="tx1"/>
+                </a:solidFill>
+                <a:latin typeface="+mn-lt"/>
+                <a:ea typeface="+mn-ea"/>
+                <a:cs typeface="+mn-cs"/>
+              </a:rPr>
+              <a:t>() </a:t>
             </a:r>
             <a:r>
               <a:rPr lang="pt-BR" sz="1200" b="0" i="0" u="none" strike="noStrike" kern="1200" baseline="0" dirty="0" smtClean="0">
@@ -3005,130 +2603,8 @@
                 <a:ea typeface="+mn-ea"/>
                 <a:cs typeface="+mn-cs"/>
               </a:rPr>
-              <a:t> = </a:t>
-            </a:r>
-            <a:r>
-              <a:rPr lang="pt-BR" sz="1200" b="0" i="0" u="none" strike="noStrike" kern="1200" baseline="0" dirty="0" err="1" smtClean="0">
-                <a:solidFill>
-                  <a:schemeClr val="tx1"/>
-                </a:solidFill>
-                <a:latin typeface="+mn-lt"/>
-                <a:ea typeface="+mn-ea"/>
-                <a:cs typeface="+mn-cs"/>
-              </a:rPr>
-              <a:t>this.getServletContext</a:t>
-            </a:r>
-            <a:r>
-              <a:rPr lang="pt-BR" sz="1200" b="0" i="0" u="none" strike="noStrike" kern="1200" baseline="0" dirty="0" smtClean="0">
-                <a:solidFill>
-                  <a:schemeClr val="tx1"/>
-                </a:solidFill>
-                <a:latin typeface="+mn-lt"/>
-                <a:ea typeface="+mn-ea"/>
-                <a:cs typeface="+mn-cs"/>
-              </a:rPr>
-              <a:t>();</a:t>
-            </a:r>
-          </a:p>
-          <a:p>
-            <a:r>
-              <a:rPr lang="pt-BR" sz="1200" b="0" i="0" u="none" strike="noStrike" kern="1200" baseline="0" dirty="0" err="1" smtClean="0">
-                <a:solidFill>
-                  <a:schemeClr val="tx1"/>
-                </a:solidFill>
-                <a:latin typeface="+mn-lt"/>
-                <a:ea typeface="+mn-ea"/>
-                <a:cs typeface="+mn-cs"/>
-              </a:rPr>
-              <a:t>String</a:t>
-            </a:r>
-            <a:r>
-              <a:rPr lang="pt-BR" sz="1200" b="0" i="0" u="none" strike="noStrike" kern="1200" baseline="0" dirty="0" smtClean="0">
-                <a:solidFill>
-                  <a:schemeClr val="tx1"/>
-                </a:solidFill>
-                <a:latin typeface="+mn-lt"/>
-                <a:ea typeface="+mn-ea"/>
-                <a:cs typeface="+mn-cs"/>
-              </a:rPr>
-              <a:t> </a:t>
-            </a:r>
-            <a:r>
-              <a:rPr lang="pt-BR" sz="1200" b="0" i="0" u="none" strike="noStrike" kern="1200" baseline="0" dirty="0" err="1" smtClean="0">
-                <a:solidFill>
-                  <a:schemeClr val="tx1"/>
-                </a:solidFill>
-                <a:latin typeface="+mn-lt"/>
-                <a:ea typeface="+mn-ea"/>
-                <a:cs typeface="+mn-cs"/>
-              </a:rPr>
-              <a:t>tempDir</a:t>
-            </a:r>
-            <a:r>
-              <a:rPr lang="pt-BR" sz="1200" b="0" i="0" u="none" strike="noStrike" kern="1200" baseline="0" dirty="0" smtClean="0">
-                <a:solidFill>
-                  <a:schemeClr val="tx1"/>
-                </a:solidFill>
-                <a:latin typeface="+mn-lt"/>
-                <a:ea typeface="+mn-ea"/>
-                <a:cs typeface="+mn-cs"/>
-              </a:rPr>
-              <a:t> = </a:t>
-            </a:r>
-            <a:r>
-              <a:rPr lang="pt-BR" sz="1200" b="0" i="0" u="none" strike="noStrike" kern="1200" baseline="0" dirty="0" err="1" smtClean="0">
-                <a:solidFill>
-                  <a:schemeClr val="tx1"/>
-                </a:solidFill>
-                <a:latin typeface="+mn-lt"/>
-                <a:ea typeface="+mn-ea"/>
-                <a:cs typeface="+mn-cs"/>
-              </a:rPr>
-              <a:t>ctx.getInitParameter</a:t>
-            </a:r>
-            <a:r>
-              <a:rPr lang="pt-BR" sz="1200" b="0" i="0" u="none" strike="noStrike" kern="1200" baseline="0" dirty="0" smtClean="0">
-                <a:solidFill>
-                  <a:schemeClr val="tx1"/>
-                </a:solidFill>
-                <a:latin typeface="+mn-lt"/>
-                <a:ea typeface="+mn-ea"/>
-                <a:cs typeface="+mn-cs"/>
-              </a:rPr>
-              <a:t>("</a:t>
-            </a:r>
-            <a:r>
-              <a:rPr lang="pt-BR" sz="1200" b="0" i="0" u="none" strike="noStrike" kern="1200" baseline="0" dirty="0" err="1" smtClean="0">
-                <a:solidFill>
-                  <a:schemeClr val="tx1"/>
-                </a:solidFill>
-                <a:latin typeface="+mn-lt"/>
-                <a:ea typeface="+mn-ea"/>
-                <a:cs typeface="+mn-cs"/>
-              </a:rPr>
-              <a:t>tempdir</a:t>
-            </a:r>
-            <a:r>
-              <a:rPr lang="pt-BR" sz="1200" b="0" i="0" u="none" strike="noStrike" kern="1200" baseline="0" dirty="0" smtClean="0">
-                <a:solidFill>
-                  <a:schemeClr val="tx1"/>
-                </a:solidFill>
-                <a:latin typeface="+mn-lt"/>
-                <a:ea typeface="+mn-ea"/>
-                <a:cs typeface="+mn-cs"/>
-              </a:rPr>
-              <a:t>");</a:t>
-            </a:r>
-          </a:p>
-          <a:p>
-            <a:endParaRPr lang="pt-BR" sz="1200" b="0" i="0" u="none" strike="noStrike" kern="1200" baseline="0" dirty="0" smtClean="0">
-              <a:solidFill>
-                <a:schemeClr val="tx1"/>
-              </a:solidFill>
-              <a:latin typeface="+mn-lt"/>
-              <a:ea typeface="+mn-ea"/>
-              <a:cs typeface="+mn-cs"/>
-            </a:endParaRPr>
+              <a:t>que permite obter o contexto associado.</a:t>
+            </a:r>
           </a:p>
         </p:txBody>
       </p:sp>
@@ -3222,7 +2698,7 @@
                 <a:ea typeface="+mn-ea"/>
                 <a:cs typeface="+mn-cs"/>
               </a:rPr>
-              <a:t>Caso a configuração seja feita no web.xml:</a:t>
+              <a:t>Pontos a observar: </a:t>
             </a:r>
           </a:p>
           <a:p>
@@ -3235,7 +2711,7 @@
                 <a:ea typeface="+mn-ea"/>
                 <a:cs typeface="+mn-cs"/>
               </a:rPr>
-              <a:t>&lt;</a:t>
+              <a:t>Definição de sessão, protocolo, </a:t>
             </a:r>
             <a:r>
               <a:rPr lang="pt-BR" sz="1200" b="0" i="0" u="none" strike="noStrike" kern="1200" baseline="0" dirty="0" err="1" smtClean="0">
@@ -3246,7 +2722,7 @@
                 <a:ea typeface="+mn-ea"/>
                 <a:cs typeface="+mn-cs"/>
               </a:rPr>
-              <a:t>listener</a:t>
+              <a:t>http</a:t>
             </a:r>
             <a:r>
               <a:rPr lang="pt-BR" sz="1200" b="0" i="0" u="none" strike="noStrike" kern="1200" baseline="0" dirty="0" smtClean="0">
@@ -3257,10 +2733,19 @@
                 <a:ea typeface="+mn-ea"/>
                 <a:cs typeface="+mn-cs"/>
               </a:rPr>
-              <a:t>&gt;</a:t>
-            </a:r>
-          </a:p>
-          <a:p>
+              <a:t> e </a:t>
+            </a:r>
+            <a:r>
+              <a:rPr lang="pt-BR" sz="1200" b="0" i="0" u="none" strike="noStrike" kern="1200" baseline="0" dirty="0" err="1" smtClean="0">
+                <a:solidFill>
+                  <a:schemeClr val="tx1"/>
+                </a:solidFill>
+                <a:latin typeface="+mn-lt"/>
+                <a:ea typeface="+mn-ea"/>
+                <a:cs typeface="+mn-cs"/>
+              </a:rPr>
+              <a:t>stateless</a:t>
+            </a:r>
             <a:r>
               <a:rPr lang="pt-BR" sz="1200" b="0" i="0" u="none" strike="noStrike" kern="1200" baseline="0" dirty="0" smtClean="0">
                 <a:solidFill>
@@ -3270,86 +2755,7 @@
                 <a:ea typeface="+mn-ea"/>
                 <a:cs typeface="+mn-cs"/>
               </a:rPr>
-              <a:t>	&lt;</a:t>
-            </a:r>
-            <a:r>
-              <a:rPr lang="pt-BR" sz="1200" b="0" i="0" u="none" strike="noStrike" kern="1200" baseline="0" dirty="0" err="1" smtClean="0">
-                <a:solidFill>
-                  <a:schemeClr val="tx1"/>
-                </a:solidFill>
-                <a:latin typeface="+mn-lt"/>
-                <a:ea typeface="+mn-ea"/>
-                <a:cs typeface="+mn-cs"/>
-              </a:rPr>
-              <a:t>listener-class</a:t>
-            </a:r>
-            <a:r>
-              <a:rPr lang="pt-BR" sz="1200" b="0" i="0" u="none" strike="noStrike" kern="1200" baseline="0" dirty="0" smtClean="0">
-                <a:solidFill>
-                  <a:schemeClr val="tx1"/>
-                </a:solidFill>
-                <a:latin typeface="+mn-lt"/>
-                <a:ea typeface="+mn-ea"/>
-                <a:cs typeface="+mn-cs"/>
-              </a:rPr>
-              <a:t>&gt;ex01.OuvinteDeContexto&lt;/</a:t>
-            </a:r>
-            <a:r>
-              <a:rPr lang="pt-BR" sz="1200" b="0" i="0" u="none" strike="noStrike" kern="1200" baseline="0" dirty="0" err="1" smtClean="0">
-                <a:solidFill>
-                  <a:schemeClr val="tx1"/>
-                </a:solidFill>
-                <a:latin typeface="+mn-lt"/>
-                <a:ea typeface="+mn-ea"/>
-                <a:cs typeface="+mn-cs"/>
-              </a:rPr>
-              <a:t>listener-class</a:t>
-            </a:r>
-            <a:r>
-              <a:rPr lang="pt-BR" sz="1200" b="0" i="0" u="none" strike="noStrike" kern="1200" baseline="0" dirty="0" smtClean="0">
-                <a:solidFill>
-                  <a:schemeClr val="tx1"/>
-                </a:solidFill>
-                <a:latin typeface="+mn-lt"/>
-                <a:ea typeface="+mn-ea"/>
-                <a:cs typeface="+mn-cs"/>
-              </a:rPr>
-              <a:t>&gt;</a:t>
-            </a:r>
-          </a:p>
-          <a:p>
-            <a:r>
-              <a:rPr lang="pt-BR" sz="1200" b="0" i="0" u="none" strike="noStrike" kern="1200" baseline="0" dirty="0" smtClean="0">
-                <a:solidFill>
-                  <a:schemeClr val="tx1"/>
-                </a:solidFill>
-                <a:latin typeface="+mn-lt"/>
-                <a:ea typeface="+mn-ea"/>
-                <a:cs typeface="+mn-cs"/>
-              </a:rPr>
-              <a:t>&lt;/</a:t>
-            </a:r>
-            <a:r>
-              <a:rPr lang="pt-BR" sz="1200" b="0" i="0" u="none" strike="noStrike" kern="1200" baseline="0" dirty="0" err="1" smtClean="0">
-                <a:solidFill>
-                  <a:schemeClr val="tx1"/>
-                </a:solidFill>
-                <a:latin typeface="+mn-lt"/>
-                <a:ea typeface="+mn-ea"/>
-                <a:cs typeface="+mn-cs"/>
-              </a:rPr>
-              <a:t>listener</a:t>
-            </a:r>
-            <a:r>
-              <a:rPr lang="pt-BR" sz="1200" b="0" i="0" u="none" strike="noStrike" kern="1200" baseline="0" dirty="0" smtClean="0">
-                <a:solidFill>
-                  <a:schemeClr val="tx1"/>
-                </a:solidFill>
-                <a:latin typeface="+mn-lt"/>
-                <a:ea typeface="+mn-ea"/>
-                <a:cs typeface="+mn-cs"/>
-              </a:rPr>
-              <a:t>&gt;</a:t>
+              <a:t>.</a:t>
             </a:r>
           </a:p>
           <a:p>
@@ -3372,19 +2778,10 @@
                 <a:ea typeface="+mn-ea"/>
                 <a:cs typeface="+mn-cs"/>
               </a:rPr>
-              <a:t>O objeto </a:t>
-            </a:r>
-            <a:r>
-              <a:rPr lang="pt-BR" sz="1200" b="0" i="1" u="none" strike="noStrike" kern="1200" baseline="0" dirty="0" err="1" smtClean="0">
-                <a:solidFill>
-                  <a:schemeClr val="tx1"/>
-                </a:solidFill>
-                <a:latin typeface="+mn-lt"/>
-                <a:ea typeface="+mn-ea"/>
-                <a:cs typeface="+mn-cs"/>
-              </a:rPr>
-              <a:t>ServletContextEvent</a:t>
-            </a:r>
+              <a:t>Sessão: Palavra diretamente ligada a intervalo de tempo em que se define diversas coisas.</a:t>
+            </a:r>
+          </a:p>
+          <a:p>
             <a:r>
               <a:rPr lang="pt-BR" sz="1200" b="0" i="0" u="none" strike="noStrike" kern="1200" baseline="0" dirty="0" smtClean="0">
                 <a:solidFill>
@@ -3394,32 +2791,10 @@
                 <a:ea typeface="+mn-ea"/>
                 <a:cs typeface="+mn-cs"/>
               </a:rPr>
-              <a:t>, recebido em ambos os métodos, possui um método</a:t>
-            </a:r>
-          </a:p>
-          <a:p>
-            <a:r>
-              <a:rPr lang="pt-BR" sz="1200" b="0" i="1" u="none" strike="noStrike" kern="1200" baseline="0" dirty="0" err="1" smtClean="0">
-                <a:solidFill>
-                  <a:schemeClr val="tx1"/>
-                </a:solidFill>
-                <a:latin typeface="+mn-lt"/>
-                <a:ea typeface="+mn-ea"/>
-                <a:cs typeface="+mn-cs"/>
-              </a:rPr>
-              <a:t>getServletContext</a:t>
-            </a:r>
-            <a:r>
-              <a:rPr lang="pt-BR" sz="1200" b="0" i="1" u="none" strike="noStrike" kern="1200" baseline="0" dirty="0" smtClean="0">
-                <a:solidFill>
-                  <a:schemeClr val="tx1"/>
-                </a:solidFill>
-                <a:latin typeface="+mn-lt"/>
-                <a:ea typeface="+mn-ea"/>
-                <a:cs typeface="+mn-cs"/>
-              </a:rPr>
-              <a:t>() </a:t>
-            </a:r>
+              <a:t>	Em sistemas sessão é utilizado para guardar objetos, entre a navegação das páginas. É utilizado também para guardar dados do usuário após autenticação.</a:t>
+            </a:r>
+          </a:p>
+          <a:p>
             <a:r>
               <a:rPr lang="pt-BR" sz="1200" b="0" i="0" u="none" strike="noStrike" kern="1200" baseline="0" dirty="0" smtClean="0">
                 <a:solidFill>
@@ -3429,8 +2804,198 @@
                 <a:ea typeface="+mn-ea"/>
                 <a:cs typeface="+mn-cs"/>
               </a:rPr>
-              <a:t>que permite obter o contexto associado.</a:t>
-            </a:r>
+              <a:t>Protocolo: </a:t>
+            </a:r>
+            <a:r>
+              <a:rPr lang="pt-BR" sz="1200" b="0" i="0" kern="1200" dirty="0" smtClean="0">
+                <a:solidFill>
+                  <a:schemeClr val="tx1"/>
+                </a:solidFill>
+                <a:effectLst/>
+                <a:latin typeface="+mn-lt"/>
+                <a:ea typeface="+mn-ea"/>
+                <a:cs typeface="+mn-cs"/>
+              </a:rPr>
+              <a:t>É uma convenção que controla e possibilita uma conexão, comunicação, transferência de dados entre dois sistemas computacionais.</a:t>
+            </a:r>
+          </a:p>
+          <a:p>
+            <a:r>
+              <a:rPr lang="pt-BR" sz="1200" b="0" i="0" u="none" strike="noStrike" kern="1200" baseline="0" dirty="0" smtClean="0">
+                <a:solidFill>
+                  <a:schemeClr val="tx1"/>
+                </a:solidFill>
+                <a:effectLst/>
+                <a:latin typeface="+mn-lt"/>
+                <a:ea typeface="+mn-ea"/>
+                <a:cs typeface="+mn-cs"/>
+              </a:rPr>
+              <a:t>HTTP: "Protocolo de Transferência de Hipertexto". É um protocolo de comunicação entre sistemas de informação que permite a transferência de dados entre redes de computadores, principalmente na World </a:t>
+            </a:r>
+            <a:r>
+              <a:rPr lang="pt-BR" sz="1200" b="0" i="0" u="none" strike="noStrike" kern="1200" baseline="0" dirty="0" err="1" smtClean="0">
+                <a:solidFill>
+                  <a:schemeClr val="tx1"/>
+                </a:solidFill>
+                <a:effectLst/>
+                <a:latin typeface="+mn-lt"/>
+                <a:ea typeface="+mn-ea"/>
+                <a:cs typeface="+mn-cs"/>
+              </a:rPr>
+              <a:t>Wide</a:t>
+            </a:r>
+            <a:r>
+              <a:rPr lang="pt-BR" sz="1200" b="0" i="0" u="none" strike="noStrike" kern="1200" baseline="0" dirty="0" smtClean="0">
+                <a:solidFill>
+                  <a:schemeClr val="tx1"/>
+                </a:solidFill>
+                <a:effectLst/>
+                <a:latin typeface="+mn-lt"/>
+                <a:ea typeface="+mn-ea"/>
+                <a:cs typeface="+mn-cs"/>
+              </a:rPr>
+              <a:t> Web (Internet).</a:t>
+            </a:r>
+          </a:p>
+          <a:p>
+            <a:endParaRPr lang="pt-BR" sz="1200" b="0" i="0" u="none" strike="noStrike" kern="1200" baseline="0" dirty="0" smtClean="0">
+              <a:solidFill>
+                <a:schemeClr val="tx1"/>
+              </a:solidFill>
+              <a:latin typeface="+mn-lt"/>
+              <a:ea typeface="+mn-ea"/>
+              <a:cs typeface="+mn-cs"/>
+            </a:endParaRPr>
+          </a:p>
+          <a:p>
+            <a:r>
+              <a:rPr lang="pt-BR" sz="1200" b="0" i="0" u="none" strike="noStrike" kern="1200" baseline="0" dirty="0" smtClean="0">
+                <a:solidFill>
+                  <a:schemeClr val="tx1"/>
+                </a:solidFill>
+                <a:latin typeface="+mn-lt"/>
+                <a:ea typeface="+mn-ea"/>
+                <a:cs typeface="+mn-cs"/>
+              </a:rPr>
+              <a:t>O protocolo HTTP é </a:t>
+            </a:r>
+            <a:r>
+              <a:rPr lang="pt-BR" sz="1200" b="0" i="0" u="none" strike="noStrike" kern="1200" baseline="0" dirty="0" err="1" smtClean="0">
+                <a:solidFill>
+                  <a:schemeClr val="tx1"/>
+                </a:solidFill>
+                <a:latin typeface="+mn-lt"/>
+                <a:ea typeface="+mn-ea"/>
+                <a:cs typeface="+mn-cs"/>
+              </a:rPr>
+              <a:t>stateless</a:t>
+            </a:r>
+            <a:r>
+              <a:rPr lang="pt-BR" sz="1200" b="0" i="0" u="none" strike="noStrike" kern="1200" baseline="0" dirty="0" smtClean="0">
+                <a:solidFill>
+                  <a:schemeClr val="tx1"/>
+                </a:solidFill>
+                <a:latin typeface="+mn-lt"/>
+                <a:ea typeface="+mn-ea"/>
+                <a:cs typeface="+mn-cs"/>
+              </a:rPr>
+              <a:t>.(não mantém estado)</a:t>
+            </a:r>
+          </a:p>
+          <a:p>
+            <a:r>
+              <a:rPr lang="pt-BR" sz="1200" b="0" i="0" u="none" strike="noStrike" kern="1200" baseline="0" dirty="0" smtClean="0">
+                <a:solidFill>
+                  <a:schemeClr val="tx1"/>
+                </a:solidFill>
+                <a:latin typeface="+mn-lt"/>
+                <a:ea typeface="+mn-ea"/>
+                <a:cs typeface="+mn-cs"/>
+              </a:rPr>
+              <a:t>Então é aí que entram os cookies e sessões.</a:t>
+            </a:r>
+          </a:p>
+          <a:p>
+            <a:endParaRPr lang="pt-BR" sz="1200" b="0" i="0" u="none" strike="noStrike" kern="1200" baseline="0" dirty="0" smtClean="0">
+              <a:solidFill>
+                <a:schemeClr val="tx1"/>
+              </a:solidFill>
+              <a:latin typeface="+mn-lt"/>
+              <a:ea typeface="+mn-ea"/>
+              <a:cs typeface="+mn-cs"/>
+            </a:endParaRPr>
+          </a:p>
+          <a:p>
+            <a:r>
+              <a:rPr lang="pt-BR" sz="1200" b="0" i="0" u="none" strike="noStrike" kern="1200" baseline="0" dirty="0" smtClean="0">
+                <a:solidFill>
+                  <a:schemeClr val="tx1"/>
+                </a:solidFill>
+                <a:latin typeface="+mn-lt"/>
+                <a:ea typeface="+mn-ea"/>
+                <a:cs typeface="+mn-cs"/>
+              </a:rPr>
+              <a:t>Em Java o objeto </a:t>
+            </a:r>
+            <a:r>
+              <a:rPr lang="pt-BR" sz="1200" b="0" i="0" u="none" strike="noStrike" kern="1200" baseline="0" dirty="0" err="1" smtClean="0">
+                <a:solidFill>
+                  <a:schemeClr val="tx1"/>
+                </a:solidFill>
+                <a:latin typeface="+mn-lt"/>
+                <a:ea typeface="+mn-ea"/>
+                <a:cs typeface="+mn-cs"/>
+              </a:rPr>
+              <a:t>HttpSession</a:t>
+            </a:r>
+            <a:r>
+              <a:rPr lang="pt-BR" sz="1200" b="0" i="0" u="none" strike="noStrike" kern="1200" baseline="0" dirty="0" smtClean="0">
+                <a:solidFill>
+                  <a:schemeClr val="tx1"/>
+                </a:solidFill>
+                <a:latin typeface="+mn-lt"/>
+                <a:ea typeface="+mn-ea"/>
+                <a:cs typeface="+mn-cs"/>
+              </a:rPr>
+              <a:t> representa uma sessão, que é obtida a partir de uma requisição.</a:t>
+            </a:r>
+          </a:p>
+          <a:p>
+            <a:r>
+              <a:rPr lang="pt-BR" sz="1200" b="0" i="0" u="none" strike="noStrike" kern="1200" baseline="0" dirty="0" smtClean="0">
+                <a:solidFill>
+                  <a:schemeClr val="tx1"/>
+                </a:solidFill>
+                <a:latin typeface="+mn-lt"/>
+                <a:ea typeface="+mn-ea"/>
+                <a:cs typeface="+mn-cs"/>
+              </a:rPr>
+              <a:t>Para saber se uma sessão é nova, use o método </a:t>
+            </a:r>
+            <a:r>
+              <a:rPr lang="pt-BR" sz="1200" b="0" i="0" u="none" strike="noStrike" kern="1200" baseline="0" dirty="0" err="1" smtClean="0">
+                <a:solidFill>
+                  <a:schemeClr val="tx1"/>
+                </a:solidFill>
+                <a:latin typeface="+mn-lt"/>
+                <a:ea typeface="+mn-ea"/>
+                <a:cs typeface="+mn-cs"/>
+              </a:rPr>
+              <a:t>isNew</a:t>
+            </a:r>
+            <a:r>
+              <a:rPr lang="pt-BR" sz="1200" b="0" i="0" u="none" strike="noStrike" kern="1200" baseline="0" dirty="0" smtClean="0">
+                <a:solidFill>
+                  <a:schemeClr val="tx1"/>
+                </a:solidFill>
+                <a:latin typeface="+mn-lt"/>
+                <a:ea typeface="+mn-ea"/>
+                <a:cs typeface="+mn-cs"/>
+              </a:rPr>
+              <a:t>():</a:t>
+            </a:r>
+          </a:p>
+          <a:p>
             <a:endParaRPr lang="pt-BR" sz="1200" b="0" i="0" u="none" strike="noStrike" kern="1200" baseline="0" dirty="0" smtClean="0">
               <a:solidFill>
                 <a:schemeClr val="tx1"/>
@@ -3532,10 +3097,8 @@
                 <a:ea typeface="+mn-ea"/>
                 <a:cs typeface="+mn-cs"/>
               </a:rPr>
-              <a:t>Sessão é utilizado para guardar objetos, entre a navegação das páginas.</a:t>
-            </a:r>
-          </a:p>
-          <a:p>
+              <a:t>Cookies </a:t>
+            </a:r>
             <a:r>
               <a:rPr lang="pt-BR" sz="1200" b="0" i="0" u="none" strike="noStrike" kern="1200" baseline="0" dirty="0" smtClean="0">
                 <a:solidFill>
@@ -3544,8 +3107,33 @@
                 <a:latin typeface="+mn-lt"/>
                 <a:ea typeface="+mn-ea"/>
                 <a:cs typeface="+mn-cs"/>
-              </a:rPr>
-              <a:t>É utilizado também para guardar dados do usuário após autenticação.</a:t>
+                <a:sym typeface="Wingdings" panose="05000000000000000000" pitchFamily="2" charset="2"/>
+              </a:rPr>
+              <a:t></a:t>
+            </a:r>
+            <a:r>
+              <a:rPr lang="pt-BR" sz="1200" b="0" i="0" u="none" strike="noStrike" kern="1200" baseline="0" dirty="0" smtClean="0">
+                <a:solidFill>
+                  <a:schemeClr val="tx1"/>
+                </a:solidFill>
+                <a:latin typeface="+mn-lt"/>
+                <a:ea typeface="+mn-ea"/>
+                <a:cs typeface="+mn-cs"/>
+              </a:rPr>
+              <a:t> Geralmente são implementados em sessão, os cookies são gravados no cliente. E servem para guardar preferências do usuário.</a:t>
+            </a:r>
+          </a:p>
+          <a:p>
+            <a:r>
+              <a:rPr lang="pt-BR" sz="1200" b="0" i="0" u="none" strike="noStrike" kern="1200" baseline="0" dirty="0" smtClean="0">
+                <a:solidFill>
+                  <a:schemeClr val="tx1"/>
+                </a:solidFill>
+                <a:latin typeface="+mn-lt"/>
+                <a:ea typeface="+mn-ea"/>
+                <a:cs typeface="+mn-cs"/>
+              </a:rPr>
+              <a:t>	Eles deixam de existir quando o browser do usuário é fechado, mas podemos criar cookies persistentes que nós definimos o tempo dele.</a:t>
             </a:r>
           </a:p>
           <a:p>
@@ -3568,18 +3156,7 @@
                 <a:ea typeface="+mn-ea"/>
                 <a:cs typeface="+mn-cs"/>
               </a:rPr>
-              <a:t>O protocolo HTTP é </a:t>
-            </a:r>
-            <a:r>
-              <a:rPr lang="pt-BR" sz="1200" b="0" i="0" u="none" strike="noStrike" kern="1200" baseline="0" dirty="0" err="1" smtClean="0">
-                <a:solidFill>
-                  <a:schemeClr val="tx1"/>
-                </a:solidFill>
-                <a:latin typeface="+mn-lt"/>
-                <a:ea typeface="+mn-ea"/>
-                <a:cs typeface="+mn-cs"/>
-              </a:rPr>
-              <a:t>stateless</a:t>
+              <a:t>Atributos de sessão </a:t>
             </a:r>
             <a:r>
               <a:rPr lang="pt-BR" sz="1200" b="0" i="0" u="none" strike="noStrike" kern="1200" baseline="0" dirty="0" smtClean="0">
@@ -3589,11 +3166,10 @@
                 <a:latin typeface="+mn-lt"/>
                 <a:ea typeface="+mn-ea"/>
                 <a:cs typeface="+mn-cs"/>
-              </a:rPr>
-              <a:t>.(não mantém estado)</a:t>
-            </a:r>
-          </a:p>
-          <a:p>
+                <a:sym typeface="Wingdings" panose="05000000000000000000" pitchFamily="2" charset="2"/>
+              </a:rPr>
+              <a:t> </a:t>
+            </a:r>
             <a:r>
               <a:rPr lang="pt-BR" sz="1200" b="0" i="0" u="none" strike="noStrike" kern="1200" baseline="0" dirty="0" smtClean="0">
                 <a:solidFill>
@@ -3603,10 +3179,393 @@
                 <a:ea typeface="+mn-ea"/>
                 <a:cs typeface="+mn-cs"/>
               </a:rPr>
-              <a:t>Então é aí que entram os cookies e sessões.</a:t>
-            </a:r>
-          </a:p>
-          <a:p>
+              <a:t> </a:t>
+            </a:r>
+            <a:r>
+              <a:rPr lang="pt-BR" sz="1200" b="0" i="0" u="none" strike="noStrike" kern="1200" baseline="0" dirty="0" smtClean="0">
+                <a:solidFill>
+                  <a:schemeClr val="tx1"/>
+                </a:solidFill>
+                <a:latin typeface="+mn-lt"/>
+                <a:ea typeface="+mn-ea"/>
+                <a:cs typeface="+mn-cs"/>
+              </a:rPr>
+              <a:t>São utilizados para guardar informações na sessão. Ex. Dados de usuário, informações pertinentes a navegação.</a:t>
+            </a:r>
+          </a:p>
+          <a:p>
+            <a:r>
+              <a:rPr lang="pt-BR" sz="1200" b="0" i="0" u="none" strike="noStrike" kern="1200" baseline="0" dirty="0" smtClean="0">
+                <a:solidFill>
+                  <a:schemeClr val="tx1"/>
+                </a:solidFill>
+                <a:latin typeface="+mn-lt"/>
+                <a:ea typeface="+mn-ea"/>
+                <a:cs typeface="+mn-cs"/>
+              </a:rPr>
+              <a:t>Validade de uma sessão </a:t>
+            </a:r>
+            <a:r>
+              <a:rPr lang="pt-BR" sz="1200" b="0" i="0" u="none" strike="noStrike" kern="1200" baseline="0" dirty="0" smtClean="0">
+                <a:solidFill>
+                  <a:schemeClr val="tx1"/>
+                </a:solidFill>
+                <a:latin typeface="+mn-lt"/>
+                <a:ea typeface="+mn-ea"/>
+                <a:cs typeface="+mn-cs"/>
+                <a:sym typeface="Wingdings" panose="05000000000000000000" pitchFamily="2" charset="2"/>
+              </a:rPr>
+              <a:t> Tempo default de uma sessão é 30 minutos.</a:t>
+            </a:r>
+          </a:p>
+          <a:p>
+            <a:r>
+              <a:rPr lang="pt-BR" sz="1200" b="0" i="0" u="none" strike="noStrike" kern="1200" baseline="0" dirty="0" smtClean="0">
+                <a:solidFill>
+                  <a:schemeClr val="tx1"/>
+                </a:solidFill>
+                <a:latin typeface="+mn-lt"/>
+                <a:ea typeface="+mn-ea"/>
+                <a:cs typeface="+mn-cs"/>
+                <a:sym typeface="Wingdings" panose="05000000000000000000" pitchFamily="2" charset="2"/>
+              </a:rPr>
+              <a:t>Podemos alterar o tempo de sessão de 3 formas diferentes.</a:t>
+            </a:r>
+          </a:p>
+          <a:p>
+            <a:r>
+              <a:rPr lang="pt-BR" sz="1200" b="0" i="0" u="none" strike="noStrike" kern="1200" baseline="0" dirty="0" smtClean="0">
+                <a:solidFill>
+                  <a:schemeClr val="tx1"/>
+                </a:solidFill>
+                <a:latin typeface="+mn-lt"/>
+                <a:ea typeface="+mn-ea"/>
+                <a:cs typeface="+mn-cs"/>
+                <a:sym typeface="Wingdings" panose="05000000000000000000" pitchFamily="2" charset="2"/>
+              </a:rPr>
+              <a:t>1- Servidor de aplicação</a:t>
+            </a:r>
+          </a:p>
+          <a:p>
+            <a:pPr lvl="1" fontAlgn="base"/>
+            <a:r>
+              <a:rPr lang="pt-BR" sz="1200" b="1" i="0" kern="1200" dirty="0" smtClean="0">
+                <a:solidFill>
+                  <a:schemeClr val="tx1"/>
+                </a:solidFill>
+                <a:effectLst/>
+                <a:latin typeface="+mn-lt"/>
+                <a:ea typeface="+mn-ea"/>
+                <a:cs typeface="+mn-cs"/>
+              </a:rPr>
+              <a:t>&lt;</a:t>
+            </a:r>
+            <a:r>
+              <a:rPr lang="pt-BR" sz="1200" b="1" i="0" kern="1200" dirty="0" err="1" smtClean="0">
+                <a:solidFill>
+                  <a:schemeClr val="tx1"/>
+                </a:solidFill>
+                <a:effectLst/>
+                <a:latin typeface="+mn-lt"/>
+                <a:ea typeface="+mn-ea"/>
+                <a:cs typeface="+mn-cs"/>
+              </a:rPr>
+              <a:t>subsystem</a:t>
+            </a:r>
+            <a:r>
+              <a:rPr lang="pt-BR" sz="1200" b="0" i="0" kern="1200" dirty="0" smtClean="0">
+                <a:solidFill>
+                  <a:schemeClr val="tx1"/>
+                </a:solidFill>
+                <a:effectLst/>
+                <a:latin typeface="+mn-lt"/>
+                <a:ea typeface="+mn-ea"/>
+                <a:cs typeface="+mn-cs"/>
+              </a:rPr>
+              <a:t> </a:t>
+            </a:r>
+            <a:r>
+              <a:rPr lang="pt-BR" sz="1200" b="0" i="0" kern="1200" dirty="0" err="1" smtClean="0">
+                <a:solidFill>
+                  <a:schemeClr val="tx1"/>
+                </a:solidFill>
+                <a:effectLst/>
+                <a:latin typeface="+mn-lt"/>
+                <a:ea typeface="+mn-ea"/>
+                <a:cs typeface="+mn-cs"/>
+              </a:rPr>
+              <a:t>xmlns</a:t>
+            </a:r>
+            <a:r>
+              <a:rPr lang="pt-BR" sz="1200" b="0" i="0" kern="1200" dirty="0" smtClean="0">
+                <a:solidFill>
+                  <a:schemeClr val="tx1"/>
+                </a:solidFill>
+                <a:effectLst/>
+                <a:latin typeface="+mn-lt"/>
+                <a:ea typeface="+mn-ea"/>
+                <a:cs typeface="+mn-cs"/>
+              </a:rPr>
+              <a:t>="urn:jboss:domain:undertow:3.1"</a:t>
+            </a:r>
+            <a:r>
+              <a:rPr lang="pt-BR" sz="1200" b="1" i="0" kern="1200" dirty="0" smtClean="0">
+                <a:solidFill>
+                  <a:schemeClr val="tx1"/>
+                </a:solidFill>
+                <a:effectLst/>
+                <a:latin typeface="+mn-lt"/>
+                <a:ea typeface="+mn-ea"/>
+                <a:cs typeface="+mn-cs"/>
+              </a:rPr>
+              <a:t>&gt;</a:t>
+            </a:r>
+            <a:endParaRPr lang="pt-BR" sz="1200" b="0" i="0" kern="1200" dirty="0" smtClean="0">
+              <a:solidFill>
+                <a:schemeClr val="tx1"/>
+              </a:solidFill>
+              <a:effectLst/>
+              <a:latin typeface="+mn-lt"/>
+              <a:ea typeface="+mn-ea"/>
+              <a:cs typeface="+mn-cs"/>
+            </a:endParaRPr>
+          </a:p>
+          <a:p>
+            <a:pPr lvl="1" fontAlgn="base"/>
+            <a:r>
+              <a:rPr lang="pt-BR" sz="1200" b="0" i="0" kern="1200" dirty="0" smtClean="0">
+                <a:solidFill>
+                  <a:schemeClr val="tx1"/>
+                </a:solidFill>
+                <a:effectLst/>
+                <a:latin typeface="+mn-lt"/>
+                <a:ea typeface="+mn-ea"/>
+                <a:cs typeface="+mn-cs"/>
+              </a:rPr>
+              <a:t>	</a:t>
+            </a:r>
+            <a:r>
+              <a:rPr lang="pt-BR" sz="1200" b="1" i="0" kern="1200" dirty="0" smtClean="0">
+                <a:solidFill>
+                  <a:schemeClr val="tx1"/>
+                </a:solidFill>
+                <a:effectLst/>
+                <a:latin typeface="+mn-lt"/>
+                <a:ea typeface="+mn-ea"/>
+                <a:cs typeface="+mn-cs"/>
+              </a:rPr>
+              <a:t>&lt;</a:t>
+            </a:r>
+            <a:r>
+              <a:rPr lang="pt-BR" sz="1200" b="1" i="0" kern="1200" dirty="0" err="1" smtClean="0">
+                <a:solidFill>
+                  <a:schemeClr val="tx1"/>
+                </a:solidFill>
+                <a:effectLst/>
+                <a:latin typeface="+mn-lt"/>
+                <a:ea typeface="+mn-ea"/>
+                <a:cs typeface="+mn-cs"/>
+              </a:rPr>
+              <a:t>servlet</a:t>
+            </a:r>
+            <a:r>
+              <a:rPr lang="pt-BR" sz="1200" b="1" i="0" kern="1200" dirty="0" smtClean="0">
+                <a:solidFill>
+                  <a:schemeClr val="tx1"/>
+                </a:solidFill>
+                <a:effectLst/>
+                <a:latin typeface="+mn-lt"/>
+                <a:ea typeface="+mn-ea"/>
+                <a:cs typeface="+mn-cs"/>
+              </a:rPr>
+              <a:t>-container</a:t>
+            </a:r>
+            <a:r>
+              <a:rPr lang="pt-BR" sz="1200" b="0" i="0" kern="1200" dirty="0" smtClean="0">
+                <a:solidFill>
+                  <a:schemeClr val="tx1"/>
+                </a:solidFill>
+                <a:effectLst/>
+                <a:latin typeface="+mn-lt"/>
+                <a:ea typeface="+mn-ea"/>
+                <a:cs typeface="+mn-cs"/>
+              </a:rPr>
+              <a:t> </a:t>
+            </a:r>
+            <a:r>
+              <a:rPr lang="pt-BR" sz="1200" b="0" i="0" kern="1200" dirty="0" err="1" smtClean="0">
+                <a:solidFill>
+                  <a:schemeClr val="tx1"/>
+                </a:solidFill>
+                <a:effectLst/>
+                <a:latin typeface="+mn-lt"/>
+                <a:ea typeface="+mn-ea"/>
+                <a:cs typeface="+mn-cs"/>
+              </a:rPr>
+              <a:t>name</a:t>
+            </a:r>
+            <a:r>
+              <a:rPr lang="pt-BR" sz="1200" b="0" i="0" kern="1200" dirty="0" smtClean="0">
+                <a:solidFill>
+                  <a:schemeClr val="tx1"/>
+                </a:solidFill>
+                <a:effectLst/>
+                <a:latin typeface="+mn-lt"/>
+                <a:ea typeface="+mn-ea"/>
+                <a:cs typeface="+mn-cs"/>
+              </a:rPr>
+              <a:t>="default" default-</a:t>
+            </a:r>
+            <a:r>
+              <a:rPr lang="pt-BR" sz="1200" b="0" i="0" kern="1200" dirty="0" err="1" smtClean="0">
+                <a:solidFill>
+                  <a:schemeClr val="tx1"/>
+                </a:solidFill>
+                <a:effectLst/>
+                <a:latin typeface="+mn-lt"/>
+                <a:ea typeface="+mn-ea"/>
+                <a:cs typeface="+mn-cs"/>
+              </a:rPr>
+              <a:t>session</a:t>
+            </a:r>
+            <a:r>
+              <a:rPr lang="pt-BR" sz="1200" b="0" i="0" kern="1200" dirty="0" smtClean="0">
+                <a:solidFill>
+                  <a:schemeClr val="tx1"/>
+                </a:solidFill>
+                <a:effectLst/>
+                <a:latin typeface="+mn-lt"/>
+                <a:ea typeface="+mn-ea"/>
+                <a:cs typeface="+mn-cs"/>
+              </a:rPr>
+              <a:t>-timeout="30"</a:t>
+            </a:r>
+            <a:r>
+              <a:rPr lang="pt-BR" sz="1200" b="1" i="0" kern="1200" dirty="0" smtClean="0">
+                <a:solidFill>
+                  <a:schemeClr val="tx1"/>
+                </a:solidFill>
+                <a:effectLst/>
+                <a:latin typeface="+mn-lt"/>
+                <a:ea typeface="+mn-ea"/>
+                <a:cs typeface="+mn-cs"/>
+              </a:rPr>
+              <a:t>&gt;</a:t>
+            </a:r>
+            <a:r>
+              <a:rPr lang="pt-BR" sz="1200" b="0" i="0" kern="1200" dirty="0" smtClean="0">
+                <a:solidFill>
+                  <a:schemeClr val="tx1"/>
+                </a:solidFill>
+                <a:effectLst/>
+                <a:latin typeface="+mn-lt"/>
+                <a:ea typeface="+mn-ea"/>
+                <a:cs typeface="+mn-cs"/>
+              </a:rPr>
+              <a:t>  </a:t>
+            </a:r>
+          </a:p>
+          <a:p>
+            <a:pPr lvl="1" fontAlgn="base"/>
+            <a:r>
+              <a:rPr lang="pt-BR" sz="1200" b="1" i="0" kern="1200" dirty="0" smtClean="0">
+                <a:solidFill>
+                  <a:schemeClr val="tx1"/>
+                </a:solidFill>
+                <a:effectLst/>
+                <a:latin typeface="+mn-lt"/>
+                <a:ea typeface="+mn-ea"/>
+                <a:cs typeface="+mn-cs"/>
+              </a:rPr>
+              <a:t>	&lt;/</a:t>
+            </a:r>
+            <a:r>
+              <a:rPr lang="pt-BR" sz="1200" b="1" i="0" kern="1200" dirty="0" err="1" smtClean="0">
+                <a:solidFill>
+                  <a:schemeClr val="tx1"/>
+                </a:solidFill>
+                <a:effectLst/>
+                <a:latin typeface="+mn-lt"/>
+                <a:ea typeface="+mn-ea"/>
+                <a:cs typeface="+mn-cs"/>
+              </a:rPr>
+              <a:t>servlet</a:t>
+            </a:r>
+            <a:r>
+              <a:rPr lang="pt-BR" sz="1200" b="1" i="0" kern="1200" dirty="0" smtClean="0">
+                <a:solidFill>
+                  <a:schemeClr val="tx1"/>
+                </a:solidFill>
+                <a:effectLst/>
+                <a:latin typeface="+mn-lt"/>
+                <a:ea typeface="+mn-ea"/>
+                <a:cs typeface="+mn-cs"/>
+              </a:rPr>
+              <a:t>-container&gt;</a:t>
+            </a:r>
+            <a:r>
+              <a:rPr lang="pt-BR" sz="1200" b="0" i="0" kern="1200" dirty="0" smtClean="0">
+                <a:solidFill>
+                  <a:schemeClr val="tx1"/>
+                </a:solidFill>
+                <a:effectLst/>
+                <a:latin typeface="+mn-lt"/>
+                <a:ea typeface="+mn-ea"/>
+                <a:cs typeface="+mn-cs"/>
+              </a:rPr>
+              <a:t>  </a:t>
+            </a:r>
+          </a:p>
+          <a:p>
+            <a:pPr lvl="1" fontAlgn="base"/>
+            <a:r>
+              <a:rPr lang="pt-BR" sz="1200" b="1" i="0" kern="1200" dirty="0" smtClean="0">
+                <a:solidFill>
+                  <a:schemeClr val="tx1"/>
+                </a:solidFill>
+                <a:effectLst/>
+                <a:latin typeface="+mn-lt"/>
+                <a:ea typeface="+mn-ea"/>
+                <a:cs typeface="+mn-cs"/>
+              </a:rPr>
+              <a:t>&lt;/</a:t>
+            </a:r>
+            <a:r>
+              <a:rPr lang="pt-BR" sz="1200" b="1" i="0" kern="1200" dirty="0" err="1" smtClean="0">
+                <a:solidFill>
+                  <a:schemeClr val="tx1"/>
+                </a:solidFill>
+                <a:effectLst/>
+                <a:latin typeface="+mn-lt"/>
+                <a:ea typeface="+mn-ea"/>
+                <a:cs typeface="+mn-cs"/>
+              </a:rPr>
+              <a:t>subsystem</a:t>
+            </a:r>
+            <a:r>
+              <a:rPr lang="pt-BR" sz="1200" b="1" i="0" kern="1200" dirty="0" smtClean="0">
+                <a:solidFill>
+                  <a:schemeClr val="tx1"/>
+                </a:solidFill>
+                <a:effectLst/>
+                <a:latin typeface="+mn-lt"/>
+                <a:ea typeface="+mn-ea"/>
+                <a:cs typeface="+mn-cs"/>
+              </a:rPr>
+              <a:t>&gt;</a:t>
+            </a:r>
+            <a:r>
+              <a:rPr lang="pt-BR" sz="1200" b="0" i="0" kern="1200" dirty="0" smtClean="0">
+                <a:solidFill>
+                  <a:schemeClr val="tx1"/>
+                </a:solidFill>
+                <a:effectLst/>
+                <a:latin typeface="+mn-lt"/>
+                <a:ea typeface="+mn-ea"/>
+                <a:cs typeface="+mn-cs"/>
+              </a:rPr>
+              <a:t>  </a:t>
+            </a:r>
             <a:endParaRPr lang="pt-BR" sz="1200" b="0" i="0" u="none" strike="noStrike" kern="1200" baseline="0" dirty="0" smtClean="0">
               <a:solidFill>
                 <a:schemeClr val="tx1"/>
@@ -3614,6 +3573,7 @@
               <a:latin typeface="+mn-lt"/>
               <a:ea typeface="+mn-ea"/>
               <a:cs typeface="+mn-cs"/>
+              <a:sym typeface="Wingdings" panose="05000000000000000000" pitchFamily="2" charset="2"/>
             </a:endParaRPr>
           </a:p>
           <a:p>
@@ -3625,8 +3585,9 @@
                 <a:latin typeface="+mn-lt"/>
                 <a:ea typeface="+mn-ea"/>
                 <a:cs typeface="+mn-cs"/>
-              </a:rPr>
-              <a:t>Em Java o objeto </a:t>
+                <a:sym typeface="Wingdings" panose="05000000000000000000" pitchFamily="2" charset="2"/>
+              </a:rPr>
+              <a:t>2- Container (web.xml, essa configuração não é feita via </a:t>
             </a:r>
             <a:r>
               <a:rPr lang="pt-BR" sz="1200" b="0" i="0" u="none" strike="noStrike" kern="1200" baseline="0" dirty="0" err="1" smtClean="0">
@@ -3636,8 +3597,9 @@
                 <a:latin typeface="+mn-lt"/>
                 <a:ea typeface="+mn-ea"/>
                 <a:cs typeface="+mn-cs"/>
-              </a:rPr>
-              <a:t>HttpSession</a:t>
+                <a:sym typeface="Wingdings" panose="05000000000000000000" pitchFamily="2" charset="2"/>
+              </a:rPr>
+              <a:t>annotation</a:t>
             </a:r>
             <a:r>
               <a:rPr lang="pt-BR" sz="1200" b="0" i="0" u="none" strike="noStrike" kern="1200" baseline="0" dirty="0" smtClean="0">
@@ -3647,11 +3609,13 @@
                 <a:latin typeface="+mn-lt"/>
                 <a:ea typeface="+mn-ea"/>
                 <a:cs typeface="+mn-cs"/>
-              </a:rPr>
-              <a:t> representa uma sessão, que é obtida a partir de uma requisição.</a:t>
-            </a:r>
-          </a:p>
-          <a:p>
+                <a:sym typeface="Wingdings" panose="05000000000000000000" pitchFamily="2" charset="2"/>
+              </a:rPr>
+              <a:t>)</a:t>
+            </a:r>
+          </a:p>
+          <a:p>
+            <a:pPr lvl="1"/>
             <a:r>
               <a:rPr lang="pt-BR" sz="1200" b="0" i="0" u="none" strike="noStrike" kern="1200" baseline="0" dirty="0" smtClean="0">
                 <a:solidFill>
@@ -3661,7 +3625,7 @@
                 <a:ea typeface="+mn-ea"/>
                 <a:cs typeface="+mn-cs"/>
               </a:rPr>
-              <a:t>Para saber se uma sessão é nova, use o método </a:t>
+              <a:t>&lt;</a:t>
             </a:r>
             <a:r>
               <a:rPr lang="pt-BR" sz="1200" b="0" i="0" u="none" strike="noStrike" kern="1200" baseline="0" dirty="0" err="1" smtClean="0">
@@ -3672,7 +3636,7 @@
                 <a:ea typeface="+mn-ea"/>
                 <a:cs typeface="+mn-cs"/>
               </a:rPr>
-              <a:t>isNew</a:t>
+              <a:t>session-config</a:t>
             </a:r>
             <a:r>
               <a:rPr lang="pt-BR" sz="1200" b="0" i="0" u="none" strike="noStrike" kern="1200" baseline="0" dirty="0" smtClean="0">
@@ -3683,10 +3647,307 @@
                 <a:ea typeface="+mn-ea"/>
                 <a:cs typeface="+mn-cs"/>
               </a:rPr>
-              <a:t>():</a:t>
-            </a:r>
-          </a:p>
-          <a:p>
+              <a:t>&gt;</a:t>
+            </a:r>
+          </a:p>
+          <a:p>
+            <a:pPr lvl="1"/>
+            <a:r>
+              <a:rPr lang="pt-BR" sz="1200" b="0" i="0" u="none" strike="noStrike" kern="1200" baseline="0" dirty="0" smtClean="0">
+                <a:solidFill>
+                  <a:schemeClr val="tx1"/>
+                </a:solidFill>
+                <a:latin typeface="+mn-lt"/>
+                <a:ea typeface="+mn-ea"/>
+                <a:cs typeface="+mn-cs"/>
+              </a:rPr>
+              <a:t>	&lt;</a:t>
+            </a:r>
+            <a:r>
+              <a:rPr lang="pt-BR" sz="1200" b="0" i="0" u="none" strike="noStrike" kern="1200" baseline="0" dirty="0" err="1" smtClean="0">
+                <a:solidFill>
+                  <a:schemeClr val="tx1"/>
+                </a:solidFill>
+                <a:latin typeface="+mn-lt"/>
+                <a:ea typeface="+mn-ea"/>
+                <a:cs typeface="+mn-cs"/>
+              </a:rPr>
+              <a:t>session</a:t>
+            </a:r>
+            <a:r>
+              <a:rPr lang="pt-BR" sz="1200" b="0" i="0" u="none" strike="noStrike" kern="1200" baseline="0" dirty="0" smtClean="0">
+                <a:solidFill>
+                  <a:schemeClr val="tx1"/>
+                </a:solidFill>
+                <a:latin typeface="+mn-lt"/>
+                <a:ea typeface="+mn-ea"/>
+                <a:cs typeface="+mn-cs"/>
+              </a:rPr>
+              <a:t>-timeout&gt;15&lt;/</a:t>
+            </a:r>
+            <a:r>
+              <a:rPr lang="pt-BR" sz="1200" b="0" i="0" u="none" strike="noStrike" kern="1200" baseline="0" dirty="0" err="1" smtClean="0">
+                <a:solidFill>
+                  <a:schemeClr val="tx1"/>
+                </a:solidFill>
+                <a:latin typeface="+mn-lt"/>
+                <a:ea typeface="+mn-ea"/>
+                <a:cs typeface="+mn-cs"/>
+              </a:rPr>
+              <a:t>session</a:t>
+            </a:r>
+            <a:r>
+              <a:rPr lang="pt-BR" sz="1200" b="0" i="0" u="none" strike="noStrike" kern="1200" baseline="0" dirty="0" smtClean="0">
+                <a:solidFill>
+                  <a:schemeClr val="tx1"/>
+                </a:solidFill>
+                <a:latin typeface="+mn-lt"/>
+                <a:ea typeface="+mn-ea"/>
+                <a:cs typeface="+mn-cs"/>
+              </a:rPr>
+              <a:t>-timeout&gt;</a:t>
+            </a:r>
+          </a:p>
+          <a:p>
+            <a:pPr lvl="1"/>
+            <a:r>
+              <a:rPr lang="pt-BR" sz="1200" b="0" i="0" u="none" strike="noStrike" kern="1200" baseline="0" dirty="0" smtClean="0">
+                <a:solidFill>
+                  <a:schemeClr val="tx1"/>
+                </a:solidFill>
+                <a:latin typeface="+mn-lt"/>
+                <a:ea typeface="+mn-ea"/>
+                <a:cs typeface="+mn-cs"/>
+              </a:rPr>
+              <a:t>&lt;/</a:t>
+            </a:r>
+            <a:r>
+              <a:rPr lang="pt-BR" sz="1200" b="0" i="0" u="none" strike="noStrike" kern="1200" baseline="0" dirty="0" err="1" smtClean="0">
+                <a:solidFill>
+                  <a:schemeClr val="tx1"/>
+                </a:solidFill>
+                <a:latin typeface="+mn-lt"/>
+                <a:ea typeface="+mn-ea"/>
+                <a:cs typeface="+mn-cs"/>
+              </a:rPr>
+              <a:t>session-config</a:t>
+            </a:r>
+            <a:r>
+              <a:rPr lang="pt-BR" sz="1200" b="0" i="0" u="none" strike="noStrike" kern="1200" baseline="0" dirty="0" smtClean="0">
+                <a:solidFill>
+                  <a:schemeClr val="tx1"/>
+                </a:solidFill>
+                <a:latin typeface="+mn-lt"/>
+                <a:ea typeface="+mn-ea"/>
+                <a:cs typeface="+mn-cs"/>
+              </a:rPr>
+              <a:t>&gt;</a:t>
+            </a:r>
+            <a:endParaRPr lang="pt-BR" sz="1200" b="0" i="0" u="none" strike="noStrike" kern="1200" baseline="0" dirty="0" smtClean="0">
+              <a:solidFill>
+                <a:schemeClr val="tx1"/>
+              </a:solidFill>
+              <a:latin typeface="+mn-lt"/>
+              <a:ea typeface="+mn-ea"/>
+              <a:cs typeface="+mn-cs"/>
+              <a:sym typeface="Wingdings" panose="05000000000000000000" pitchFamily="2" charset="2"/>
+            </a:endParaRPr>
+          </a:p>
+          <a:p>
+            <a:r>
+              <a:rPr lang="pt-BR" sz="1200" b="0" i="0" u="none" strike="noStrike" kern="1200" baseline="0" dirty="0" smtClean="0">
+                <a:solidFill>
+                  <a:schemeClr val="tx1"/>
+                </a:solidFill>
+                <a:latin typeface="+mn-lt"/>
+                <a:ea typeface="+mn-ea"/>
+                <a:cs typeface="+mn-cs"/>
+                <a:sym typeface="Wingdings" panose="05000000000000000000" pitchFamily="2" charset="2"/>
+              </a:rPr>
+              <a:t>3- </a:t>
+            </a:r>
+            <a:r>
+              <a:rPr lang="pt-BR" sz="1200" b="0" i="0" u="none" strike="noStrike" kern="1200" baseline="0" dirty="0" err="1" smtClean="0">
+                <a:solidFill>
+                  <a:schemeClr val="tx1"/>
+                </a:solidFill>
+                <a:latin typeface="+mn-lt"/>
+                <a:ea typeface="+mn-ea"/>
+                <a:cs typeface="+mn-cs"/>
+                <a:sym typeface="Wingdings" panose="05000000000000000000" pitchFamily="2" charset="2"/>
+              </a:rPr>
+              <a:t>Servlet</a:t>
+            </a:r>
+            <a:endParaRPr lang="pt-BR" sz="1200" b="0" i="0" u="none" strike="noStrike" kern="1200" baseline="0" dirty="0" smtClean="0">
+              <a:solidFill>
+                <a:schemeClr val="tx1"/>
+              </a:solidFill>
+              <a:latin typeface="+mn-lt"/>
+              <a:ea typeface="+mn-ea"/>
+              <a:cs typeface="+mn-cs"/>
+              <a:sym typeface="Wingdings" panose="05000000000000000000" pitchFamily="2" charset="2"/>
+            </a:endParaRPr>
+          </a:p>
+          <a:p>
+            <a:pPr lvl="1"/>
+            <a:r>
+              <a:rPr lang="pt-BR" sz="1200" b="0" i="0" u="none" strike="noStrike" kern="1200" baseline="0" dirty="0" smtClean="0">
+                <a:solidFill>
+                  <a:schemeClr val="tx1"/>
+                </a:solidFill>
+                <a:latin typeface="+mn-lt"/>
+                <a:ea typeface="+mn-ea"/>
+                <a:cs typeface="+mn-cs"/>
+              </a:rPr>
+              <a:t>• </a:t>
+            </a:r>
+            <a:r>
+              <a:rPr lang="pt-BR" sz="1200" b="0" i="0" u="none" strike="noStrike" kern="1200" baseline="0" dirty="0" err="1" smtClean="0">
+                <a:solidFill>
+                  <a:schemeClr val="tx1"/>
+                </a:solidFill>
+                <a:latin typeface="+mn-lt"/>
+                <a:ea typeface="+mn-ea"/>
+                <a:cs typeface="+mn-cs"/>
+              </a:rPr>
+              <a:t>void</a:t>
+            </a:r>
+            <a:r>
+              <a:rPr lang="pt-BR" sz="1200" b="0" i="0" u="none" strike="noStrike" kern="1200" baseline="0" dirty="0" smtClean="0">
+                <a:solidFill>
+                  <a:schemeClr val="tx1"/>
+                </a:solidFill>
+                <a:latin typeface="+mn-lt"/>
+                <a:ea typeface="+mn-ea"/>
+                <a:cs typeface="+mn-cs"/>
+              </a:rPr>
+              <a:t> </a:t>
+            </a:r>
+            <a:r>
+              <a:rPr lang="pt-BR" sz="1200" b="1" i="0" u="none" strike="noStrike" kern="1200" baseline="0" dirty="0" err="1" smtClean="0">
+                <a:solidFill>
+                  <a:schemeClr val="tx1"/>
+                </a:solidFill>
+                <a:latin typeface="+mn-lt"/>
+                <a:ea typeface="+mn-ea"/>
+                <a:cs typeface="+mn-cs"/>
+              </a:rPr>
+              <a:t>setMaxInactiveInterval</a:t>
+            </a:r>
+            <a:r>
+              <a:rPr lang="pt-BR" sz="1200" b="0" i="0" u="none" strike="noStrike" kern="1200" baseline="0" dirty="0" smtClean="0">
+                <a:solidFill>
+                  <a:schemeClr val="tx1"/>
+                </a:solidFill>
+                <a:latin typeface="+mn-lt"/>
+                <a:ea typeface="+mn-ea"/>
+                <a:cs typeface="+mn-cs"/>
+              </a:rPr>
+              <a:t>(</a:t>
+            </a:r>
+            <a:r>
+              <a:rPr lang="pt-BR" sz="1200" b="0" i="0" u="none" strike="noStrike" kern="1200" baseline="0" dirty="0" err="1" smtClean="0">
+                <a:solidFill>
+                  <a:schemeClr val="tx1"/>
+                </a:solidFill>
+                <a:latin typeface="+mn-lt"/>
+                <a:ea typeface="+mn-ea"/>
+                <a:cs typeface="+mn-cs"/>
+              </a:rPr>
+              <a:t>int</a:t>
+            </a:r>
+            <a:r>
+              <a:rPr lang="pt-BR" sz="1200" b="0" i="0" u="none" strike="noStrike" kern="1200" baseline="0" dirty="0" smtClean="0">
+                <a:solidFill>
+                  <a:schemeClr val="tx1"/>
+                </a:solidFill>
+                <a:latin typeface="+mn-lt"/>
+                <a:ea typeface="+mn-ea"/>
+                <a:cs typeface="+mn-cs"/>
+              </a:rPr>
+              <a:t>) – define novo valor para timeout</a:t>
+            </a:r>
+          </a:p>
+          <a:p>
+            <a:pPr lvl="1"/>
+            <a:r>
+              <a:rPr lang="pt-BR" sz="1200" b="0" i="0" u="none" strike="noStrike" kern="1200" baseline="0" dirty="0" smtClean="0">
+                <a:solidFill>
+                  <a:schemeClr val="tx1"/>
+                </a:solidFill>
+                <a:latin typeface="+mn-lt"/>
+                <a:ea typeface="+mn-ea"/>
+                <a:cs typeface="+mn-cs"/>
+              </a:rPr>
+              <a:t>• </a:t>
+            </a:r>
+            <a:r>
+              <a:rPr lang="pt-BR" sz="1200" b="0" i="0" u="none" strike="noStrike" kern="1200" baseline="0" dirty="0" err="1" smtClean="0">
+                <a:solidFill>
+                  <a:schemeClr val="tx1"/>
+                </a:solidFill>
+                <a:latin typeface="+mn-lt"/>
+                <a:ea typeface="+mn-ea"/>
+                <a:cs typeface="+mn-cs"/>
+              </a:rPr>
+              <a:t>int</a:t>
+            </a:r>
+            <a:r>
+              <a:rPr lang="pt-BR" sz="1200" b="0" i="0" u="none" strike="noStrike" kern="1200" baseline="0" dirty="0" smtClean="0">
+                <a:solidFill>
+                  <a:schemeClr val="tx1"/>
+                </a:solidFill>
+                <a:latin typeface="+mn-lt"/>
+                <a:ea typeface="+mn-ea"/>
+                <a:cs typeface="+mn-cs"/>
+              </a:rPr>
+              <a:t> </a:t>
+            </a:r>
+            <a:r>
+              <a:rPr lang="pt-BR" sz="1200" b="1" i="0" u="none" strike="noStrike" kern="1200" baseline="0" dirty="0" err="1" smtClean="0">
+                <a:solidFill>
+                  <a:schemeClr val="tx1"/>
+                </a:solidFill>
+                <a:latin typeface="+mn-lt"/>
+                <a:ea typeface="+mn-ea"/>
+                <a:cs typeface="+mn-cs"/>
+              </a:rPr>
+              <a:t>getMaxInactiveInterval</a:t>
+            </a:r>
+            <a:r>
+              <a:rPr lang="pt-BR" sz="1200" b="0" i="0" u="none" strike="noStrike" kern="1200" baseline="0" dirty="0" smtClean="0">
+                <a:solidFill>
+                  <a:schemeClr val="tx1"/>
+                </a:solidFill>
+                <a:latin typeface="+mn-lt"/>
+                <a:ea typeface="+mn-ea"/>
+                <a:cs typeface="+mn-cs"/>
+              </a:rPr>
+              <a:t>() – recupera valor de timeout</a:t>
+            </a:r>
+            <a:endParaRPr lang="pt-BR" sz="1200" b="0" i="0" u="none" strike="noStrike" kern="1200" baseline="0" dirty="0" smtClean="0">
+              <a:solidFill>
+                <a:schemeClr val="tx1"/>
+              </a:solidFill>
+              <a:latin typeface="+mn-lt"/>
+              <a:ea typeface="+mn-ea"/>
+              <a:cs typeface="+mn-cs"/>
+              <a:sym typeface="Wingdings" panose="05000000000000000000" pitchFamily="2" charset="2"/>
+            </a:endParaRPr>
+          </a:p>
+          <a:p>
+            <a:r>
+              <a:rPr lang="pt-BR" sz="1200" b="0" i="0" u="none" strike="noStrike" kern="1200" baseline="0" dirty="0" smtClean="0">
+                <a:solidFill>
+                  <a:schemeClr val="tx1"/>
+                </a:solidFill>
+                <a:latin typeface="+mn-lt"/>
+                <a:ea typeface="+mn-ea"/>
+                <a:cs typeface="+mn-cs"/>
+                <a:sym typeface="Wingdings" panose="05000000000000000000" pitchFamily="2" charset="2"/>
+              </a:rPr>
+              <a:t>Lembrando que cada uma sobrepõem a outra.</a:t>
+            </a:r>
             <a:endParaRPr lang="pt-BR" sz="1200" b="0" i="0" u="none" strike="noStrike" kern="1200" baseline="0" dirty="0" smtClean="0">
               <a:solidFill>
                 <a:schemeClr val="tx1"/>
@@ -3717,6 +3978,1008 @@
               <a:rPr lang="pt-BR" smtClean="0"/>
               <a:pPr/>
               <a:t>16</a:t>
+            </a:fld>
+            <a:endParaRPr lang="pt-BR"/>
+          </a:p>
+        </p:txBody>
+      </p:sp>
+    </p:spTree>
+    <p:extLst>
+      <p:ext uri="{BB962C8B-B14F-4D97-AF65-F5344CB8AC3E}">
+        <p14:creationId xmlns:p14="http://schemas.microsoft.com/office/powerpoint/2010/main" val="2477212209"/>
+      </p:ext>
+    </p:extLst>
+  </p:cSld>
+  <p:clrMapOvr>
+    <a:masterClrMapping/>
+  </p:clrMapOvr>
+</p:notes>
+</file>
+
+<file path=ppt/notesSlides/notesSlide17.xml><?xml version="1.0" encoding="utf-8"?>
+<p:notes xmlns:a="http://schemas.openxmlformats.org/drawingml/2006/main" xmlns:r="http://schemas.openxmlformats.org/officeDocument/2006/relationships" xmlns:p="http://schemas.openxmlformats.org/presentationml/2006/main">
+  <p:cSld>
+    <p:spTree>
+      <p:nvGrpSpPr>
+        <p:cNvPr id="1" name=""/>
+        <p:cNvGrpSpPr/>
+        <p:nvPr/>
+      </p:nvGrpSpPr>
+      <p:grpSpPr>
+        <a:xfrm>
+          <a:off x="0" y="0"/>
+          <a:ext cx="0" cy="0"/>
+          <a:chOff x="0" y="0"/>
+          <a:chExt cx="0" cy="0"/>
+        </a:xfrm>
+      </p:grpSpPr>
+      <p:sp>
+        <p:nvSpPr>
+          <p:cNvPr id="2" name="Rectangle 2"/>
+          <p:cNvSpPr>
+            <a:spLocks noGrp="1" noRot="1" noChangeAspect="1"/>
+          </p:cNvSpPr>
+          <p:nvPr>
+            <p:ph type="sldImg"/>
+          </p:nvPr>
+        </p:nvSpPr>
+        <p:spPr/>
+      </p:sp>
+      <p:sp>
+        <p:nvSpPr>
+          <p:cNvPr id="3" name="Rectangle 3"/>
+          <p:cNvSpPr>
+            <a:spLocks noGrp="1"/>
+          </p:cNvSpPr>
+          <p:nvPr>
+            <p:ph type="body" idx="1"/>
+          </p:nvPr>
+        </p:nvSpPr>
+        <p:spPr/>
+        <p:txBody>
+          <a:bodyPr/>
+          <a:lstStyle/>
+          <a:p>
+            <a:r>
+              <a:rPr lang="pt-BR" sz="1200" b="0" i="0" u="none" strike="noStrike" kern="1200" baseline="0" dirty="0" smtClean="0">
+                <a:solidFill>
+                  <a:schemeClr val="tx1"/>
+                </a:solidFill>
+                <a:latin typeface="+mn-lt"/>
+                <a:ea typeface="+mn-ea"/>
+                <a:cs typeface="+mn-cs"/>
+              </a:rPr>
+              <a:t>• Usando variáveis estáticas ou de instância</a:t>
+            </a:r>
+          </a:p>
+          <a:p>
+            <a:r>
+              <a:rPr lang="pt-BR" sz="1200" b="0" i="0" u="none" strike="noStrike" kern="1200" baseline="0" dirty="0" smtClean="0">
+                <a:solidFill>
+                  <a:schemeClr val="tx1"/>
+                </a:solidFill>
+                <a:latin typeface="+mn-lt"/>
+                <a:ea typeface="+mn-ea"/>
+                <a:cs typeface="+mn-cs"/>
+              </a:rPr>
+              <a:t>Devido à natureza dos </a:t>
+            </a:r>
+            <a:r>
+              <a:rPr lang="pt-BR" sz="1200" b="0" i="0" u="none" strike="noStrike" kern="1200" baseline="0" dirty="0" err="1" smtClean="0">
+                <a:solidFill>
+                  <a:schemeClr val="tx1"/>
+                </a:solidFill>
+                <a:latin typeface="+mn-lt"/>
+                <a:ea typeface="+mn-ea"/>
+                <a:cs typeface="+mn-cs"/>
+              </a:rPr>
+              <a:t>servlets</a:t>
+            </a:r>
+            <a:r>
+              <a:rPr lang="pt-BR" sz="1200" b="0" i="0" u="none" strike="noStrike" kern="1200" baseline="0" dirty="0" smtClean="0">
+                <a:solidFill>
+                  <a:schemeClr val="tx1"/>
+                </a:solidFill>
+                <a:latin typeface="+mn-lt"/>
+                <a:ea typeface="+mn-ea"/>
+                <a:cs typeface="+mn-cs"/>
+              </a:rPr>
+              <a:t> e sua forma de execução, não é recomendado o</a:t>
+            </a:r>
+          </a:p>
+          <a:p>
+            <a:r>
+              <a:rPr lang="pt-BR" sz="1200" b="0" i="0" u="none" strike="noStrike" kern="1200" baseline="0" dirty="0" smtClean="0">
+                <a:solidFill>
+                  <a:schemeClr val="tx1"/>
+                </a:solidFill>
+                <a:latin typeface="+mn-lt"/>
+                <a:ea typeface="+mn-ea"/>
+                <a:cs typeface="+mn-cs"/>
+              </a:rPr>
+              <a:t>compartilhamento usando variáveis estáticas e de instancia. A forma recomendada consiste</a:t>
+            </a:r>
+          </a:p>
+          <a:p>
+            <a:r>
+              <a:rPr lang="pt-BR" sz="1200" b="0" i="0" u="none" strike="noStrike" kern="1200" baseline="0" dirty="0" smtClean="0">
+                <a:solidFill>
+                  <a:schemeClr val="tx1"/>
+                </a:solidFill>
+                <a:latin typeface="+mn-lt"/>
+                <a:ea typeface="+mn-ea"/>
+                <a:cs typeface="+mn-cs"/>
+              </a:rPr>
+              <a:t>em usar os métodos </a:t>
+            </a:r>
+            <a:r>
+              <a:rPr lang="pt-BR" sz="1200" b="0" i="0" u="none" strike="noStrike" kern="1200" baseline="0" dirty="0" err="1" smtClean="0">
+                <a:solidFill>
+                  <a:schemeClr val="tx1"/>
+                </a:solidFill>
+                <a:latin typeface="+mn-lt"/>
+                <a:ea typeface="+mn-ea"/>
+                <a:cs typeface="+mn-cs"/>
+              </a:rPr>
+              <a:t>get</a:t>
+            </a:r>
+            <a:r>
+              <a:rPr lang="pt-BR" sz="1200" b="0" i="0" u="none" strike="noStrike" kern="1200" baseline="0" dirty="0" smtClean="0">
+                <a:solidFill>
+                  <a:schemeClr val="tx1"/>
+                </a:solidFill>
+                <a:latin typeface="+mn-lt"/>
+                <a:ea typeface="+mn-ea"/>
+                <a:cs typeface="+mn-cs"/>
+              </a:rPr>
+              <a:t>/</a:t>
+            </a:r>
+            <a:r>
+              <a:rPr lang="pt-BR" sz="1200" b="0" i="0" u="none" strike="noStrike" kern="1200" baseline="0" dirty="0" err="1" smtClean="0">
+                <a:solidFill>
+                  <a:schemeClr val="tx1"/>
+                </a:solidFill>
+                <a:latin typeface="+mn-lt"/>
+                <a:ea typeface="+mn-ea"/>
+                <a:cs typeface="+mn-cs"/>
+              </a:rPr>
+              <a:t>setAttribute</a:t>
+            </a:r>
+            <a:r>
+              <a:rPr lang="pt-BR" sz="1200" b="0" i="0" u="none" strike="noStrike" kern="1200" baseline="0" dirty="0" smtClean="0">
+                <a:solidFill>
+                  <a:schemeClr val="tx1"/>
+                </a:solidFill>
+                <a:latin typeface="+mn-lt"/>
+                <a:ea typeface="+mn-ea"/>
+                <a:cs typeface="+mn-cs"/>
+              </a:rPr>
+              <a:t> contidos nos três objetos de escopo:</a:t>
+            </a:r>
+          </a:p>
+          <a:p>
+            <a:endParaRPr lang="pt-BR" sz="1200" b="0" i="0" u="none" strike="noStrike" kern="1200" baseline="0" dirty="0" smtClean="0">
+              <a:solidFill>
+                <a:schemeClr val="tx1"/>
+              </a:solidFill>
+              <a:latin typeface="+mn-lt"/>
+              <a:ea typeface="+mn-ea"/>
+              <a:cs typeface="+mn-cs"/>
+            </a:endParaRPr>
+          </a:p>
+          <a:p>
+            <a:r>
+              <a:rPr lang="pt-BR" sz="1200" b="0" i="0" u="none" strike="noStrike" kern="1200" baseline="0" dirty="0" smtClean="0">
+                <a:solidFill>
+                  <a:schemeClr val="tx1"/>
+                </a:solidFill>
+                <a:latin typeface="+mn-lt"/>
+                <a:ea typeface="+mn-ea"/>
+                <a:cs typeface="+mn-cs"/>
+              </a:rPr>
+              <a:t>A forma recomendada consiste em usar os métodos </a:t>
+            </a:r>
+            <a:r>
+              <a:rPr lang="pt-BR" sz="1200" b="0" i="0" u="none" strike="noStrike" kern="1200" baseline="0" dirty="0" err="1" smtClean="0">
+                <a:solidFill>
+                  <a:schemeClr val="tx1"/>
+                </a:solidFill>
+                <a:latin typeface="+mn-lt"/>
+                <a:ea typeface="+mn-ea"/>
+                <a:cs typeface="+mn-cs"/>
+              </a:rPr>
+              <a:t>getAttribute</a:t>
+            </a:r>
+            <a:r>
+              <a:rPr lang="pt-BR" sz="1200" b="0" i="0" u="none" strike="noStrike" kern="1200" baseline="0" dirty="0" smtClean="0">
+                <a:solidFill>
+                  <a:schemeClr val="tx1"/>
+                </a:solidFill>
+                <a:latin typeface="+mn-lt"/>
+                <a:ea typeface="+mn-ea"/>
+                <a:cs typeface="+mn-cs"/>
+              </a:rPr>
+              <a:t>/</a:t>
+            </a:r>
+            <a:r>
+              <a:rPr lang="pt-BR" sz="1200" b="0" i="0" u="none" strike="noStrike" kern="1200" baseline="0" dirty="0" err="1" smtClean="0">
+                <a:solidFill>
+                  <a:schemeClr val="tx1"/>
+                </a:solidFill>
+                <a:latin typeface="+mn-lt"/>
+                <a:ea typeface="+mn-ea"/>
+                <a:cs typeface="+mn-cs"/>
+              </a:rPr>
+              <a:t>setAttribute</a:t>
+            </a:r>
+            <a:r>
+              <a:rPr lang="pt-BR" sz="1200" b="0" i="0" u="none" strike="noStrike" kern="1200" baseline="0" dirty="0" smtClean="0">
+                <a:solidFill>
+                  <a:schemeClr val="tx1"/>
+                </a:solidFill>
+                <a:latin typeface="+mn-lt"/>
+                <a:ea typeface="+mn-ea"/>
+                <a:cs typeface="+mn-cs"/>
+              </a:rPr>
+              <a:t> contidos nos três objetos de escopo:</a:t>
+            </a:r>
+          </a:p>
+          <a:p>
+            <a:endParaRPr lang="pt-BR" sz="1200" b="0" i="0" u="none" strike="noStrike" kern="1200" baseline="0" dirty="0" smtClean="0">
+              <a:solidFill>
+                <a:schemeClr val="tx1"/>
+              </a:solidFill>
+              <a:latin typeface="+mn-lt"/>
+              <a:ea typeface="+mn-ea"/>
+              <a:cs typeface="+mn-cs"/>
+            </a:endParaRPr>
+          </a:p>
+          <a:p>
+            <a:r>
+              <a:rPr lang="pt-BR" sz="1200" b="0" i="0" u="none" strike="noStrike" kern="1200" baseline="0" dirty="0" smtClean="0">
+                <a:solidFill>
+                  <a:schemeClr val="tx1"/>
+                </a:solidFill>
+                <a:latin typeface="+mn-lt"/>
+                <a:ea typeface="+mn-ea"/>
+                <a:cs typeface="+mn-cs"/>
+              </a:rPr>
+              <a:t>• </a:t>
+            </a:r>
+            <a:r>
+              <a:rPr lang="pt-BR" sz="1200" b="0" i="0" u="none" strike="noStrike" kern="1200" baseline="0" dirty="0" err="1" smtClean="0">
+                <a:solidFill>
+                  <a:schemeClr val="tx1"/>
+                </a:solidFill>
+                <a:latin typeface="+mn-lt"/>
+                <a:ea typeface="+mn-ea"/>
+                <a:cs typeface="+mn-cs"/>
+              </a:rPr>
+              <a:t>javax.servlet.</a:t>
+            </a:r>
+            <a:r>
+              <a:rPr lang="pt-BR" sz="1200" b="1" i="0" u="none" strike="noStrike" kern="1200" baseline="0" dirty="0" err="1" smtClean="0">
+                <a:solidFill>
+                  <a:schemeClr val="tx1"/>
+                </a:solidFill>
+                <a:latin typeface="+mn-lt"/>
+                <a:ea typeface="+mn-ea"/>
+                <a:cs typeface="+mn-cs"/>
+              </a:rPr>
+              <a:t>ServletContext</a:t>
+            </a:r>
+            <a:r>
+              <a:rPr lang="pt-BR" sz="1200" b="1" i="0" u="none" strike="noStrike" kern="1200" baseline="0" dirty="0" smtClean="0">
+                <a:solidFill>
+                  <a:schemeClr val="tx1"/>
+                </a:solidFill>
+                <a:latin typeface="+mn-lt"/>
+                <a:ea typeface="+mn-ea"/>
+                <a:cs typeface="+mn-cs"/>
+              </a:rPr>
+              <a:t> </a:t>
+            </a:r>
+            <a:r>
+              <a:rPr lang="pt-BR" sz="1200" b="0" i="0" u="none" strike="noStrike" kern="1200" baseline="0" dirty="0" smtClean="0">
+                <a:solidFill>
+                  <a:schemeClr val="tx1"/>
+                </a:solidFill>
+                <a:latin typeface="+mn-lt"/>
+                <a:ea typeface="+mn-ea"/>
+                <a:cs typeface="+mn-cs"/>
+              </a:rPr>
+              <a:t>– que representa o contexto da aplicação e existe</a:t>
+            </a:r>
+          </a:p>
+          <a:p>
+            <a:r>
+              <a:rPr lang="pt-BR" sz="1200" b="0" i="0" u="none" strike="noStrike" kern="1200" baseline="0" dirty="0" smtClean="0">
+                <a:solidFill>
+                  <a:schemeClr val="tx1"/>
+                </a:solidFill>
+                <a:latin typeface="+mn-lt"/>
+                <a:ea typeface="+mn-ea"/>
+                <a:cs typeface="+mn-cs"/>
+              </a:rPr>
+              <a:t>enquanto a aplicação estiver executando.</a:t>
+            </a:r>
+          </a:p>
+          <a:p>
+            <a:r>
+              <a:rPr lang="pt-BR" sz="1200" b="0" i="0" u="none" strike="noStrike" kern="1200" baseline="0" dirty="0" smtClean="0">
+                <a:solidFill>
+                  <a:schemeClr val="tx1"/>
+                </a:solidFill>
+                <a:latin typeface="+mn-lt"/>
+                <a:ea typeface="+mn-ea"/>
+                <a:cs typeface="+mn-cs"/>
+              </a:rPr>
+              <a:t>• </a:t>
+            </a:r>
+            <a:r>
+              <a:rPr lang="pt-BR" sz="1200" b="0" i="0" u="none" strike="noStrike" kern="1200" baseline="0" dirty="0" err="1" smtClean="0">
+                <a:solidFill>
+                  <a:schemeClr val="tx1"/>
+                </a:solidFill>
+                <a:latin typeface="+mn-lt"/>
+                <a:ea typeface="+mn-ea"/>
+                <a:cs typeface="+mn-cs"/>
+              </a:rPr>
+              <a:t>javax.servlet.http.</a:t>
+            </a:r>
+            <a:r>
+              <a:rPr lang="pt-BR" sz="1200" b="1" i="0" u="none" strike="noStrike" kern="1200" baseline="0" dirty="0" err="1" smtClean="0">
+                <a:solidFill>
+                  <a:schemeClr val="tx1"/>
+                </a:solidFill>
+                <a:latin typeface="+mn-lt"/>
+                <a:ea typeface="+mn-ea"/>
+                <a:cs typeface="+mn-cs"/>
+              </a:rPr>
+              <a:t>HttpSession</a:t>
+            </a:r>
+            <a:r>
+              <a:rPr lang="pt-BR" sz="1200" b="1" i="0" u="none" strike="noStrike" kern="1200" baseline="0" dirty="0" smtClean="0">
+                <a:solidFill>
+                  <a:schemeClr val="tx1"/>
+                </a:solidFill>
+                <a:latin typeface="+mn-lt"/>
+                <a:ea typeface="+mn-ea"/>
+                <a:cs typeface="+mn-cs"/>
+              </a:rPr>
+              <a:t> </a:t>
+            </a:r>
+            <a:r>
+              <a:rPr lang="pt-BR" sz="1200" b="0" i="0" u="none" strike="noStrike" kern="1200" baseline="0" dirty="0" smtClean="0">
+                <a:solidFill>
+                  <a:schemeClr val="tx1"/>
+                </a:solidFill>
+                <a:latin typeface="+mn-lt"/>
+                <a:ea typeface="+mn-ea"/>
+                <a:cs typeface="+mn-cs"/>
+              </a:rPr>
+              <a:t>– que representa o contexto da sessão do cliente e</a:t>
+            </a:r>
+          </a:p>
+          <a:p>
+            <a:r>
+              <a:rPr lang="pt-BR" sz="1200" b="0" i="0" u="none" strike="noStrike" kern="1200" baseline="0" dirty="0" smtClean="0">
+                <a:solidFill>
+                  <a:schemeClr val="tx1"/>
+                </a:solidFill>
+                <a:latin typeface="+mn-lt"/>
+                <a:ea typeface="+mn-ea"/>
+                <a:cs typeface="+mn-cs"/>
+              </a:rPr>
+              <a:t>existe enquanto o cliente estiver conectado.</a:t>
+            </a:r>
+          </a:p>
+          <a:p>
+            <a:r>
+              <a:rPr lang="pt-BR" sz="1200" b="0" i="0" u="none" strike="noStrike" kern="1200" baseline="0" dirty="0" smtClean="0">
+                <a:solidFill>
+                  <a:schemeClr val="tx1"/>
+                </a:solidFill>
+                <a:latin typeface="+mn-lt"/>
+                <a:ea typeface="+mn-ea"/>
+                <a:cs typeface="+mn-cs"/>
+              </a:rPr>
+              <a:t>• </a:t>
+            </a:r>
+            <a:r>
+              <a:rPr lang="pt-BR" sz="1200" b="0" i="0" u="none" strike="noStrike" kern="1200" baseline="0" dirty="0" err="1" smtClean="0">
+                <a:solidFill>
+                  <a:schemeClr val="tx1"/>
+                </a:solidFill>
+                <a:latin typeface="+mn-lt"/>
+                <a:ea typeface="+mn-ea"/>
+                <a:cs typeface="+mn-cs"/>
+              </a:rPr>
+              <a:t>javax.servlet.</a:t>
+            </a:r>
+            <a:r>
+              <a:rPr lang="pt-BR" sz="1200" b="1" i="0" u="none" strike="noStrike" kern="1200" baseline="0" dirty="0" err="1" smtClean="0">
+                <a:solidFill>
+                  <a:schemeClr val="tx1"/>
+                </a:solidFill>
+                <a:latin typeface="+mn-lt"/>
+                <a:ea typeface="+mn-ea"/>
+                <a:cs typeface="+mn-cs"/>
+              </a:rPr>
+              <a:t>ServletRequest</a:t>
+            </a:r>
+            <a:r>
+              <a:rPr lang="pt-BR" sz="1200" b="1" i="0" u="none" strike="noStrike" kern="1200" baseline="0" dirty="0" smtClean="0">
+                <a:solidFill>
+                  <a:schemeClr val="tx1"/>
+                </a:solidFill>
+                <a:latin typeface="+mn-lt"/>
+                <a:ea typeface="+mn-ea"/>
+                <a:cs typeface="+mn-cs"/>
+              </a:rPr>
+              <a:t> </a:t>
+            </a:r>
+            <a:r>
+              <a:rPr lang="pt-BR" sz="1200" b="0" i="0" u="none" strike="noStrike" kern="1200" baseline="0" dirty="0" smtClean="0">
+                <a:solidFill>
+                  <a:schemeClr val="tx1"/>
+                </a:solidFill>
+                <a:latin typeface="+mn-lt"/>
+                <a:ea typeface="+mn-ea"/>
+                <a:cs typeface="+mn-cs"/>
+              </a:rPr>
+              <a:t>– que representa o contexto da requisição e existe</a:t>
+            </a:r>
+          </a:p>
+          <a:p>
+            <a:r>
+              <a:rPr lang="pt-BR" sz="1200" b="0" i="0" u="none" strike="noStrike" kern="1200" baseline="0" dirty="0" smtClean="0">
+                <a:solidFill>
+                  <a:schemeClr val="tx1"/>
+                </a:solidFill>
+                <a:latin typeface="+mn-lt"/>
+                <a:ea typeface="+mn-ea"/>
+                <a:cs typeface="+mn-cs"/>
+              </a:rPr>
+              <a:t>enquanto o método </a:t>
+            </a:r>
+            <a:r>
+              <a:rPr lang="pt-BR" sz="1200" b="0" i="0" u="none" strike="noStrike" kern="1200" baseline="0" dirty="0" err="1" smtClean="0">
+                <a:solidFill>
+                  <a:schemeClr val="tx1"/>
+                </a:solidFill>
+                <a:latin typeface="+mn-lt"/>
+                <a:ea typeface="+mn-ea"/>
+                <a:cs typeface="+mn-cs"/>
+              </a:rPr>
+              <a:t>service</a:t>
+            </a:r>
+            <a:r>
+              <a:rPr lang="pt-BR" sz="1200" b="0" i="0" u="none" strike="noStrike" kern="1200" baseline="0" dirty="0" smtClean="0">
+                <a:solidFill>
+                  <a:schemeClr val="tx1"/>
+                </a:solidFill>
+                <a:latin typeface="+mn-lt"/>
+                <a:ea typeface="+mn-ea"/>
+                <a:cs typeface="+mn-cs"/>
+              </a:rPr>
+              <a:t>() não terminar.</a:t>
+            </a:r>
+          </a:p>
+          <a:p>
+            <a:endParaRPr lang="pt-BR" sz="1200" b="0" i="0" u="none" strike="noStrike" kern="1200" baseline="0" dirty="0" smtClean="0">
+              <a:solidFill>
+                <a:schemeClr val="tx1"/>
+              </a:solidFill>
+              <a:latin typeface="+mn-lt"/>
+              <a:ea typeface="+mn-ea"/>
+              <a:cs typeface="+mn-cs"/>
+            </a:endParaRPr>
+          </a:p>
+          <a:p>
+            <a:r>
+              <a:rPr lang="pt-BR" sz="1200" b="0" i="0" u="none" strike="noStrike" kern="1200" baseline="0" dirty="0" smtClean="0">
+                <a:solidFill>
+                  <a:schemeClr val="tx1"/>
+                </a:solidFill>
+                <a:latin typeface="+mn-lt"/>
+                <a:ea typeface="+mn-ea"/>
+                <a:cs typeface="+mn-cs"/>
+              </a:rPr>
+              <a:t>Lembrar quais são os “maiores” escopos.</a:t>
+            </a:r>
+          </a:p>
+          <a:p>
+            <a:endParaRPr lang="pt-BR" sz="1200" b="0" i="0" u="none" strike="noStrike" kern="1200" baseline="0" dirty="0" smtClean="0">
+              <a:solidFill>
+                <a:schemeClr val="tx1"/>
+              </a:solidFill>
+              <a:latin typeface="+mn-lt"/>
+              <a:ea typeface="+mn-ea"/>
+              <a:cs typeface="+mn-cs"/>
+            </a:endParaRPr>
+          </a:p>
+          <a:p>
+            <a:r>
+              <a:rPr lang="pt-BR" sz="1200" b="0" i="0" u="none" strike="noStrike" kern="1200" baseline="0" dirty="0" smtClean="0">
+                <a:solidFill>
+                  <a:schemeClr val="tx1"/>
+                </a:solidFill>
+                <a:latin typeface="+mn-lt"/>
+                <a:ea typeface="+mn-ea"/>
+                <a:cs typeface="+mn-cs"/>
+              </a:rPr>
+              <a:t>Portanto, para gravar dados em um objeto de persistência na memória, deve-se usar:</a:t>
+            </a:r>
+          </a:p>
+          <a:p>
+            <a:r>
+              <a:rPr lang="pt-BR" sz="1200" b="0" i="0" u="none" strike="noStrike" kern="1200" baseline="0" dirty="0" err="1" smtClean="0">
+                <a:solidFill>
+                  <a:schemeClr val="tx1"/>
+                </a:solidFill>
+                <a:latin typeface="+mn-lt"/>
+                <a:ea typeface="+mn-ea"/>
+                <a:cs typeface="+mn-cs"/>
+              </a:rPr>
+              <a:t>objeto.setAttribute</a:t>
+            </a:r>
+            <a:r>
+              <a:rPr lang="pt-BR" sz="1200" b="0" i="0" u="none" strike="noStrike" kern="1200" baseline="0" dirty="0" smtClean="0">
+                <a:solidFill>
+                  <a:schemeClr val="tx1"/>
+                </a:solidFill>
+                <a:latin typeface="+mn-lt"/>
+                <a:ea typeface="+mn-ea"/>
+                <a:cs typeface="+mn-cs"/>
+              </a:rPr>
+              <a:t>("nome", dados);</a:t>
+            </a:r>
+          </a:p>
+          <a:p>
+            <a:r>
+              <a:rPr lang="pt-BR" sz="1200" b="0" i="0" u="none" strike="noStrike" kern="1200" baseline="0" dirty="0" smtClean="0">
+                <a:solidFill>
+                  <a:schemeClr val="tx1"/>
+                </a:solidFill>
+                <a:latin typeface="+mn-lt"/>
+                <a:ea typeface="+mn-ea"/>
+                <a:cs typeface="+mn-cs"/>
+              </a:rPr>
+              <a:t>E para recuperar ou remover os dados:</a:t>
+            </a:r>
+          </a:p>
+          <a:p>
+            <a:r>
+              <a:rPr lang="pt-BR" sz="1200" b="0" i="0" u="none" strike="noStrike" kern="1200" baseline="0" dirty="0" err="1" smtClean="0">
+                <a:solidFill>
+                  <a:schemeClr val="tx1"/>
+                </a:solidFill>
+                <a:latin typeface="+mn-lt"/>
+                <a:ea typeface="+mn-ea"/>
+                <a:cs typeface="+mn-cs"/>
+              </a:rPr>
+              <a:t>Object</a:t>
+            </a:r>
+            <a:r>
+              <a:rPr lang="pt-BR" sz="1200" b="0" i="0" u="none" strike="noStrike" kern="1200" baseline="0" dirty="0" smtClean="0">
+                <a:solidFill>
+                  <a:schemeClr val="tx1"/>
+                </a:solidFill>
+                <a:latin typeface="+mn-lt"/>
+                <a:ea typeface="+mn-ea"/>
+                <a:cs typeface="+mn-cs"/>
+              </a:rPr>
+              <a:t> dados = </a:t>
+            </a:r>
+            <a:r>
+              <a:rPr lang="pt-BR" sz="1200" b="0" i="0" u="none" strike="noStrike" kern="1200" baseline="0" dirty="0" err="1" smtClean="0">
+                <a:solidFill>
+                  <a:schemeClr val="tx1"/>
+                </a:solidFill>
+                <a:latin typeface="+mn-lt"/>
+                <a:ea typeface="+mn-ea"/>
+                <a:cs typeface="+mn-cs"/>
+              </a:rPr>
+              <a:t>objeto.getAttribute</a:t>
+            </a:r>
+            <a:r>
+              <a:rPr lang="pt-BR" sz="1200" b="0" i="0" u="none" strike="noStrike" kern="1200" baseline="0" dirty="0" smtClean="0">
+                <a:solidFill>
+                  <a:schemeClr val="tx1"/>
+                </a:solidFill>
+                <a:latin typeface="+mn-lt"/>
+                <a:ea typeface="+mn-ea"/>
+                <a:cs typeface="+mn-cs"/>
+              </a:rPr>
+              <a:t>("nome");</a:t>
+            </a:r>
+          </a:p>
+          <a:p>
+            <a:r>
+              <a:rPr lang="pt-BR" sz="1200" b="0" i="0" u="none" strike="noStrike" kern="1200" baseline="0" dirty="0" err="1" smtClean="0">
+                <a:solidFill>
+                  <a:schemeClr val="tx1"/>
+                </a:solidFill>
+                <a:latin typeface="+mn-lt"/>
+                <a:ea typeface="+mn-ea"/>
+                <a:cs typeface="+mn-cs"/>
+              </a:rPr>
+              <a:t>objeto.removeAttribute</a:t>
+            </a:r>
+            <a:r>
+              <a:rPr lang="pt-BR" sz="1200" b="0" i="0" u="none" strike="noStrike" kern="1200" baseline="0" dirty="0" smtClean="0">
+                <a:solidFill>
+                  <a:schemeClr val="tx1"/>
+                </a:solidFill>
+                <a:latin typeface="+mn-lt"/>
+                <a:ea typeface="+mn-ea"/>
+                <a:cs typeface="+mn-cs"/>
+              </a:rPr>
+              <a:t>("nome");</a:t>
+            </a:r>
+          </a:p>
+        </p:txBody>
+      </p:sp>
+      <p:sp>
+        <p:nvSpPr>
+          <p:cNvPr id="4" name="Rectangle 4"/>
+          <p:cNvSpPr>
+            <a:spLocks noGrp="1"/>
+          </p:cNvSpPr>
+          <p:nvPr>
+            <p:ph type="sldNum" sz="quarter" idx="10"/>
+          </p:nvPr>
+        </p:nvSpPr>
+        <p:spPr/>
+        <p:txBody>
+          <a:bodyPr/>
+          <a:lstStyle/>
+          <a:p>
+            <a:fld id="{61807874-5299-41B2-A37A-6AA3547857F4}" type="slidenum">
+              <a:rPr lang="pt-BR" smtClean="0"/>
+              <a:pPr/>
+              <a:t>17</a:t>
+            </a:fld>
+            <a:endParaRPr lang="pt-BR"/>
+          </a:p>
+        </p:txBody>
+      </p:sp>
+    </p:spTree>
+    <p:extLst>
+      <p:ext uri="{BB962C8B-B14F-4D97-AF65-F5344CB8AC3E}">
+        <p14:creationId xmlns:p14="http://schemas.microsoft.com/office/powerpoint/2010/main" val="2477212209"/>
+      </p:ext>
+    </p:extLst>
+  </p:cSld>
+  <p:clrMapOvr>
+    <a:masterClrMapping/>
+  </p:clrMapOvr>
+</p:notes>
+</file>
+
+<file path=ppt/notesSlides/notesSlide18.xml><?xml version="1.0" encoding="utf-8"?>
+<p:notes xmlns:a="http://schemas.openxmlformats.org/drawingml/2006/main" xmlns:r="http://schemas.openxmlformats.org/officeDocument/2006/relationships" xmlns:p="http://schemas.openxmlformats.org/presentationml/2006/main">
+  <p:cSld>
+    <p:spTree>
+      <p:nvGrpSpPr>
+        <p:cNvPr id="1" name=""/>
+        <p:cNvGrpSpPr/>
+        <p:nvPr/>
+      </p:nvGrpSpPr>
+      <p:grpSpPr>
+        <a:xfrm>
+          <a:off x="0" y="0"/>
+          <a:ext cx="0" cy="0"/>
+          <a:chOff x="0" y="0"/>
+          <a:chExt cx="0" cy="0"/>
+        </a:xfrm>
+      </p:grpSpPr>
+      <p:sp>
+        <p:nvSpPr>
+          <p:cNvPr id="2" name="Rectangle 2"/>
+          <p:cNvSpPr>
+            <a:spLocks noGrp="1" noRot="1" noChangeAspect="1"/>
+          </p:cNvSpPr>
+          <p:nvPr>
+            <p:ph type="sldImg"/>
+          </p:nvPr>
+        </p:nvSpPr>
+        <p:spPr/>
+      </p:sp>
+      <p:sp>
+        <p:nvSpPr>
+          <p:cNvPr id="3" name="Rectangle 3"/>
+          <p:cNvSpPr>
+            <a:spLocks noGrp="1"/>
+          </p:cNvSpPr>
+          <p:nvPr>
+            <p:ph type="body" idx="1"/>
+          </p:nvPr>
+        </p:nvSpPr>
+        <p:spPr/>
+        <p:txBody>
+          <a:bodyPr/>
+          <a:lstStyle/>
+          <a:p>
+            <a:r>
+              <a:rPr lang="pt-BR" sz="1200" b="0" i="0" u="none" strike="noStrike" kern="1200" baseline="0" dirty="0" smtClean="0">
+                <a:solidFill>
+                  <a:schemeClr val="tx1"/>
+                </a:solidFill>
+                <a:latin typeface="+mn-lt"/>
+                <a:ea typeface="+mn-ea"/>
+                <a:cs typeface="+mn-cs"/>
+              </a:rPr>
+              <a:t>Filtros </a:t>
+            </a:r>
+            <a:r>
+              <a:rPr lang="pt-BR" sz="1200" b="0" i="0" u="none" strike="noStrike" kern="1200" baseline="0" dirty="0" err="1" smtClean="0">
+                <a:solidFill>
+                  <a:schemeClr val="tx1"/>
+                </a:solidFill>
+                <a:latin typeface="+mn-lt"/>
+                <a:ea typeface="+mn-ea"/>
+                <a:cs typeface="+mn-cs"/>
+              </a:rPr>
+              <a:t>sao</a:t>
+            </a:r>
+            <a:r>
+              <a:rPr lang="pt-BR" sz="1200" b="0" i="0" u="none" strike="noStrike" kern="1200" baseline="0" dirty="0" smtClean="0">
+                <a:solidFill>
+                  <a:schemeClr val="tx1"/>
+                </a:solidFill>
+                <a:latin typeface="+mn-lt"/>
+                <a:ea typeface="+mn-ea"/>
+                <a:cs typeface="+mn-cs"/>
+              </a:rPr>
+              <a:t> criados implementando a interface </a:t>
+            </a:r>
+            <a:r>
+              <a:rPr lang="pt-BR" sz="1200" b="0" i="1" u="none" strike="noStrike" kern="1200" baseline="0" dirty="0" err="1" smtClean="0">
+                <a:solidFill>
+                  <a:schemeClr val="tx1"/>
+                </a:solidFill>
+                <a:latin typeface="+mn-lt"/>
+                <a:ea typeface="+mn-ea"/>
+                <a:cs typeface="+mn-cs"/>
+              </a:rPr>
+              <a:t>javax.servlet.Filter</a:t>
+            </a:r>
+            <a:r>
+              <a:rPr lang="pt-BR" sz="1200" b="0" i="1" u="none" strike="noStrike" kern="1200" baseline="0" dirty="0" smtClean="0">
+                <a:solidFill>
+                  <a:schemeClr val="tx1"/>
+                </a:solidFill>
+                <a:latin typeface="+mn-lt"/>
+                <a:ea typeface="+mn-ea"/>
+                <a:cs typeface="+mn-cs"/>
+              </a:rPr>
+              <a:t> </a:t>
+            </a:r>
+            <a:r>
+              <a:rPr lang="pt-BR" sz="1200" b="0" i="0" u="none" strike="noStrike" kern="1200" baseline="0" dirty="0" smtClean="0">
+                <a:solidFill>
+                  <a:schemeClr val="tx1"/>
+                </a:solidFill>
+                <a:latin typeface="+mn-lt"/>
+                <a:ea typeface="+mn-ea"/>
+                <a:cs typeface="+mn-cs"/>
+              </a:rPr>
+              <a:t>e mapeados a </a:t>
+            </a:r>
+            <a:r>
+              <a:rPr lang="pt-BR" sz="1200" b="0" i="0" u="none" strike="noStrike" kern="1200" baseline="0" dirty="0" err="1" smtClean="0">
+                <a:solidFill>
+                  <a:schemeClr val="tx1"/>
+                </a:solidFill>
+                <a:latin typeface="+mn-lt"/>
+                <a:ea typeface="+mn-ea"/>
+                <a:cs typeface="+mn-cs"/>
+              </a:rPr>
+              <a:t>servlets</a:t>
+            </a:r>
+            <a:endParaRPr lang="pt-BR" sz="1200" b="0" i="0" u="none" strike="noStrike" kern="1200" baseline="0" dirty="0" smtClean="0">
+              <a:solidFill>
+                <a:schemeClr val="tx1"/>
+              </a:solidFill>
+              <a:latin typeface="+mn-lt"/>
+              <a:ea typeface="+mn-ea"/>
+              <a:cs typeface="+mn-cs"/>
+            </a:endParaRPr>
+          </a:p>
+          <a:p>
+            <a:r>
+              <a:rPr lang="pt-BR" sz="1200" b="0" i="0" u="none" strike="noStrike" kern="1200" baseline="0" dirty="0" smtClean="0">
+                <a:solidFill>
+                  <a:schemeClr val="tx1"/>
+                </a:solidFill>
+                <a:latin typeface="+mn-lt"/>
+                <a:ea typeface="+mn-ea"/>
+                <a:cs typeface="+mn-cs"/>
+              </a:rPr>
+              <a:t>através de anotações </a:t>
+            </a:r>
+            <a:r>
+              <a:rPr lang="pt-BR" sz="1200" b="0" i="1" u="none" strike="noStrike" kern="1200" baseline="0" dirty="0" smtClean="0">
+                <a:solidFill>
+                  <a:schemeClr val="tx1"/>
+                </a:solidFill>
+                <a:latin typeface="+mn-lt"/>
+                <a:ea typeface="+mn-ea"/>
+                <a:cs typeface="+mn-cs"/>
+              </a:rPr>
+              <a:t>@</a:t>
+            </a:r>
+            <a:r>
+              <a:rPr lang="pt-BR" sz="1200" b="0" i="1" u="none" strike="noStrike" kern="1200" baseline="0" dirty="0" err="1" smtClean="0">
+                <a:solidFill>
+                  <a:schemeClr val="tx1"/>
+                </a:solidFill>
+                <a:latin typeface="+mn-lt"/>
+                <a:ea typeface="+mn-ea"/>
+                <a:cs typeface="+mn-cs"/>
+              </a:rPr>
+              <a:t>WebFilter</a:t>
+            </a:r>
+            <a:r>
+              <a:rPr lang="pt-BR" sz="1200" b="0" i="1" u="none" strike="noStrike" kern="1200" baseline="0" dirty="0" smtClean="0">
+                <a:solidFill>
+                  <a:schemeClr val="tx1"/>
+                </a:solidFill>
+                <a:latin typeface="+mn-lt"/>
+                <a:ea typeface="+mn-ea"/>
+                <a:cs typeface="+mn-cs"/>
+              </a:rPr>
+              <a:t> </a:t>
+            </a:r>
+            <a:r>
+              <a:rPr lang="pt-BR" sz="1200" b="0" i="0" u="none" strike="noStrike" kern="1200" baseline="0" dirty="0" smtClean="0">
+                <a:solidFill>
+                  <a:schemeClr val="tx1"/>
+                </a:solidFill>
+                <a:latin typeface="+mn-lt"/>
+                <a:ea typeface="+mn-ea"/>
+                <a:cs typeface="+mn-cs"/>
+              </a:rPr>
+              <a:t>ou via </a:t>
+            </a:r>
+            <a:r>
+              <a:rPr lang="pt-BR" sz="1200" b="0" i="1" u="none" strike="noStrike" kern="1200" baseline="0" dirty="0" smtClean="0">
+                <a:solidFill>
+                  <a:schemeClr val="tx1"/>
+                </a:solidFill>
+                <a:latin typeface="+mn-lt"/>
+                <a:ea typeface="+mn-ea"/>
+                <a:cs typeface="+mn-cs"/>
+              </a:rPr>
+              <a:t>web.xml</a:t>
+            </a:r>
+            <a:r>
+              <a:rPr lang="pt-BR" sz="1200" b="0" i="0" u="none" strike="noStrike" kern="1200" baseline="0" dirty="0" smtClean="0">
+                <a:solidFill>
+                  <a:schemeClr val="tx1"/>
+                </a:solidFill>
+                <a:latin typeface="+mn-lt"/>
+                <a:ea typeface="+mn-ea"/>
+                <a:cs typeface="+mn-cs"/>
+              </a:rPr>
+              <a:t>.</a:t>
+            </a:r>
+          </a:p>
+        </p:txBody>
+      </p:sp>
+      <p:sp>
+        <p:nvSpPr>
+          <p:cNvPr id="4" name="Rectangle 4"/>
+          <p:cNvSpPr>
+            <a:spLocks noGrp="1"/>
+          </p:cNvSpPr>
+          <p:nvPr>
+            <p:ph type="sldNum" sz="quarter" idx="10"/>
+          </p:nvPr>
+        </p:nvSpPr>
+        <p:spPr/>
+        <p:txBody>
+          <a:bodyPr/>
+          <a:lstStyle/>
+          <a:p>
+            <a:fld id="{61807874-5299-41B2-A37A-6AA3547857F4}" type="slidenum">
+              <a:rPr lang="pt-BR" smtClean="0"/>
+              <a:pPr/>
+              <a:t>18</a:t>
+            </a:fld>
+            <a:endParaRPr lang="pt-BR"/>
+          </a:p>
+        </p:txBody>
+      </p:sp>
+    </p:spTree>
+    <p:extLst>
+      <p:ext uri="{BB962C8B-B14F-4D97-AF65-F5344CB8AC3E}">
+        <p14:creationId xmlns:p14="http://schemas.microsoft.com/office/powerpoint/2010/main" val="2477212209"/>
+      </p:ext>
+    </p:extLst>
+  </p:cSld>
+  <p:clrMapOvr>
+    <a:masterClrMapping/>
+  </p:clrMapOvr>
+</p:notes>
+</file>
+
+<file path=ppt/notesSlides/notesSlide19.xml><?xml version="1.0" encoding="utf-8"?>
+<p:notes xmlns:a="http://schemas.openxmlformats.org/drawingml/2006/main" xmlns:r="http://schemas.openxmlformats.org/officeDocument/2006/relationships" xmlns:p="http://schemas.openxmlformats.org/presentationml/2006/main">
+  <p:cSld>
+    <p:spTree>
+      <p:nvGrpSpPr>
+        <p:cNvPr id="1" name=""/>
+        <p:cNvGrpSpPr/>
+        <p:nvPr/>
+      </p:nvGrpSpPr>
+      <p:grpSpPr>
+        <a:xfrm>
+          <a:off x="0" y="0"/>
+          <a:ext cx="0" cy="0"/>
+          <a:chOff x="0" y="0"/>
+          <a:chExt cx="0" cy="0"/>
+        </a:xfrm>
+      </p:grpSpPr>
+      <p:sp>
+        <p:nvSpPr>
+          <p:cNvPr id="2" name="Rectangle 2"/>
+          <p:cNvSpPr>
+            <a:spLocks noGrp="1" noRot="1" noChangeAspect="1"/>
+          </p:cNvSpPr>
+          <p:nvPr>
+            <p:ph type="sldImg"/>
+          </p:nvPr>
+        </p:nvSpPr>
+        <p:spPr/>
+      </p:sp>
+      <p:sp>
+        <p:nvSpPr>
+          <p:cNvPr id="3" name="Rectangle 3"/>
+          <p:cNvSpPr>
+            <a:spLocks noGrp="1"/>
+          </p:cNvSpPr>
+          <p:nvPr>
+            <p:ph type="body" idx="1"/>
+          </p:nvPr>
+        </p:nvSpPr>
+        <p:spPr/>
+        <p:txBody>
+          <a:bodyPr/>
+          <a:lstStyle/>
+          <a:p>
+            <a:endParaRPr lang="pt-BR" sz="1200" b="0" i="0" u="none" strike="noStrike" kern="1200" baseline="0" dirty="0" smtClean="0">
+              <a:solidFill>
+                <a:schemeClr val="tx1"/>
+              </a:solidFill>
+              <a:latin typeface="+mn-lt"/>
+              <a:ea typeface="+mn-ea"/>
+              <a:cs typeface="+mn-cs"/>
+            </a:endParaRPr>
+          </a:p>
+        </p:txBody>
+      </p:sp>
+      <p:sp>
+        <p:nvSpPr>
+          <p:cNvPr id="4" name="Rectangle 4"/>
+          <p:cNvSpPr>
+            <a:spLocks noGrp="1"/>
+          </p:cNvSpPr>
+          <p:nvPr>
+            <p:ph type="sldNum" sz="quarter" idx="10"/>
+          </p:nvPr>
+        </p:nvSpPr>
+        <p:spPr/>
+        <p:txBody>
+          <a:bodyPr/>
+          <a:lstStyle/>
+          <a:p>
+            <a:fld id="{61807874-5299-41B2-A37A-6AA3547857F4}" type="slidenum">
+              <a:rPr lang="pt-BR" smtClean="0"/>
+              <a:pPr/>
+              <a:t>19</a:t>
             </a:fld>
             <a:endParaRPr lang="pt-BR"/>
           </a:p>
@@ -8574,7 +9837,7 @@
             <a:fld id="{8F67D422-08A8-451B-9A67-21962FC4B660}" type="datetimeFigureOut">
               <a:rPr kumimoji="0" lang="pt-BR" sz="1100"/>
               <a:pPr algn="r"/>
-              <a:t>12/10/2018</a:t>
+              <a:t>14/10/2018</a:t>
             </a:fld>
             <a:endParaRPr kumimoji="0" lang="pt-BR"/>
           </a:p>
@@ -8796,7 +10059,7 @@
             <a:fld id="{8F67D422-08A8-451B-9A67-21962FC4B660}" type="datetimeFigureOut">
               <a:rPr kumimoji="0" lang="pt-BR" sz="1100"/>
               <a:pPr algn="r"/>
-              <a:t>12/10/2018</a:t>
+              <a:t>14/10/2018</a:t>
             </a:fld>
             <a:endParaRPr kumimoji="0" lang="pt-BR"/>
           </a:p>
@@ -8913,7 +10176,7 @@
             <a:fld id="{8F67D422-08A8-451B-9A67-21962FC4B660}" type="datetimeFigureOut">
               <a:rPr kumimoji="0" lang="pt-BR" sz="1100"/>
               <a:pPr algn="r"/>
-              <a:t>12/10/2018</a:t>
+              <a:t>14/10/2018</a:t>
             </a:fld>
             <a:endParaRPr kumimoji="0" lang="pt-BR"/>
           </a:p>
@@ -9078,7 +10341,7 @@
           <a:p>
             <a:fld id="{1BEBB2CB-903D-46EF-8227-E770ED8FF514}" type="datetimeFigureOut">
               <a:pPr/>
-              <a:t>12/10/2018</a:t>
+              <a:t>14/10/2018</a:t>
             </a:fld>
             <a:endParaRPr kumimoji="0" lang="pt-BR"/>
           </a:p>
@@ -9556,7 +10819,7 @@
           <a:p>
             <a:fld id="{1BEBB2CB-903D-46EF-8227-E770ED8FF514}" type="datetimeFigureOut">
               <a:pPr/>
-              <a:t>12/10/2018</a:t>
+              <a:t>14/10/2018</a:t>
             </a:fld>
             <a:endParaRPr kumimoji="0" lang="pt-BR"/>
           </a:p>
@@ -10164,7 +11427,7 @@
           <a:p>
             <a:fld id="{1BEBB2CB-903D-46EF-8227-E770ED8FF514}" type="datetimeFigureOut">
               <a:pPr/>
-              <a:t>12/10/2018</a:t>
+              <a:t>14/10/2018</a:t>
             </a:fld>
             <a:endParaRPr kumimoji="0" lang="pt-BR"/>
           </a:p>
@@ -10559,7 +11822,7 @@
           <a:p>
             <a:fld id="{1BEBB2CB-903D-46EF-8227-E770ED8FF514}" type="datetimeFigureOut">
               <a:pPr/>
-              <a:t>12/10/2018</a:t>
+              <a:t>14/10/2018</a:t>
             </a:fld>
             <a:endParaRPr kumimoji="0" lang="pt-BR"/>
           </a:p>
@@ -11350,7 +12613,7 @@
           <a:p>
             <a:fld id="{1BEBB2CB-903D-46EF-8227-E770ED8FF514}" type="datetimeFigureOut">
               <a:pPr/>
-              <a:t>12/10/2018</a:t>
+              <a:t>14/10/2018</a:t>
             </a:fld>
             <a:endParaRPr kumimoji="0" lang="pt-BR"/>
           </a:p>
@@ -12444,7 +13707,7 @@
             <a:fld id="{8F67D422-08A8-451B-9A67-21962FC4B660}" type="datetimeFigureOut">
               <a:rPr kumimoji="0" lang="pt-BR" sz="1100"/>
               <a:pPr algn="r"/>
-              <a:t>12/10/2018</a:t>
+              <a:t>14/10/2018</a:t>
             </a:fld>
             <a:endParaRPr kumimoji="0" lang="pt-BR" sz="1050"/>
           </a:p>
@@ -14575,7 +15838,7 @@
     </p:spTree>
     <p:extLst>
       <p:ext uri="{BB962C8B-B14F-4D97-AF65-F5344CB8AC3E}">
-        <p14:creationId xmlns:p14="http://schemas.microsoft.com/office/powerpoint/2010/main" val="1483072264"/>
+        <p14:creationId xmlns:p14="http://schemas.microsoft.com/office/powerpoint/2010/main" val="435609940"/>
       </p:ext>
     </p:extLst>
   </p:cSld>
@@ -14628,12 +15891,8 @@
           <a:lstStyle/>
           <a:p>
             <a:r>
-              <a:rPr lang="pt-BR" sz="4000" dirty="0" smtClean="0"/>
-              <a:t>Interface </a:t>
-            </a:r>
-            <a:r>
               <a:rPr lang="pt-BR" sz="4000" dirty="0" err="1" smtClean="0"/>
-              <a:t>ServletContext</a:t>
+              <a:t>Listeners</a:t>
             </a:r>
             <a:endParaRPr lang="pt-BR" sz="4000" dirty="0"/>
           </a:p>
@@ -14653,8 +15912,8 @@
         </p:nvSpPr>
         <p:spPr>
           <a:xfrm>
-            <a:off x="685800" y="2703016"/>
-            <a:ext cx="7772400" cy="2246769"/>
+            <a:off x="685800" y="2681625"/>
+            <a:ext cx="7772400" cy="3785652"/>
           </a:xfrm>
           <a:prstGeom prst="rect">
             <a:avLst/>
@@ -14667,38 +15926,431 @@
           <a:lstStyle/>
           <a:p>
             <a:r>
-              <a:rPr lang="pt-BR" sz="2000" b="1" dirty="0" err="1" smtClean="0"/>
-              <a:t>ServletContext</a:t>
-            </a:r>
-            <a:r>
-              <a:rPr lang="pt-BR" sz="2000" b="1" dirty="0" smtClean="0"/>
-              <a:t> encapsula informações sobre o contexto da aplicação.</a:t>
-            </a:r>
-          </a:p>
-          <a:p>
-            <a:endParaRPr lang="pt-BR" sz="2000" b="1" dirty="0" smtClean="0"/>
-          </a:p>
-          <a:p>
-            <a:r>
-              <a:rPr lang="pt-BR" sz="2000" b="1" dirty="0" smtClean="0"/>
-              <a:t>Qual finalidade </a:t>
-            </a:r>
-            <a:r>
-              <a:rPr lang="pt-BR" sz="2000" dirty="0" smtClean="0"/>
-              <a:t>?</a:t>
-            </a:r>
-          </a:p>
-          <a:p>
-            <a:r>
-              <a:rPr lang="pt-BR" sz="2000" b="1" dirty="0" smtClean="0"/>
-              <a:t>Com a referência do contexto da aplicação podemos interagir com a aplicação retornando informações, até mesmo entre os </a:t>
-            </a:r>
-            <a:r>
-              <a:rPr lang="pt-BR" sz="2000" b="1" dirty="0" err="1" smtClean="0"/>
-              <a:t>servlets</a:t>
-            </a:r>
-            <a:r>
-              <a:rPr lang="pt-BR" sz="2000" b="1" dirty="0" smtClean="0"/>
+              <a:rPr lang="en-US" sz="2000" b="1" dirty="0" smtClean="0"/>
+              <a:t>Listeners é </a:t>
+            </a:r>
+            <a:r>
+              <a:rPr lang="en-US" sz="2000" b="1" dirty="0" err="1" smtClean="0"/>
+              <a:t>uma</a:t>
+            </a:r>
+            <a:r>
+              <a:rPr lang="en-US" sz="2000" b="1" dirty="0" smtClean="0"/>
+              <a:t> forma de </a:t>
+            </a:r>
+            <a:r>
+              <a:rPr lang="en-US" sz="2000" b="1" dirty="0" err="1" smtClean="0"/>
+              <a:t>controlar</a:t>
+            </a:r>
+            <a:r>
+              <a:rPr lang="en-US" sz="2000" b="1" dirty="0" smtClean="0"/>
+              <a:t> o </a:t>
+            </a:r>
+            <a:r>
+              <a:rPr lang="en-US" sz="2000" b="1" dirty="0" err="1" smtClean="0"/>
+              <a:t>ciclo</a:t>
+            </a:r>
+            <a:r>
+              <a:rPr lang="en-US" sz="2000" b="1" dirty="0" smtClean="0"/>
+              <a:t> de </a:t>
+            </a:r>
+            <a:r>
+              <a:rPr lang="en-US" sz="2000" b="1" dirty="0" err="1" smtClean="0"/>
+              <a:t>vida</a:t>
+            </a:r>
+            <a:r>
+              <a:rPr lang="en-US" sz="2000" b="1" dirty="0" smtClean="0"/>
+              <a:t> do </a:t>
+            </a:r>
+            <a:r>
+              <a:rPr lang="en-US" sz="2000" b="1" dirty="0" err="1" smtClean="0"/>
+              <a:t>contexto</a:t>
+            </a:r>
+            <a:r>
+              <a:rPr lang="en-US" sz="2000" b="1" dirty="0" smtClean="0"/>
+              <a:t> da </a:t>
+            </a:r>
+            <a:r>
+              <a:rPr lang="en-US" sz="2000" b="1" dirty="0" err="1" smtClean="0"/>
+              <a:t>aplicação</a:t>
+            </a:r>
+            <a:r>
+              <a:rPr lang="en-US" sz="2000" b="1" dirty="0" smtClean="0"/>
+              <a:t>. Mas </a:t>
+            </a:r>
+            <a:r>
+              <a:rPr lang="en-US" sz="2000" b="1" dirty="0" err="1" smtClean="0"/>
+              <a:t>nesse</a:t>
+            </a:r>
+            <a:r>
+              <a:rPr lang="en-US" sz="2000" b="1" dirty="0" smtClean="0"/>
+              <a:t> </a:t>
+            </a:r>
+            <a:r>
+              <a:rPr lang="en-US" sz="2000" b="1" dirty="0" err="1" smtClean="0"/>
+              <a:t>momento</a:t>
+            </a:r>
+            <a:r>
+              <a:rPr lang="en-US" sz="2000" b="1" dirty="0" smtClean="0"/>
+              <a:t> </a:t>
+            </a:r>
+            <a:r>
+              <a:rPr lang="en-US" sz="2000" b="1" dirty="0" err="1" smtClean="0"/>
+              <a:t>não</a:t>
+            </a:r>
+            <a:r>
+              <a:rPr lang="en-US" sz="2000" b="1" dirty="0" smtClean="0"/>
+              <a:t> </a:t>
+            </a:r>
+            <a:r>
+              <a:rPr lang="en-US" sz="2000" b="1" dirty="0" err="1" smtClean="0"/>
+              <a:t>temos</a:t>
+            </a:r>
+            <a:r>
+              <a:rPr lang="en-US" sz="2000" b="1" dirty="0" smtClean="0"/>
+              <a:t> </a:t>
+            </a:r>
+            <a:r>
+              <a:rPr lang="en-US" sz="2000" b="1" dirty="0" err="1" smtClean="0"/>
+              <a:t>os</a:t>
+            </a:r>
+            <a:r>
+              <a:rPr lang="en-US" sz="2000" b="1" dirty="0" smtClean="0"/>
+              <a:t> </a:t>
+            </a:r>
+            <a:r>
+              <a:rPr lang="en-US" sz="2000" b="1" dirty="0" err="1" smtClean="0"/>
+              <a:t>métodos</a:t>
+            </a:r>
+            <a:r>
+              <a:rPr lang="en-US" sz="2000" b="1" dirty="0" smtClean="0"/>
+              <a:t> </a:t>
+            </a:r>
+            <a:r>
+              <a:rPr lang="en-US" sz="2000" b="1" dirty="0" err="1" smtClean="0"/>
+              <a:t>init</a:t>
+            </a:r>
+            <a:r>
+              <a:rPr lang="en-US" sz="2000" b="1" dirty="0" smtClean="0"/>
+              <a:t>() e destroy(). Para </a:t>
+            </a:r>
+            <a:r>
+              <a:rPr lang="en-US" sz="2000" b="1" dirty="0" err="1" smtClean="0"/>
+              <a:t>implementação</a:t>
+            </a:r>
+            <a:r>
+              <a:rPr lang="en-US" sz="2000" b="1" dirty="0" smtClean="0"/>
+              <a:t> do listeners </a:t>
+            </a:r>
+            <a:r>
+              <a:rPr lang="en-US" sz="2000" b="1" dirty="0" err="1" smtClean="0"/>
+              <a:t>devemos</a:t>
+            </a:r>
+            <a:r>
+              <a:rPr lang="en-US" sz="2000" b="1" dirty="0" smtClean="0"/>
+              <a:t> </a:t>
+            </a:r>
+            <a:r>
+              <a:rPr lang="en-US" sz="2000" b="1" dirty="0" err="1" smtClean="0"/>
+              <a:t>implementar</a:t>
+            </a:r>
+            <a:r>
+              <a:rPr lang="en-US" sz="2000" b="1" dirty="0" smtClean="0"/>
+              <a:t> a </a:t>
+            </a:r>
+            <a:r>
+              <a:rPr lang="en-US" sz="2000" b="1" dirty="0"/>
+              <a:t>interface </a:t>
+            </a:r>
+            <a:r>
+              <a:rPr lang="en-US" sz="2000" b="1" dirty="0" err="1" smtClean="0"/>
+              <a:t>ServletContextListener</a:t>
+            </a:r>
+            <a:r>
+              <a:rPr lang="en-US" sz="2000" b="1" dirty="0" smtClean="0"/>
+              <a:t>. </a:t>
+            </a:r>
+            <a:r>
+              <a:rPr lang="en-US" sz="2000" b="1" dirty="0" err="1" smtClean="0"/>
+              <a:t>Essa</a:t>
+            </a:r>
+            <a:r>
+              <a:rPr lang="en-US" sz="2000" b="1" dirty="0" smtClean="0"/>
+              <a:t> interface tem </a:t>
+            </a:r>
+            <a:r>
+              <a:rPr lang="en-US" sz="2000" b="1" dirty="0" err="1" smtClean="0"/>
+              <a:t>dois</a:t>
+            </a:r>
+            <a:r>
+              <a:rPr lang="en-US" sz="2000" b="1" dirty="0" smtClean="0"/>
+              <a:t> </a:t>
+            </a:r>
+            <a:r>
+              <a:rPr lang="en-US" sz="2000" b="1" dirty="0" err="1" smtClean="0"/>
+              <a:t>métodos</a:t>
+            </a:r>
+            <a:r>
+              <a:rPr lang="en-US" sz="2000" b="1" dirty="0" smtClean="0"/>
+              <a:t> </a:t>
+            </a:r>
+            <a:r>
+              <a:rPr lang="en-US" sz="2000" b="1" dirty="0" err="1" smtClean="0"/>
+              <a:t>que</a:t>
+            </a:r>
+            <a:r>
+              <a:rPr lang="en-US" sz="2000" b="1" dirty="0" smtClean="0"/>
+              <a:t> </a:t>
+            </a:r>
+            <a:r>
+              <a:rPr lang="en-US" sz="2000" b="1" dirty="0" err="1" smtClean="0"/>
+              <a:t>devemos</a:t>
+            </a:r>
+            <a:r>
+              <a:rPr lang="en-US" sz="2000" b="1" dirty="0"/>
+              <a:t> </a:t>
+            </a:r>
+            <a:r>
+              <a:rPr lang="en-US" sz="2000" b="1" dirty="0" err="1" smtClean="0"/>
+              <a:t>sobrescrever</a:t>
+            </a:r>
+            <a:r>
+              <a:rPr lang="en-US" sz="2000" b="1" dirty="0" smtClean="0"/>
+              <a:t>, </a:t>
+            </a:r>
+            <a:r>
+              <a:rPr lang="en-US" sz="2000" b="1" dirty="0" err="1" smtClean="0"/>
+              <a:t>são</a:t>
+            </a:r>
+            <a:r>
+              <a:rPr lang="en-US" sz="2000" b="1" dirty="0" smtClean="0"/>
+              <a:t> </a:t>
+            </a:r>
+            <a:r>
+              <a:rPr lang="en-US" sz="2000" b="1" dirty="0" err="1" smtClean="0"/>
+              <a:t>eles</a:t>
+            </a:r>
+            <a:r>
+              <a:rPr lang="en-US" sz="2000" b="1" dirty="0" smtClean="0"/>
+              <a:t>:</a:t>
+            </a:r>
+          </a:p>
+          <a:p>
+            <a:pPr marL="342900" indent="-342900">
+              <a:buFont typeface="Arial" panose="020B0604020202020204" pitchFamily="34" charset="0"/>
+              <a:buChar char="•"/>
+            </a:pPr>
+            <a:endParaRPr lang="en-US" sz="2000" b="1" dirty="0" smtClean="0"/>
+          </a:p>
+          <a:p>
+            <a:pPr marL="342900" indent="-342900">
+              <a:buFont typeface="Arial" panose="020B0604020202020204" pitchFamily="34" charset="0"/>
+              <a:buChar char="•"/>
+            </a:pPr>
+            <a:r>
+              <a:rPr lang="en-US" sz="2000" b="1" dirty="0" smtClean="0"/>
+              <a:t>public </a:t>
+            </a:r>
+            <a:r>
+              <a:rPr lang="en-US" sz="2000" b="1" dirty="0"/>
+              <a:t>void </a:t>
+            </a:r>
+            <a:r>
+              <a:rPr lang="en-US" sz="2000" b="1" dirty="0" err="1"/>
+              <a:t>contextInitialized</a:t>
+            </a:r>
+            <a:r>
+              <a:rPr lang="en-US" sz="2000" b="1" dirty="0"/>
+              <a:t>(</a:t>
+            </a:r>
+            <a:r>
+              <a:rPr lang="en-US" sz="2000" b="1" dirty="0" err="1"/>
+              <a:t>ServletContextEvent</a:t>
+            </a:r>
+            <a:r>
+              <a:rPr lang="en-US" sz="2000" b="1" dirty="0"/>
+              <a:t> e</a:t>
+            </a:r>
+            <a:r>
+              <a:rPr lang="en-US" sz="2000" b="1" dirty="0" smtClean="0"/>
+              <a:t>)</a:t>
+            </a:r>
+          </a:p>
+          <a:p>
+            <a:pPr marL="342900" indent="-342900">
+              <a:buFont typeface="Arial" panose="020B0604020202020204" pitchFamily="34" charset="0"/>
+              <a:buChar char="•"/>
+            </a:pPr>
+            <a:r>
+              <a:rPr lang="en-US" sz="2000" b="1" dirty="0" smtClean="0"/>
+              <a:t>public </a:t>
+            </a:r>
+            <a:r>
+              <a:rPr lang="en-US" sz="2000" b="1" dirty="0"/>
+              <a:t>void </a:t>
+            </a:r>
+            <a:r>
+              <a:rPr lang="en-US" sz="2000" b="1" dirty="0" err="1"/>
+              <a:t>contextDestroyed</a:t>
+            </a:r>
+            <a:r>
+              <a:rPr lang="en-US" sz="2000" b="1" dirty="0"/>
+              <a:t>(</a:t>
+            </a:r>
+            <a:r>
+              <a:rPr lang="en-US" sz="2000" b="1" dirty="0" err="1"/>
+              <a:t>ServletContextEvent</a:t>
+            </a:r>
+            <a:r>
+              <a:rPr lang="en-US" sz="2000" b="1" dirty="0"/>
+              <a:t> e</a:t>
+            </a:r>
+            <a:r>
+              <a:rPr lang="en-US" sz="2000" b="1" dirty="0" smtClean="0"/>
+              <a:t>)</a:t>
+            </a:r>
+          </a:p>
+          <a:p>
+            <a:pPr marL="342900" indent="-342900">
+              <a:buFont typeface="Arial" panose="020B0604020202020204" pitchFamily="34" charset="0"/>
+              <a:buChar char="•"/>
+            </a:pPr>
+            <a:endParaRPr lang="en-US" sz="2000" b="1" dirty="0"/>
+          </a:p>
+          <a:p>
+            <a:r>
+              <a:rPr lang="en-US" sz="2000" b="1" dirty="0" err="1" smtClean="0"/>
+              <a:t>Esses</a:t>
+            </a:r>
+            <a:r>
+              <a:rPr lang="en-US" sz="2000" b="1" dirty="0" smtClean="0"/>
+              <a:t> </a:t>
+            </a:r>
+            <a:r>
+              <a:rPr lang="en-US" sz="2000" b="1" dirty="0" err="1" smtClean="0"/>
+              <a:t>métodos</a:t>
+            </a:r>
+            <a:r>
+              <a:rPr lang="en-US" sz="2000" b="1" dirty="0" smtClean="0"/>
+              <a:t> </a:t>
+            </a:r>
+            <a:r>
+              <a:rPr lang="en-US" sz="2000" b="1" dirty="0" err="1" smtClean="0"/>
+              <a:t>são</a:t>
+            </a:r>
+            <a:r>
+              <a:rPr lang="en-US" sz="2000" b="1" dirty="0" smtClean="0"/>
+              <a:t> </a:t>
+            </a:r>
+            <a:r>
+              <a:rPr lang="en-US" sz="2000" b="1" dirty="0" err="1" smtClean="0"/>
+              <a:t>chamados</a:t>
+            </a:r>
+            <a:r>
+              <a:rPr lang="en-US" sz="2000" b="1" dirty="0" smtClean="0"/>
+              <a:t> </a:t>
+            </a:r>
+            <a:r>
+              <a:rPr lang="en-US" sz="2000" b="1" dirty="0" err="1" smtClean="0"/>
+              <a:t>depois</a:t>
+            </a:r>
+            <a:r>
+              <a:rPr lang="en-US" sz="2000" b="1" dirty="0" smtClean="0"/>
+              <a:t> </a:t>
+            </a:r>
+            <a:r>
+              <a:rPr lang="en-US" sz="2000" b="1" dirty="0" err="1" smtClean="0"/>
+              <a:t>que</a:t>
+            </a:r>
+            <a:r>
+              <a:rPr lang="en-US" sz="2000" b="1" dirty="0" smtClean="0"/>
+              <a:t> um </a:t>
+            </a:r>
+            <a:r>
+              <a:rPr lang="en-US" sz="2000" b="1" dirty="0" err="1" smtClean="0"/>
+              <a:t>contexto</a:t>
+            </a:r>
+            <a:r>
+              <a:rPr lang="en-US" sz="2000" b="1" dirty="0" smtClean="0"/>
+              <a:t> é </a:t>
+            </a:r>
+            <a:r>
+              <a:rPr lang="en-US" sz="2000" b="1" dirty="0" err="1" smtClean="0"/>
+              <a:t>criado</a:t>
+            </a:r>
+            <a:r>
+              <a:rPr lang="en-US" sz="2000" b="1" dirty="0" smtClean="0"/>
+              <a:t> e antes </a:t>
+            </a:r>
+            <a:r>
+              <a:rPr lang="en-US" sz="2000" b="1" dirty="0" err="1" smtClean="0"/>
+              <a:t>que</a:t>
+            </a:r>
+            <a:r>
+              <a:rPr lang="en-US" sz="2000" b="1" dirty="0" smtClean="0"/>
+              <a:t> </a:t>
+            </a:r>
+            <a:r>
+              <a:rPr lang="en-US" sz="2000" b="1" dirty="0" err="1" smtClean="0"/>
+              <a:t>ele</a:t>
+            </a:r>
+            <a:r>
+              <a:rPr lang="en-US" sz="2000" b="1" dirty="0" smtClean="0"/>
+              <a:t> </a:t>
+            </a:r>
+            <a:r>
+              <a:rPr lang="en-US" sz="2000" b="1" dirty="0" err="1" smtClean="0"/>
+              <a:t>seja</a:t>
+            </a:r>
+            <a:r>
+              <a:rPr lang="en-US" sz="2000" b="1" dirty="0" smtClean="0"/>
+              <a:t> </a:t>
+            </a:r>
+            <a:r>
+              <a:rPr lang="en-US" sz="2000" b="1" dirty="0" err="1" smtClean="0"/>
+              <a:t>destruído</a:t>
+            </a:r>
+            <a:r>
+              <a:rPr lang="en-US" sz="2000" b="1" dirty="0" smtClean="0"/>
+              <a:t>. A </a:t>
+            </a:r>
+            <a:r>
+              <a:rPr lang="en-US" sz="2000" b="1" dirty="0" err="1" smtClean="0"/>
+              <a:t>classe</a:t>
+            </a:r>
+            <a:r>
+              <a:rPr lang="en-US" sz="2000" b="1" dirty="0" smtClean="0"/>
+              <a:t> </a:t>
+            </a:r>
+            <a:r>
+              <a:rPr lang="en-US" sz="2000" b="1" dirty="0" err="1" smtClean="0"/>
+              <a:t>deve</a:t>
+            </a:r>
+            <a:r>
+              <a:rPr lang="en-US" sz="2000" b="1" dirty="0" smtClean="0"/>
+              <a:t> </a:t>
+            </a:r>
+            <a:r>
+              <a:rPr lang="en-US" sz="2000" b="1" dirty="0" err="1" smtClean="0"/>
+              <a:t>conter</a:t>
+            </a:r>
+            <a:r>
+              <a:rPr lang="en-US" sz="2000" b="1" dirty="0" smtClean="0"/>
+              <a:t> a </a:t>
+            </a:r>
+            <a:r>
+              <a:rPr lang="en-US" sz="2000" b="1" dirty="0" err="1" smtClean="0"/>
+              <a:t>anotação</a:t>
+            </a:r>
+            <a:r>
+              <a:rPr lang="en-US" sz="2000" b="1" dirty="0" smtClean="0"/>
+              <a:t> @</a:t>
+            </a:r>
+            <a:r>
+              <a:rPr lang="en-US" sz="2000" b="1" dirty="0" err="1" smtClean="0"/>
+              <a:t>WebListener</a:t>
+            </a:r>
+            <a:r>
+              <a:rPr lang="en-US" sz="2000" b="1" dirty="0" smtClean="0"/>
               <a:t>.</a:t>
             </a:r>
             <a:endParaRPr lang="en-US" sz="2000" b="1" dirty="0"/>
@@ -14708,7 +16360,7 @@
     </p:spTree>
     <p:extLst>
       <p:ext uri="{BB962C8B-B14F-4D97-AF65-F5344CB8AC3E}">
-        <p14:creationId xmlns:p14="http://schemas.microsoft.com/office/powerpoint/2010/main" val="435609940"/>
+        <p14:creationId xmlns:p14="http://schemas.microsoft.com/office/powerpoint/2010/main" val="949538902"/>
       </p:ext>
     </p:extLst>
   </p:cSld>
@@ -14761,8 +16413,8 @@
           <a:lstStyle/>
           <a:p>
             <a:r>
-              <a:rPr lang="pt-BR" sz="4000" dirty="0" err="1" smtClean="0"/>
-              <a:t>Listeners</a:t>
+              <a:rPr lang="pt-BR" sz="4000" dirty="0" smtClean="0"/>
+              <a:t>Sessões</a:t>
             </a:r>
             <a:endParaRPr lang="pt-BR" sz="4000" dirty="0"/>
           </a:p>
@@ -14783,7 +16435,7 @@
         <p:spPr>
           <a:xfrm>
             <a:off x="685800" y="2681625"/>
-            <a:ext cx="7772400" cy="3785652"/>
+            <a:ext cx="7772400" cy="1323439"/>
           </a:xfrm>
           <a:prstGeom prst="rect">
             <a:avLst/>
@@ -14796,441 +16448,71 @@
           <a:lstStyle/>
           <a:p>
             <a:r>
-              <a:rPr lang="en-US" sz="2000" b="1" dirty="0" smtClean="0"/>
-              <a:t>Listeners é </a:t>
-            </a:r>
-            <a:r>
-              <a:rPr lang="en-US" sz="2000" b="1" dirty="0" err="1" smtClean="0"/>
-              <a:t>uma</a:t>
-            </a:r>
-            <a:r>
-              <a:rPr lang="en-US" sz="2000" b="1" dirty="0" smtClean="0"/>
-              <a:t> forma de </a:t>
-            </a:r>
-            <a:r>
-              <a:rPr lang="en-US" sz="2000" b="1" dirty="0" err="1" smtClean="0"/>
-              <a:t>controlar</a:t>
-            </a:r>
-            <a:r>
-              <a:rPr lang="en-US" sz="2000" b="1" dirty="0" smtClean="0"/>
-              <a:t> o </a:t>
-            </a:r>
-            <a:r>
-              <a:rPr lang="en-US" sz="2000" b="1" dirty="0" err="1" smtClean="0"/>
-              <a:t>ciclo</a:t>
-            </a:r>
-            <a:r>
-              <a:rPr lang="en-US" sz="2000" b="1" dirty="0" smtClean="0"/>
-              <a:t> de </a:t>
-            </a:r>
-            <a:r>
-              <a:rPr lang="en-US" sz="2000" b="1" dirty="0" err="1" smtClean="0"/>
-              <a:t>vida</a:t>
-            </a:r>
-            <a:r>
-              <a:rPr lang="en-US" sz="2000" b="1" dirty="0" smtClean="0"/>
-              <a:t> do </a:t>
-            </a:r>
-            <a:r>
-              <a:rPr lang="en-US" sz="2000" b="1" dirty="0" err="1" smtClean="0"/>
-              <a:t>contexto</a:t>
-            </a:r>
-            <a:r>
-              <a:rPr lang="en-US" sz="2000" b="1" dirty="0" smtClean="0"/>
-              <a:t> da </a:t>
-            </a:r>
-            <a:r>
-              <a:rPr lang="en-US" sz="2000" b="1" dirty="0" err="1" smtClean="0"/>
-              <a:t>aplicação</a:t>
-            </a:r>
-            <a:r>
-              <a:rPr lang="en-US" sz="2000" b="1" dirty="0" smtClean="0"/>
-              <a:t>. Mas </a:t>
-            </a:r>
-            <a:r>
-              <a:rPr lang="en-US" sz="2000" b="1" dirty="0" err="1" smtClean="0"/>
-              <a:t>nesse</a:t>
-            </a:r>
-            <a:r>
-              <a:rPr lang="en-US" sz="2000" b="1" dirty="0" smtClean="0"/>
-              <a:t> </a:t>
-            </a:r>
-            <a:r>
-              <a:rPr lang="en-US" sz="2000" b="1" dirty="0" err="1" smtClean="0"/>
-              <a:t>momento</a:t>
-            </a:r>
-            <a:r>
-              <a:rPr lang="en-US" sz="2000" b="1" dirty="0" smtClean="0"/>
-              <a:t> </a:t>
-            </a:r>
-            <a:r>
-              <a:rPr lang="en-US" sz="2000" b="1" dirty="0" err="1" smtClean="0"/>
-              <a:t>não</a:t>
-            </a:r>
-            <a:r>
-              <a:rPr lang="en-US" sz="2000" b="1" dirty="0" smtClean="0"/>
-              <a:t> </a:t>
-            </a:r>
-            <a:r>
-              <a:rPr lang="en-US" sz="2000" b="1" dirty="0" err="1" smtClean="0"/>
-              <a:t>temos</a:t>
-            </a:r>
-            <a:r>
-              <a:rPr lang="en-US" sz="2000" b="1" dirty="0" smtClean="0"/>
-              <a:t> </a:t>
-            </a:r>
-            <a:r>
-              <a:rPr lang="en-US" sz="2000" b="1" dirty="0" err="1" smtClean="0"/>
-              <a:t>os</a:t>
-            </a:r>
-            <a:r>
-              <a:rPr lang="en-US" sz="2000" b="1" dirty="0" smtClean="0"/>
-              <a:t> </a:t>
-            </a:r>
-            <a:r>
-              <a:rPr lang="en-US" sz="2000" b="1" dirty="0" err="1" smtClean="0"/>
-              <a:t>métodos</a:t>
-            </a:r>
-            <a:r>
-              <a:rPr lang="en-US" sz="2000" b="1" dirty="0" smtClean="0"/>
-              <a:t> </a:t>
-            </a:r>
-            <a:r>
-              <a:rPr lang="en-US" sz="2000" b="1" dirty="0" err="1" smtClean="0"/>
-              <a:t>init</a:t>
-            </a:r>
-            <a:r>
-              <a:rPr lang="en-US" sz="2000" b="1" dirty="0" smtClean="0"/>
-              <a:t>() e destroy(). Para </a:t>
-            </a:r>
-            <a:r>
-              <a:rPr lang="en-US" sz="2000" b="1" dirty="0" err="1" smtClean="0"/>
-              <a:t>implementação</a:t>
-            </a:r>
-            <a:r>
-              <a:rPr lang="en-US" sz="2000" b="1" dirty="0" smtClean="0"/>
-              <a:t> do listeners </a:t>
-            </a:r>
-            <a:r>
-              <a:rPr lang="en-US" sz="2000" b="1" dirty="0" err="1" smtClean="0"/>
-              <a:t>devemos</a:t>
-            </a:r>
-            <a:r>
-              <a:rPr lang="en-US" sz="2000" b="1" dirty="0" smtClean="0"/>
-              <a:t> </a:t>
-            </a:r>
-            <a:r>
-              <a:rPr lang="en-US" sz="2000" b="1" dirty="0" err="1" smtClean="0"/>
-              <a:t>implementar</a:t>
-            </a:r>
-            <a:r>
-              <a:rPr lang="en-US" sz="2000" b="1" dirty="0" smtClean="0"/>
-              <a:t> a </a:t>
-            </a:r>
-            <a:r>
-              <a:rPr lang="en-US" sz="2000" b="1" dirty="0"/>
-              <a:t>interface </a:t>
-            </a:r>
-            <a:r>
-              <a:rPr lang="en-US" sz="2000" b="1" dirty="0" err="1" smtClean="0"/>
-              <a:t>ServletContextListener</a:t>
-            </a:r>
-            <a:r>
-              <a:rPr lang="en-US" sz="2000" b="1" dirty="0" smtClean="0"/>
-              <a:t>. </a:t>
-            </a:r>
-            <a:r>
-              <a:rPr lang="en-US" sz="2000" b="1" dirty="0" err="1" smtClean="0"/>
-              <a:t>Essa</a:t>
-            </a:r>
-            <a:r>
-              <a:rPr lang="en-US" sz="2000" b="1" dirty="0" smtClean="0"/>
-              <a:t> interface tem </a:t>
-            </a:r>
-            <a:r>
-              <a:rPr lang="en-US" sz="2000" b="1" dirty="0" err="1" smtClean="0"/>
-              <a:t>dois</a:t>
-            </a:r>
-            <a:r>
-              <a:rPr lang="en-US" sz="2000" b="1" dirty="0" smtClean="0"/>
-              <a:t> </a:t>
-            </a:r>
-            <a:r>
-              <a:rPr lang="en-US" sz="2000" b="1" dirty="0" err="1" smtClean="0"/>
-              <a:t>métodos</a:t>
-            </a:r>
-            <a:r>
-              <a:rPr lang="en-US" sz="2000" b="1" dirty="0" smtClean="0"/>
-              <a:t> </a:t>
-            </a:r>
-            <a:r>
-              <a:rPr lang="en-US" sz="2000" b="1" dirty="0" err="1" smtClean="0"/>
-              <a:t>que</a:t>
-            </a:r>
-            <a:r>
-              <a:rPr lang="en-US" sz="2000" b="1" dirty="0" smtClean="0"/>
-              <a:t> </a:t>
-            </a:r>
-            <a:r>
-              <a:rPr lang="en-US" sz="2000" b="1" dirty="0" err="1" smtClean="0"/>
-              <a:t>devemos</a:t>
-            </a:r>
-            <a:r>
-              <a:rPr lang="en-US" sz="2000" b="1" dirty="0"/>
-              <a:t> </a:t>
-            </a:r>
-            <a:r>
-              <a:rPr lang="en-US" sz="2000" b="1" dirty="0" err="1" smtClean="0"/>
-              <a:t>sobrescrever</a:t>
-            </a:r>
-            <a:r>
-              <a:rPr lang="en-US" sz="2000" b="1" dirty="0" smtClean="0"/>
-              <a:t>, </a:t>
-            </a:r>
-            <a:r>
-              <a:rPr lang="en-US" sz="2000" b="1" dirty="0" err="1" smtClean="0"/>
-              <a:t>são</a:t>
-            </a:r>
-            <a:r>
-              <a:rPr lang="en-US" sz="2000" b="1" dirty="0" smtClean="0"/>
-              <a:t> </a:t>
-            </a:r>
-            <a:r>
-              <a:rPr lang="en-US" sz="2000" b="1" dirty="0" err="1" smtClean="0"/>
-              <a:t>eles</a:t>
-            </a:r>
-            <a:r>
-              <a:rPr lang="en-US" sz="2000" b="1" dirty="0" smtClean="0"/>
-              <a:t>:</a:t>
-            </a:r>
-          </a:p>
-          <a:p>
-            <a:pPr marL="342900" indent="-342900">
-              <a:buFont typeface="Arial" panose="020B0604020202020204" pitchFamily="34" charset="0"/>
-              <a:buChar char="•"/>
-            </a:pPr>
-            <a:endParaRPr lang="en-US" sz="2000" b="1" dirty="0" smtClean="0"/>
-          </a:p>
-          <a:p>
-            <a:pPr marL="342900" indent="-342900">
-              <a:buFont typeface="Arial" panose="020B0604020202020204" pitchFamily="34" charset="0"/>
-              <a:buChar char="•"/>
-            </a:pPr>
-            <a:r>
-              <a:rPr lang="en-US" sz="2000" b="1" dirty="0" smtClean="0"/>
-              <a:t>public </a:t>
-            </a:r>
-            <a:r>
-              <a:rPr lang="en-US" sz="2000" b="1" dirty="0"/>
-              <a:t>void </a:t>
-            </a:r>
-            <a:r>
-              <a:rPr lang="en-US" sz="2000" b="1" dirty="0" err="1"/>
-              <a:t>contextInitialized</a:t>
-            </a:r>
-            <a:r>
-              <a:rPr lang="en-US" sz="2000" b="1" dirty="0"/>
-              <a:t>(</a:t>
-            </a:r>
-            <a:r>
-              <a:rPr lang="en-US" sz="2000" b="1" dirty="0" err="1"/>
-              <a:t>ServletContextEvent</a:t>
-            </a:r>
-            <a:r>
-              <a:rPr lang="en-US" sz="2000" b="1" dirty="0"/>
-              <a:t> e</a:t>
-            </a:r>
-            <a:r>
-              <a:rPr lang="en-US" sz="2000" b="1" dirty="0" smtClean="0"/>
-              <a:t>)</a:t>
-            </a:r>
-          </a:p>
-          <a:p>
-            <a:pPr marL="342900" indent="-342900">
-              <a:buFont typeface="Arial" panose="020B0604020202020204" pitchFamily="34" charset="0"/>
-              <a:buChar char="•"/>
-            </a:pPr>
-            <a:r>
-              <a:rPr lang="en-US" sz="2000" b="1" dirty="0" smtClean="0"/>
-              <a:t>public </a:t>
-            </a:r>
-            <a:r>
-              <a:rPr lang="en-US" sz="2000" b="1" dirty="0"/>
-              <a:t>void </a:t>
-            </a:r>
-            <a:r>
-              <a:rPr lang="en-US" sz="2000" b="1" dirty="0" err="1"/>
-              <a:t>contextDestroyed</a:t>
-            </a:r>
-            <a:r>
-              <a:rPr lang="en-US" sz="2000" b="1" dirty="0"/>
-              <a:t>(</a:t>
-            </a:r>
-            <a:r>
-              <a:rPr lang="en-US" sz="2000" b="1" dirty="0" err="1"/>
-              <a:t>ServletContextEvent</a:t>
-            </a:r>
-            <a:r>
-              <a:rPr lang="en-US" sz="2000" b="1" dirty="0"/>
-              <a:t> e</a:t>
-            </a:r>
-            <a:r>
-              <a:rPr lang="en-US" sz="2000" b="1" dirty="0" smtClean="0"/>
-              <a:t>)</a:t>
-            </a:r>
-          </a:p>
-          <a:p>
-            <a:pPr marL="342900" indent="-342900">
-              <a:buFont typeface="Arial" panose="020B0604020202020204" pitchFamily="34" charset="0"/>
-              <a:buChar char="•"/>
-            </a:pPr>
-            <a:endParaRPr lang="en-US" sz="2000" b="1" dirty="0"/>
-          </a:p>
-          <a:p>
-            <a:r>
-              <a:rPr lang="en-US" sz="2000" b="1" dirty="0" err="1" smtClean="0"/>
-              <a:t>Esses</a:t>
-            </a:r>
-            <a:r>
-              <a:rPr lang="en-US" sz="2000" b="1" dirty="0" smtClean="0"/>
-              <a:t> </a:t>
-            </a:r>
-            <a:r>
-              <a:rPr lang="en-US" sz="2000" b="1" dirty="0" err="1" smtClean="0"/>
-              <a:t>métodos</a:t>
-            </a:r>
-            <a:r>
-              <a:rPr lang="en-US" sz="2000" b="1" dirty="0" smtClean="0"/>
-              <a:t> </a:t>
-            </a:r>
-            <a:r>
-              <a:rPr lang="en-US" sz="2000" b="1" dirty="0" err="1" smtClean="0"/>
-              <a:t>são</a:t>
-            </a:r>
-            <a:r>
-              <a:rPr lang="en-US" sz="2000" b="1" dirty="0" smtClean="0"/>
-              <a:t> </a:t>
-            </a:r>
-            <a:r>
-              <a:rPr lang="en-US" sz="2000" b="1" dirty="0" err="1" smtClean="0"/>
-              <a:t>chamados</a:t>
-            </a:r>
-            <a:r>
-              <a:rPr lang="en-US" sz="2000" b="1" dirty="0" smtClean="0"/>
-              <a:t> </a:t>
-            </a:r>
-            <a:r>
-              <a:rPr lang="en-US" sz="2000" b="1" dirty="0" err="1" smtClean="0"/>
-              <a:t>depois</a:t>
-            </a:r>
-            <a:r>
-              <a:rPr lang="en-US" sz="2000" b="1" dirty="0" smtClean="0"/>
-              <a:t> </a:t>
-            </a:r>
-            <a:r>
-              <a:rPr lang="en-US" sz="2000" b="1" dirty="0" err="1" smtClean="0"/>
-              <a:t>que</a:t>
-            </a:r>
-            <a:r>
-              <a:rPr lang="en-US" sz="2000" b="1" dirty="0" smtClean="0"/>
-              <a:t> um </a:t>
-            </a:r>
-            <a:r>
-              <a:rPr lang="en-US" sz="2000" b="1" dirty="0" err="1" smtClean="0"/>
-              <a:t>contexto</a:t>
-            </a:r>
-            <a:r>
-              <a:rPr lang="en-US" sz="2000" b="1" dirty="0" smtClean="0"/>
-              <a:t> é </a:t>
-            </a:r>
-            <a:r>
-              <a:rPr lang="en-US" sz="2000" b="1" dirty="0" err="1" smtClean="0"/>
-              <a:t>criado</a:t>
-            </a:r>
-            <a:r>
-              <a:rPr lang="en-US" sz="2000" b="1" dirty="0" smtClean="0"/>
-              <a:t> e antes </a:t>
-            </a:r>
-            <a:r>
-              <a:rPr lang="en-US" sz="2000" b="1" dirty="0" err="1" smtClean="0"/>
-              <a:t>que</a:t>
-            </a:r>
-            <a:r>
-              <a:rPr lang="en-US" sz="2000" b="1" dirty="0" smtClean="0"/>
-              <a:t> </a:t>
-            </a:r>
-            <a:r>
-              <a:rPr lang="en-US" sz="2000" b="1" dirty="0" err="1" smtClean="0"/>
-              <a:t>ele</a:t>
-            </a:r>
-            <a:r>
-              <a:rPr lang="en-US" sz="2000" b="1" dirty="0" smtClean="0"/>
-              <a:t> </a:t>
-            </a:r>
-            <a:r>
-              <a:rPr lang="en-US" sz="2000" b="1" dirty="0" err="1" smtClean="0"/>
-              <a:t>seja</a:t>
-            </a:r>
-            <a:r>
-              <a:rPr lang="en-US" sz="2000" b="1" dirty="0" smtClean="0"/>
-              <a:t> </a:t>
-            </a:r>
-            <a:r>
-              <a:rPr lang="en-US" sz="2000" b="1" dirty="0" err="1" smtClean="0"/>
-              <a:t>destruído</a:t>
-            </a:r>
-            <a:r>
-              <a:rPr lang="en-US" sz="2000" b="1" dirty="0" smtClean="0"/>
-              <a:t>. A </a:t>
-            </a:r>
-            <a:r>
-              <a:rPr lang="en-US" sz="2000" b="1" dirty="0" err="1" smtClean="0"/>
-              <a:t>classe</a:t>
-            </a:r>
-            <a:r>
-              <a:rPr lang="en-US" sz="2000" b="1" dirty="0" smtClean="0"/>
-              <a:t> </a:t>
-            </a:r>
-            <a:r>
-              <a:rPr lang="en-US" sz="2000" b="1" dirty="0" err="1" smtClean="0"/>
-              <a:t>deve</a:t>
-            </a:r>
-            <a:r>
-              <a:rPr lang="en-US" sz="2000" b="1" dirty="0" smtClean="0"/>
-              <a:t> </a:t>
-            </a:r>
-            <a:r>
-              <a:rPr lang="en-US" sz="2000" b="1" dirty="0" err="1" smtClean="0"/>
-              <a:t>conter</a:t>
-            </a:r>
-            <a:r>
-              <a:rPr lang="en-US" sz="2000" b="1" dirty="0" smtClean="0"/>
-              <a:t> a </a:t>
-            </a:r>
-            <a:r>
-              <a:rPr lang="en-US" sz="2000" b="1" dirty="0" err="1" smtClean="0"/>
-              <a:t>anotação</a:t>
-            </a:r>
-            <a:r>
-              <a:rPr lang="en-US" sz="2000" b="1" dirty="0" smtClean="0"/>
-              <a:t> @</a:t>
-            </a:r>
-            <a:r>
-              <a:rPr lang="en-US" sz="2000" b="1" dirty="0" err="1" smtClean="0"/>
-              <a:t>WebListener</a:t>
-            </a:r>
-            <a:r>
-              <a:rPr lang="en-US" sz="2000" b="1" dirty="0" smtClean="0"/>
-              <a:t>.</a:t>
+              <a:rPr lang="pt-BR" sz="2000" b="1" dirty="0" smtClean="0"/>
+              <a:t>Tendo como base que os sistemas são desenvolvidos com base no protocolo HTTP, que não mantém estado, é necessário utilizar do recurso de sessões para guardar estados de objetos entre navegações de páginas.</a:t>
             </a:r>
             <a:endParaRPr lang="en-US" sz="2000" b="1" dirty="0"/>
           </a:p>
         </p:txBody>
       </p:sp>
+      <p:pic>
+        <p:nvPicPr>
+          <p:cNvPr id="1026" name="Picture 2"/>
+          <p:cNvPicPr>
+            <a:picLocks noChangeAspect="1" noChangeArrowheads="1"/>
+          </p:cNvPicPr>
+          <p:nvPr/>
+        </p:nvPicPr>
+        <p:blipFill>
+          <a:blip r:embed="rId3">
+            <a:extLst>
+              <a:ext uri="{28A0092B-C50C-407E-A947-70E740481C1C}">
+                <a14:useLocalDpi xmlns:a14="http://schemas.microsoft.com/office/drawing/2010/main" val="0"/>
+              </a:ext>
+            </a:extLst>
+          </a:blip>
+          <a:srcRect/>
+          <a:stretch>
+            <a:fillRect/>
+          </a:stretch>
+        </p:blipFill>
+        <p:spPr bwMode="auto">
+          <a:xfrm>
+            <a:off x="685800" y="4097254"/>
+            <a:ext cx="7772400" cy="2500098"/>
+          </a:xfrm>
+          <a:prstGeom prst="rect">
+            <a:avLst/>
+          </a:prstGeom>
+          <a:noFill/>
+          <a:ln>
+            <a:noFill/>
+          </a:ln>
+          <a:extLst>
+            <a:ext uri="{909E8E84-426E-40DD-AFC4-6F175D3DCCD1}">
+              <a14:hiddenFill xmlns:a14="http://schemas.microsoft.com/office/drawing/2010/main">
+                <a:solidFill>
+                  <a:schemeClr val="accent1"/>
+                </a:solidFill>
+              </a14:hiddenFill>
+            </a:ext>
+            <a:ext uri="{91240B29-F687-4F45-9708-019B960494DF}">
+              <a14:hiddenLine xmlns:a14="http://schemas.microsoft.com/office/drawing/2010/main" w="9525">
+                <a:solidFill>
+                  <a:schemeClr val="tx1"/>
+                </a:solidFill>
+                <a:miter lim="800000"/>
+                <a:headEnd/>
+                <a:tailEnd/>
+              </a14:hiddenLine>
+            </a:ext>
+          </a:extLst>
+        </p:spPr>
+      </p:pic>
     </p:spTree>
     <p:extLst>
       <p:ext uri="{BB962C8B-B14F-4D97-AF65-F5344CB8AC3E}">
-        <p14:creationId xmlns:p14="http://schemas.microsoft.com/office/powerpoint/2010/main" val="949538902"/>
+        <p14:creationId xmlns:p14="http://schemas.microsoft.com/office/powerpoint/2010/main" val="1068927343"/>
       </p:ext>
     </p:extLst>
   </p:cSld>
@@ -15284,11 +16566,7 @@
           <a:p>
             <a:r>
               <a:rPr lang="pt-BR" sz="4000" dirty="0" smtClean="0"/>
-              <a:t>Sess</a:t>
-            </a:r>
-            <a:r>
-              <a:rPr lang="pt-BR" sz="4000" dirty="0" smtClean="0"/>
-              <a:t>ões</a:t>
+              <a:t>Sessões</a:t>
             </a:r>
             <a:endParaRPr lang="pt-BR" sz="4000" dirty="0"/>
           </a:p>
@@ -15321,96 +16599,438 @@
           </a:bodyPr>
           <a:lstStyle/>
           <a:p>
-            <a:r>
-              <a:rPr lang="pt-BR" sz="2000" b="1" dirty="0"/>
-              <a:t>Uma sessão HTTP representa o tempo que um cliente acessa uma pagina ou domínio. </a:t>
-            </a:r>
+            <a:pPr marL="342900" indent="-342900">
+              <a:buFont typeface="Arial" panose="020B0604020202020204" pitchFamily="34" charset="0"/>
+              <a:buChar char="•"/>
+            </a:pPr>
             <a:r>
               <a:rPr lang="pt-BR" sz="2000" b="1" dirty="0" smtClean="0"/>
-              <a:t>Uma sessão </a:t>
-            </a:r>
-            <a:r>
-              <a:rPr lang="pt-BR" sz="2000" b="1" dirty="0"/>
-              <a:t>é iniciada com uma requisição, é única para cada </a:t>
-            </a:r>
+              <a:t>Cookies</a:t>
+            </a:r>
+          </a:p>
+          <a:p>
+            <a:pPr marL="342900" indent="-342900">
+              <a:buFont typeface="Arial" panose="020B0604020202020204" pitchFamily="34" charset="0"/>
+              <a:buChar char="•"/>
+            </a:pPr>
             <a:r>
               <a:rPr lang="pt-BR" sz="2000" b="1" dirty="0" smtClean="0"/>
-              <a:t>cliente(browser) </a:t>
-            </a:r>
-            <a:r>
-              <a:rPr lang="pt-BR" sz="2000" b="1" dirty="0"/>
-              <a:t>e persiste através de </a:t>
-            </a:r>
+              <a:t>Atributos de sessão</a:t>
+            </a:r>
+          </a:p>
+          <a:p>
+            <a:pPr marL="342900" indent="-342900">
+              <a:buFont typeface="Arial" panose="020B0604020202020204" pitchFamily="34" charset="0"/>
+              <a:buChar char="•"/>
+            </a:pPr>
             <a:r>
               <a:rPr lang="pt-BR" sz="2000" b="1" dirty="0" smtClean="0"/>
-              <a:t>várias requisições</a:t>
-            </a:r>
-            <a:r>
-              <a:rPr lang="pt-BR" sz="2000" b="1" dirty="0"/>
-              <a:t>.</a:t>
-            </a:r>
-            <a:endParaRPr lang="en-US" sz="2000" b="1" dirty="0"/>
+              <a:t>Validade de uma </a:t>
+            </a:r>
+            <a:r>
+              <a:rPr lang="pt-BR" sz="2000" b="1" dirty="0" smtClean="0"/>
+              <a:t>sessão</a:t>
+            </a:r>
+          </a:p>
+          <a:p>
+            <a:endParaRPr lang="pt-BR" sz="2000" b="1" dirty="0" smtClean="0"/>
           </a:p>
         </p:txBody>
       </p:sp>
-      <p:pic>
-        <p:nvPicPr>
-          <p:cNvPr id="1026" name="Picture 2"/>
-          <p:cNvPicPr>
-            <a:picLocks noChangeAspect="1" noChangeArrowheads="1"/>
-          </p:cNvPicPr>
-          <p:nvPr/>
-        </p:nvPicPr>
-        <p:blipFill>
-          <a:blip r:embed="rId3">
+    </p:spTree>
+    <p:extLst>
+      <p:ext uri="{BB962C8B-B14F-4D97-AF65-F5344CB8AC3E}">
+        <p14:creationId xmlns:p14="http://schemas.microsoft.com/office/powerpoint/2010/main" val="1456758856"/>
+      </p:ext>
+    </p:extLst>
+  </p:cSld>
+  <p:clrMapOvr>
+    <a:masterClrMapping/>
+  </p:clrMapOvr>
+  <p:transition>
+    <p:fade/>
+  </p:transition>
+</p:sld>
+</file>
+
+<file path=ppt/slides/slide17.xml><?xml version="1.0" encoding="utf-8"?>
+<p:sld xmlns:a="http://schemas.openxmlformats.org/drawingml/2006/main" xmlns:r="http://schemas.openxmlformats.org/officeDocument/2006/relationships" xmlns:p="http://schemas.openxmlformats.org/presentationml/2006/main">
+  <p:cSld>
+    <p:spTree>
+      <p:nvGrpSpPr>
+        <p:cNvPr id="1" name=""/>
+        <p:cNvGrpSpPr/>
+        <p:nvPr/>
+      </p:nvGrpSpPr>
+      <p:grpSpPr>
+        <a:xfrm>
+          <a:off x="0" y="0"/>
+          <a:ext cx="0" cy="0"/>
+          <a:chOff x="0" y="0"/>
+          <a:chExt cx="0" cy="0"/>
+        </a:xfrm>
+      </p:grpSpPr>
+      <p:sp>
+        <p:nvSpPr>
+          <p:cNvPr id="3" name="Rectangle 8"/>
+          <p:cNvSpPr>
+            <a:spLocks noGrp="1"/>
+          </p:cNvSpPr>
+          <p:nvPr>
+            <p:ph type="title"/>
+          </p:nvPr>
+        </p:nvSpPr>
+        <p:spPr>
+          <a:xfrm>
+            <a:off x="228600" y="1676400"/>
+            <a:ext cx="8229600" cy="1143000"/>
+          </a:xfrm>
+        </p:spPr>
+        <p:txBody>
+          <a:bodyPr>
+            <a:noAutofit/>
+          </a:bodyPr>
+          <a:lstStyle/>
+          <a:p>
+            <a:r>
+              <a:rPr lang="pt-BR" sz="4000" dirty="0" smtClean="0"/>
+              <a:t>Escopos</a:t>
+            </a:r>
+            <a:endParaRPr lang="pt-BR" sz="4000" dirty="0"/>
+          </a:p>
+        </p:txBody>
+      </p:sp>
+      <p:sp>
+        <p:nvSpPr>
+          <p:cNvPr id="7" name="Retângulo 6">
             <a:extLst>
-              <a:ext uri="{28A0092B-C50C-407E-A947-70E740481C1C}">
-                <a14:useLocalDpi xmlns:a14="http://schemas.microsoft.com/office/drawing/2010/main" val="0"/>
+              <a:ext uri="{FF2B5EF4-FFF2-40B4-BE49-F238E27FC236}">
+                <a16:creationId xmlns:a16="http://schemas.microsoft.com/office/drawing/2014/main" xmlns="" id="{DE871D51-6822-455D-8B97-7F37D0BA5BB9}"/>
               </a:ext>
             </a:extLst>
-          </a:blip>
-          <a:srcRect/>
-          <a:stretch>
-            <a:fillRect/>
-          </a:stretch>
-        </p:blipFill>
-        <p:spPr bwMode="auto">
+          </p:cNvPr>
+          <p:cNvSpPr/>
+          <p:nvPr/>
+        </p:nvSpPr>
+        <p:spPr>
           <a:xfrm>
-            <a:off x="685800" y="4097254"/>
-            <a:ext cx="7772400" cy="2500098"/>
+            <a:off x="685800" y="2681625"/>
+            <a:ext cx="7772400" cy="1938992"/>
           </a:xfrm>
           <a:prstGeom prst="rect">
             <a:avLst/>
           </a:prstGeom>
-          <a:noFill/>
-          <a:ln>
-            <a:noFill/>
-          </a:ln>
-          <a:extLst>
-            <a:ext uri="{909E8E84-426E-40DD-AFC4-6F175D3DCCD1}">
-              <a14:hiddenFill xmlns:a14="http://schemas.microsoft.com/office/drawing/2010/main">
-                <a:solidFill>
-                  <a:schemeClr val="accent1"/>
-                </a:solidFill>
-              </a14:hiddenFill>
-            </a:ext>
-            <a:ext uri="{91240B29-F687-4F45-9708-019B960494DF}">
-              <a14:hiddenLine xmlns:a14="http://schemas.microsoft.com/office/drawing/2010/main" w="9525">
-                <a:solidFill>
-                  <a:schemeClr val="tx1"/>
-                </a:solidFill>
-                <a:miter lim="800000"/>
-                <a:headEnd/>
-                <a:tailEnd/>
-              </a14:hiddenLine>
-            </a:ext>
-          </a:extLst>
         </p:spPr>
-      </p:pic>
+        <p:txBody>
+          <a:bodyPr wrap="square">
+            <a:spAutoFit/>
+          </a:bodyPr>
+          <a:lstStyle/>
+          <a:p>
+            <a:r>
+              <a:rPr lang="pt-BR" sz="2000" b="1" dirty="0" err="1" smtClean="0"/>
+              <a:t>Servlets</a:t>
+            </a:r>
+            <a:r>
+              <a:rPr lang="pt-BR" sz="2000" b="1" dirty="0"/>
+              <a:t> </a:t>
+            </a:r>
+            <a:r>
+              <a:rPr lang="pt-BR" sz="2000" b="1" dirty="0" smtClean="0"/>
+              <a:t>compartilham informações de diversas maneiras, iremos abordar 2 formas:</a:t>
+            </a:r>
+          </a:p>
+          <a:p>
+            <a:pPr marL="342900" indent="-342900">
+              <a:buFont typeface="Arial" panose="020B0604020202020204" pitchFamily="34" charset="0"/>
+              <a:buChar char="•"/>
+            </a:pPr>
+            <a:endParaRPr lang="pt-BR" sz="2000" b="1" dirty="0" smtClean="0"/>
+          </a:p>
+          <a:p>
+            <a:pPr marL="342900" indent="-342900">
+              <a:buFont typeface="Arial" panose="020B0604020202020204" pitchFamily="34" charset="0"/>
+              <a:buChar char="•"/>
+            </a:pPr>
+            <a:r>
+              <a:rPr lang="pt-BR" sz="2000" b="1" dirty="0" smtClean="0"/>
+              <a:t>Meios persistentes </a:t>
+            </a:r>
+            <a:r>
+              <a:rPr lang="pt-BR" sz="2000" b="1" dirty="0" smtClean="0"/>
+              <a:t>(Banco de dados, arquivos e </a:t>
+            </a:r>
+            <a:r>
+              <a:rPr lang="pt-BR" sz="2000" b="1" dirty="0" err="1" smtClean="0"/>
+              <a:t>etc</a:t>
+            </a:r>
+            <a:r>
+              <a:rPr lang="pt-BR" sz="2000" b="1" dirty="0" smtClean="0"/>
+              <a:t>).</a:t>
+            </a:r>
+          </a:p>
+          <a:p>
+            <a:pPr marL="342900" indent="-342900">
+              <a:buFont typeface="Arial" panose="020B0604020202020204" pitchFamily="34" charset="0"/>
+              <a:buChar char="•"/>
+            </a:pPr>
+            <a:r>
+              <a:rPr lang="pt-BR" sz="2000" b="1" dirty="0" smtClean="0"/>
+              <a:t>Objetos na memória por meio de escopo (Requisição, sessão, contexto).</a:t>
+            </a:r>
+            <a:endParaRPr lang="pt-BR" sz="2000" b="1" dirty="0" smtClean="0"/>
+          </a:p>
+        </p:txBody>
+      </p:sp>
     </p:spTree>
     <p:extLst>
       <p:ext uri="{BB962C8B-B14F-4D97-AF65-F5344CB8AC3E}">
-        <p14:creationId xmlns:p14="http://schemas.microsoft.com/office/powerpoint/2010/main" val="1068927343"/>
+        <p14:creationId xmlns:p14="http://schemas.microsoft.com/office/powerpoint/2010/main" val="2174356159"/>
+      </p:ext>
+    </p:extLst>
+  </p:cSld>
+  <p:clrMapOvr>
+    <a:masterClrMapping/>
+  </p:clrMapOvr>
+  <p:transition>
+    <p:fade/>
+  </p:transition>
+</p:sld>
+</file>
+
+<file path=ppt/slides/slide18.xml><?xml version="1.0" encoding="utf-8"?>
+<p:sld xmlns:a="http://schemas.openxmlformats.org/drawingml/2006/main" xmlns:r="http://schemas.openxmlformats.org/officeDocument/2006/relationships" xmlns:p="http://schemas.openxmlformats.org/presentationml/2006/main">
+  <p:cSld>
+    <p:spTree>
+      <p:nvGrpSpPr>
+        <p:cNvPr id="1" name=""/>
+        <p:cNvGrpSpPr/>
+        <p:nvPr/>
+      </p:nvGrpSpPr>
+      <p:grpSpPr>
+        <a:xfrm>
+          <a:off x="0" y="0"/>
+          <a:ext cx="0" cy="0"/>
+          <a:chOff x="0" y="0"/>
+          <a:chExt cx="0" cy="0"/>
+        </a:xfrm>
+      </p:grpSpPr>
+      <p:sp>
+        <p:nvSpPr>
+          <p:cNvPr id="3" name="Rectangle 8"/>
+          <p:cNvSpPr>
+            <a:spLocks noGrp="1"/>
+          </p:cNvSpPr>
+          <p:nvPr>
+            <p:ph type="title"/>
+          </p:nvPr>
+        </p:nvSpPr>
+        <p:spPr>
+          <a:xfrm>
+            <a:off x="228600" y="1676400"/>
+            <a:ext cx="8229600" cy="1143000"/>
+          </a:xfrm>
+        </p:spPr>
+        <p:txBody>
+          <a:bodyPr>
+            <a:noAutofit/>
+          </a:bodyPr>
+          <a:lstStyle/>
+          <a:p>
+            <a:r>
+              <a:rPr lang="pt-BR" sz="4000" dirty="0" smtClean="0"/>
+              <a:t>Filtros</a:t>
+            </a:r>
+            <a:endParaRPr lang="pt-BR" sz="4000" dirty="0"/>
+          </a:p>
+        </p:txBody>
+      </p:sp>
+      <p:sp>
+        <p:nvSpPr>
+          <p:cNvPr id="7" name="Retângulo 6">
+            <a:extLst>
+              <a:ext uri="{FF2B5EF4-FFF2-40B4-BE49-F238E27FC236}">
+                <a16:creationId xmlns:a16="http://schemas.microsoft.com/office/drawing/2014/main" xmlns="" id="{DE871D51-6822-455D-8B97-7F37D0BA5BB9}"/>
+              </a:ext>
+            </a:extLst>
+          </p:cNvPr>
+          <p:cNvSpPr/>
+          <p:nvPr/>
+        </p:nvSpPr>
+        <p:spPr>
+          <a:xfrm>
+            <a:off x="685800" y="2681625"/>
+            <a:ext cx="7772400" cy="2246769"/>
+          </a:xfrm>
+          <a:prstGeom prst="rect">
+            <a:avLst/>
+          </a:prstGeom>
+        </p:spPr>
+        <p:txBody>
+          <a:bodyPr wrap="square">
+            <a:spAutoFit/>
+          </a:bodyPr>
+          <a:lstStyle/>
+          <a:p>
+            <a:r>
+              <a:rPr lang="pt-BR" sz="2000" b="1" dirty="0" smtClean="0"/>
+              <a:t>Filtro serve para interceptar as requisições e respostas antes que chegue ao </a:t>
+            </a:r>
+            <a:r>
+              <a:rPr lang="pt-BR" sz="2000" b="1" dirty="0" err="1" smtClean="0"/>
+              <a:t>servlet</a:t>
+            </a:r>
+            <a:r>
+              <a:rPr lang="pt-BR" sz="2000" b="1" dirty="0" smtClean="0"/>
+              <a:t> de destino, e de volta ao cliente. </a:t>
+            </a:r>
+          </a:p>
+          <a:p>
+            <a:endParaRPr lang="pt-BR" sz="2000" b="1" dirty="0"/>
+          </a:p>
+          <a:p>
+            <a:r>
+              <a:rPr lang="pt-BR" sz="2000" b="1" dirty="0" smtClean="0"/>
+              <a:t>Filtro funciona como um porteiro, que realiza o filtro de tudo que “entra” e que “sai” do contexto da aplicação até o </a:t>
+            </a:r>
+            <a:r>
+              <a:rPr lang="pt-BR" sz="2000" b="1" dirty="0" err="1" smtClean="0"/>
+              <a:t>servlet</a:t>
+            </a:r>
+            <a:r>
+              <a:rPr lang="pt-BR" sz="2000" b="1" dirty="0" smtClean="0"/>
+              <a:t>. Eles podem tratar as requisições para direcioná-las ao melhor caminho ou até mesmo alterar uma mensage</a:t>
+            </a:r>
+            <a:r>
+              <a:rPr lang="pt-BR" sz="2000" b="1" dirty="0" smtClean="0"/>
+              <a:t>m.</a:t>
+            </a:r>
+            <a:endParaRPr lang="pt-BR" sz="2000" b="1" dirty="0" smtClean="0"/>
+          </a:p>
+        </p:txBody>
+      </p:sp>
+    </p:spTree>
+    <p:extLst>
+      <p:ext uri="{BB962C8B-B14F-4D97-AF65-F5344CB8AC3E}">
+        <p14:creationId xmlns:p14="http://schemas.microsoft.com/office/powerpoint/2010/main" val="4116898096"/>
+      </p:ext>
+    </p:extLst>
+  </p:cSld>
+  <p:clrMapOvr>
+    <a:masterClrMapping/>
+  </p:clrMapOvr>
+  <p:transition>
+    <p:fade/>
+  </p:transition>
+</p:sld>
+</file>
+
+<file path=ppt/slides/slide19.xml><?xml version="1.0" encoding="utf-8"?>
+<p:sld xmlns:a="http://schemas.openxmlformats.org/drawingml/2006/main" xmlns:r="http://schemas.openxmlformats.org/officeDocument/2006/relationships" xmlns:p="http://schemas.openxmlformats.org/presentationml/2006/main">
+  <p:cSld>
+    <p:spTree>
+      <p:nvGrpSpPr>
+        <p:cNvPr id="1" name=""/>
+        <p:cNvGrpSpPr/>
+        <p:nvPr/>
+      </p:nvGrpSpPr>
+      <p:grpSpPr>
+        <a:xfrm>
+          <a:off x="0" y="0"/>
+          <a:ext cx="0" cy="0"/>
+          <a:chOff x="0" y="0"/>
+          <a:chExt cx="0" cy="0"/>
+        </a:xfrm>
+      </p:grpSpPr>
+      <p:sp>
+        <p:nvSpPr>
+          <p:cNvPr id="3" name="Rectangle 8"/>
+          <p:cNvSpPr>
+            <a:spLocks noGrp="1"/>
+          </p:cNvSpPr>
+          <p:nvPr>
+            <p:ph type="title"/>
+          </p:nvPr>
+        </p:nvSpPr>
+        <p:spPr>
+          <a:xfrm>
+            <a:off x="228600" y="1676400"/>
+            <a:ext cx="8229600" cy="1143000"/>
+          </a:xfrm>
+        </p:spPr>
+        <p:txBody>
+          <a:bodyPr>
+            <a:noAutofit/>
+          </a:bodyPr>
+          <a:lstStyle/>
+          <a:p>
+            <a:r>
+              <a:rPr lang="pt-BR" sz="4000" b="0" dirty="0"/>
+              <a:t>JSP (</a:t>
+            </a:r>
+            <a:r>
+              <a:rPr lang="pt-BR" sz="4000" b="0" dirty="0" err="1"/>
+              <a:t>JavaServer</a:t>
+            </a:r>
+            <a:r>
+              <a:rPr lang="pt-BR" sz="4000" b="0" dirty="0"/>
+              <a:t> </a:t>
+            </a:r>
+            <a:r>
+              <a:rPr lang="pt-BR" sz="4000" b="0" dirty="0" err="1"/>
+              <a:t>Pages</a:t>
+            </a:r>
+            <a:r>
+              <a:rPr lang="pt-BR" sz="4000" b="0" dirty="0"/>
+              <a:t>) e </a:t>
+            </a:r>
+            <a:r>
+              <a:rPr lang="pt-BR" sz="4000" b="0" dirty="0" err="1"/>
+              <a:t>Taglibs</a:t>
+            </a:r>
+            <a:endParaRPr lang="pt-BR" sz="4000" dirty="0"/>
+          </a:p>
+        </p:txBody>
+      </p:sp>
+      <p:sp>
+        <p:nvSpPr>
+          <p:cNvPr id="7" name="Retângulo 6">
+            <a:extLst>
+              <a:ext uri="{FF2B5EF4-FFF2-40B4-BE49-F238E27FC236}">
+                <a16:creationId xmlns:a16="http://schemas.microsoft.com/office/drawing/2014/main" xmlns="" id="{DE871D51-6822-455D-8B97-7F37D0BA5BB9}"/>
+              </a:ext>
+            </a:extLst>
+          </p:cNvPr>
+          <p:cNvSpPr/>
+          <p:nvPr/>
+        </p:nvSpPr>
+        <p:spPr>
+          <a:xfrm>
+            <a:off x="685800" y="2681625"/>
+            <a:ext cx="7772400" cy="400110"/>
+          </a:xfrm>
+          <a:prstGeom prst="rect">
+            <a:avLst/>
+          </a:prstGeom>
+        </p:spPr>
+        <p:txBody>
+          <a:bodyPr wrap="square">
+            <a:spAutoFit/>
+          </a:bodyPr>
+          <a:lstStyle/>
+          <a:p>
+            <a:r>
+              <a:rPr lang="pt-BR" sz="2000" b="1" dirty="0" smtClean="0"/>
+              <a:t>d</a:t>
+            </a:r>
+            <a:endParaRPr lang="pt-BR" sz="2000" b="1" dirty="0" smtClean="0"/>
+          </a:p>
+        </p:txBody>
+      </p:sp>
+    </p:spTree>
+    <p:extLst>
+      <p:ext uri="{BB962C8B-B14F-4D97-AF65-F5344CB8AC3E}">
+        <p14:creationId xmlns:p14="http://schemas.microsoft.com/office/powerpoint/2010/main" val="153802748"/>
       </p:ext>
     </p:extLst>
   </p:cSld>

</xml_diff>